<commit_message>
Rename education figure _v2 to the original filename.
</commit_message>
<xml_diff>
--- a/data-intensive-skills-overview/FigureSpaceDataEducation.pptx
+++ b/data-intensive-skills-overview/FigureSpaceDataEducation.pptx
@@ -4,8 +4,13 @@
   <p:sldMasterIdLst>
     <p:sldMasterId id="2147483648" r:id="rId1"/>
   </p:sldMasterIdLst>
+  <p:notesMasterIdLst>
+    <p:notesMasterId r:id="rId5"/>
+  </p:notesMasterIdLst>
   <p:sldIdLst>
     <p:sldId id="256" r:id="rId2"/>
+    <p:sldId id="257" r:id="rId3"/>
+    <p:sldId id="258" r:id="rId4"/>
   </p:sldIdLst>
   <p:sldSz cx="9144000" cy="6858000" type="screen4x3"/>
   <p:notesSz cx="6858000" cy="9144000"/>
@@ -105,6 +110,562 @@
     </a:lvl9pPr>
   </p:defaultTextStyle>
 </p:presentation>
+</file>
+
+<file path=ppt/notesMasters/notesMaster1.xml><?xml version="1.0" encoding="utf-8"?>
+<p:notesMaster xmlns:a="http://schemas.openxmlformats.org/drawingml/2006/main" xmlns:r="http://schemas.openxmlformats.org/officeDocument/2006/relationships" xmlns:p="http://schemas.openxmlformats.org/presentationml/2006/main">
+  <p:cSld>
+    <p:bg>
+      <p:bgRef idx="1001">
+        <a:schemeClr val="bg1"/>
+      </p:bgRef>
+    </p:bg>
+    <p:spTree>
+      <p:nvGrpSpPr>
+        <p:cNvPr id="1" name=""/>
+        <p:cNvGrpSpPr/>
+        <p:nvPr/>
+      </p:nvGrpSpPr>
+      <p:grpSpPr>
+        <a:xfrm>
+          <a:off x="0" y="0"/>
+          <a:ext cx="0" cy="0"/>
+          <a:chOff x="0" y="0"/>
+          <a:chExt cx="0" cy="0"/>
+        </a:xfrm>
+      </p:grpSpPr>
+      <p:sp>
+        <p:nvSpPr>
+          <p:cNvPr id="2" name="Header Placeholder 1"/>
+          <p:cNvSpPr>
+            <a:spLocks noGrp="1"/>
+          </p:cNvSpPr>
+          <p:nvPr>
+            <p:ph type="hdr" sz="quarter"/>
+          </p:nvPr>
+        </p:nvSpPr>
+        <p:spPr>
+          <a:xfrm>
+            <a:off x="0" y="0"/>
+            <a:ext cx="2971800" cy="457200"/>
+          </a:xfrm>
+          <a:prstGeom prst="rect">
+            <a:avLst/>
+          </a:prstGeom>
+        </p:spPr>
+        <p:txBody>
+          <a:bodyPr vert="horz" lIns="91440" tIns="45720" rIns="91440" bIns="45720" rtlCol="0"/>
+          <a:lstStyle>
+            <a:lvl1pPr algn="l">
+              <a:defRPr sz="1200"/>
+            </a:lvl1pPr>
+          </a:lstStyle>
+          <a:p>
+            <a:endParaRPr lang="en-US"/>
+          </a:p>
+        </p:txBody>
+      </p:sp>
+      <p:sp>
+        <p:nvSpPr>
+          <p:cNvPr id="3" name="Date Placeholder 2"/>
+          <p:cNvSpPr>
+            <a:spLocks noGrp="1"/>
+          </p:cNvSpPr>
+          <p:nvPr>
+            <p:ph type="dt" idx="1"/>
+          </p:nvPr>
+        </p:nvSpPr>
+        <p:spPr>
+          <a:xfrm>
+            <a:off x="3884613" y="0"/>
+            <a:ext cx="2971800" cy="457200"/>
+          </a:xfrm>
+          <a:prstGeom prst="rect">
+            <a:avLst/>
+          </a:prstGeom>
+        </p:spPr>
+        <p:txBody>
+          <a:bodyPr vert="horz" lIns="91440" tIns="45720" rIns="91440" bIns="45720" rtlCol="0"/>
+          <a:lstStyle>
+            <a:lvl1pPr algn="r">
+              <a:defRPr sz="1200"/>
+            </a:lvl1pPr>
+          </a:lstStyle>
+          <a:p>
+            <a:fld id="{7CA89149-D21F-1841-8EB0-67F7BC7F7E21}" type="datetimeFigureOut">
+              <a:rPr lang="en-US" smtClean="0"/>
+              <a:t>9/10/15</a:t>
+            </a:fld>
+            <a:endParaRPr lang="en-US"/>
+          </a:p>
+        </p:txBody>
+      </p:sp>
+      <p:sp>
+        <p:nvSpPr>
+          <p:cNvPr id="4" name="Slide Image Placeholder 3"/>
+          <p:cNvSpPr>
+            <a:spLocks noGrp="1" noRot="1" noChangeAspect="1"/>
+          </p:cNvSpPr>
+          <p:nvPr>
+            <p:ph type="sldImg" idx="2"/>
+          </p:nvPr>
+        </p:nvSpPr>
+        <p:spPr>
+          <a:xfrm>
+            <a:off x="1143000" y="685800"/>
+            <a:ext cx="4572000" cy="3429000"/>
+          </a:xfrm>
+          <a:prstGeom prst="rect">
+            <a:avLst/>
+          </a:prstGeom>
+          <a:noFill/>
+          <a:ln w="12700">
+            <a:solidFill>
+              <a:prstClr val="black"/>
+            </a:solidFill>
+          </a:ln>
+        </p:spPr>
+        <p:txBody>
+          <a:bodyPr vert="horz" lIns="91440" tIns="45720" rIns="91440" bIns="45720" rtlCol="0" anchor="ctr"/>
+          <a:lstStyle/>
+          <a:p>
+            <a:endParaRPr lang="en-US"/>
+          </a:p>
+        </p:txBody>
+      </p:sp>
+      <p:sp>
+        <p:nvSpPr>
+          <p:cNvPr id="5" name="Notes Placeholder 4"/>
+          <p:cNvSpPr>
+            <a:spLocks noGrp="1"/>
+          </p:cNvSpPr>
+          <p:nvPr>
+            <p:ph type="body" sz="quarter" idx="3"/>
+          </p:nvPr>
+        </p:nvSpPr>
+        <p:spPr>
+          <a:xfrm>
+            <a:off x="685800" y="4343400"/>
+            <a:ext cx="5486400" cy="4114800"/>
+          </a:xfrm>
+          <a:prstGeom prst="rect">
+            <a:avLst/>
+          </a:prstGeom>
+        </p:spPr>
+        <p:txBody>
+          <a:bodyPr vert="horz" lIns="91440" tIns="45720" rIns="91440" bIns="45720" rtlCol="0"/>
+          <a:lstStyle/>
+          <a:p>
+            <a:pPr lvl="0"/>
+            <a:r>
+              <a:rPr lang="en-US" smtClean="0"/>
+              <a:t>Click to edit Master text styles</a:t>
+            </a:r>
+          </a:p>
+          <a:p>
+            <a:pPr lvl="1"/>
+            <a:r>
+              <a:rPr lang="en-US" smtClean="0"/>
+              <a:t>Second level</a:t>
+            </a:r>
+          </a:p>
+          <a:p>
+            <a:pPr lvl="2"/>
+            <a:r>
+              <a:rPr lang="en-US" smtClean="0"/>
+              <a:t>Third level</a:t>
+            </a:r>
+          </a:p>
+          <a:p>
+            <a:pPr lvl="3"/>
+            <a:r>
+              <a:rPr lang="en-US" smtClean="0"/>
+              <a:t>Fourth level</a:t>
+            </a:r>
+          </a:p>
+          <a:p>
+            <a:pPr lvl="4"/>
+            <a:r>
+              <a:rPr lang="en-US" smtClean="0"/>
+              <a:t>Fifth level</a:t>
+            </a:r>
+            <a:endParaRPr lang="en-US"/>
+          </a:p>
+        </p:txBody>
+      </p:sp>
+      <p:sp>
+        <p:nvSpPr>
+          <p:cNvPr id="6" name="Footer Placeholder 5"/>
+          <p:cNvSpPr>
+            <a:spLocks noGrp="1"/>
+          </p:cNvSpPr>
+          <p:nvPr>
+            <p:ph type="ftr" sz="quarter" idx="4"/>
+          </p:nvPr>
+        </p:nvSpPr>
+        <p:spPr>
+          <a:xfrm>
+            <a:off x="0" y="8685213"/>
+            <a:ext cx="2971800" cy="457200"/>
+          </a:xfrm>
+          <a:prstGeom prst="rect">
+            <a:avLst/>
+          </a:prstGeom>
+        </p:spPr>
+        <p:txBody>
+          <a:bodyPr vert="horz" lIns="91440" tIns="45720" rIns="91440" bIns="45720" rtlCol="0" anchor="b"/>
+          <a:lstStyle>
+            <a:lvl1pPr algn="l">
+              <a:defRPr sz="1200"/>
+            </a:lvl1pPr>
+          </a:lstStyle>
+          <a:p>
+            <a:endParaRPr lang="en-US"/>
+          </a:p>
+        </p:txBody>
+      </p:sp>
+      <p:sp>
+        <p:nvSpPr>
+          <p:cNvPr id="7" name="Slide Number Placeholder 6"/>
+          <p:cNvSpPr>
+            <a:spLocks noGrp="1"/>
+          </p:cNvSpPr>
+          <p:nvPr>
+            <p:ph type="sldNum" sz="quarter" idx="5"/>
+          </p:nvPr>
+        </p:nvSpPr>
+        <p:spPr>
+          <a:xfrm>
+            <a:off x="3884613" y="8685213"/>
+            <a:ext cx="2971800" cy="457200"/>
+          </a:xfrm>
+          <a:prstGeom prst="rect">
+            <a:avLst/>
+          </a:prstGeom>
+        </p:spPr>
+        <p:txBody>
+          <a:bodyPr vert="horz" lIns="91440" tIns="45720" rIns="91440" bIns="45720" rtlCol="0" anchor="b"/>
+          <a:lstStyle>
+            <a:lvl1pPr algn="r">
+              <a:defRPr sz="1200"/>
+            </a:lvl1pPr>
+          </a:lstStyle>
+          <a:p>
+            <a:fld id="{CE09061E-DCC8-1640-B238-B51D9C972A55}" type="slidenum">
+              <a:rPr lang="en-US" smtClean="0"/>
+              <a:t>‹#›</a:t>
+            </a:fld>
+            <a:endParaRPr lang="en-US"/>
+          </a:p>
+        </p:txBody>
+      </p:sp>
+    </p:spTree>
+    <p:extLst>
+      <p:ext uri="{BB962C8B-B14F-4D97-AF65-F5344CB8AC3E}">
+        <p14:creationId xmlns:p14="http://schemas.microsoft.com/office/powerpoint/2010/main" val="4077884213"/>
+      </p:ext>
+    </p:extLst>
+  </p:cSld>
+  <p:clrMap bg1="lt1" tx1="dk1" bg2="lt2" tx2="dk2" accent1="accent1" accent2="accent2" accent3="accent3" accent4="accent4" accent5="accent5" accent6="accent6" hlink="hlink" folHlink="folHlink"/>
+  <p:notesStyle>
+    <a:lvl1pPr marL="0" algn="l" defTabSz="457200" rtl="0" eaLnBrk="1" latinLnBrk="0" hangingPunct="1">
+      <a:defRPr sz="1200" kern="1200">
+        <a:solidFill>
+          <a:schemeClr val="tx1"/>
+        </a:solidFill>
+        <a:latin typeface="+mn-lt"/>
+        <a:ea typeface="+mn-ea"/>
+        <a:cs typeface="+mn-cs"/>
+      </a:defRPr>
+    </a:lvl1pPr>
+    <a:lvl2pPr marL="457200" algn="l" defTabSz="457200" rtl="0" eaLnBrk="1" latinLnBrk="0" hangingPunct="1">
+      <a:defRPr sz="1200" kern="1200">
+        <a:solidFill>
+          <a:schemeClr val="tx1"/>
+        </a:solidFill>
+        <a:latin typeface="+mn-lt"/>
+        <a:ea typeface="+mn-ea"/>
+        <a:cs typeface="+mn-cs"/>
+      </a:defRPr>
+    </a:lvl2pPr>
+    <a:lvl3pPr marL="914400" algn="l" defTabSz="457200" rtl="0" eaLnBrk="1" latinLnBrk="0" hangingPunct="1">
+      <a:defRPr sz="1200" kern="1200">
+        <a:solidFill>
+          <a:schemeClr val="tx1"/>
+        </a:solidFill>
+        <a:latin typeface="+mn-lt"/>
+        <a:ea typeface="+mn-ea"/>
+        <a:cs typeface="+mn-cs"/>
+      </a:defRPr>
+    </a:lvl3pPr>
+    <a:lvl4pPr marL="1371600" algn="l" defTabSz="457200" rtl="0" eaLnBrk="1" latinLnBrk="0" hangingPunct="1">
+      <a:defRPr sz="1200" kern="1200">
+        <a:solidFill>
+          <a:schemeClr val="tx1"/>
+        </a:solidFill>
+        <a:latin typeface="+mn-lt"/>
+        <a:ea typeface="+mn-ea"/>
+        <a:cs typeface="+mn-cs"/>
+      </a:defRPr>
+    </a:lvl4pPr>
+    <a:lvl5pPr marL="1828800" algn="l" defTabSz="457200" rtl="0" eaLnBrk="1" latinLnBrk="0" hangingPunct="1">
+      <a:defRPr sz="1200" kern="1200">
+        <a:solidFill>
+          <a:schemeClr val="tx1"/>
+        </a:solidFill>
+        <a:latin typeface="+mn-lt"/>
+        <a:ea typeface="+mn-ea"/>
+        <a:cs typeface="+mn-cs"/>
+      </a:defRPr>
+    </a:lvl5pPr>
+    <a:lvl6pPr marL="2286000" algn="l" defTabSz="457200" rtl="0" eaLnBrk="1" latinLnBrk="0" hangingPunct="1">
+      <a:defRPr sz="1200" kern="1200">
+        <a:solidFill>
+          <a:schemeClr val="tx1"/>
+        </a:solidFill>
+        <a:latin typeface="+mn-lt"/>
+        <a:ea typeface="+mn-ea"/>
+        <a:cs typeface="+mn-cs"/>
+      </a:defRPr>
+    </a:lvl6pPr>
+    <a:lvl7pPr marL="2743200" algn="l" defTabSz="457200" rtl="0" eaLnBrk="1" latinLnBrk="0" hangingPunct="1">
+      <a:defRPr sz="1200" kern="1200">
+        <a:solidFill>
+          <a:schemeClr val="tx1"/>
+        </a:solidFill>
+        <a:latin typeface="+mn-lt"/>
+        <a:ea typeface="+mn-ea"/>
+        <a:cs typeface="+mn-cs"/>
+      </a:defRPr>
+    </a:lvl7pPr>
+    <a:lvl8pPr marL="3200400" algn="l" defTabSz="457200" rtl="0" eaLnBrk="1" latinLnBrk="0" hangingPunct="1">
+      <a:defRPr sz="1200" kern="1200">
+        <a:solidFill>
+          <a:schemeClr val="tx1"/>
+        </a:solidFill>
+        <a:latin typeface="+mn-lt"/>
+        <a:ea typeface="+mn-ea"/>
+        <a:cs typeface="+mn-cs"/>
+      </a:defRPr>
+    </a:lvl8pPr>
+    <a:lvl9pPr marL="3657600" algn="l" defTabSz="457200" rtl="0" eaLnBrk="1" latinLnBrk="0" hangingPunct="1">
+      <a:defRPr sz="1200" kern="1200">
+        <a:solidFill>
+          <a:schemeClr val="tx1"/>
+        </a:solidFill>
+        <a:latin typeface="+mn-lt"/>
+        <a:ea typeface="+mn-ea"/>
+        <a:cs typeface="+mn-cs"/>
+      </a:defRPr>
+    </a:lvl9pPr>
+  </p:notesStyle>
+</p:notesMaster>
+</file>
+
+<file path=ppt/notesSlides/notesSlide1.xml><?xml version="1.0" encoding="utf-8"?>
+<p:notes xmlns:a="http://schemas.openxmlformats.org/drawingml/2006/main" xmlns:r="http://schemas.openxmlformats.org/officeDocument/2006/relationships" xmlns:p="http://schemas.openxmlformats.org/presentationml/2006/main">
+  <p:cSld>
+    <p:spTree>
+      <p:nvGrpSpPr>
+        <p:cNvPr id="1" name=""/>
+        <p:cNvGrpSpPr/>
+        <p:nvPr/>
+      </p:nvGrpSpPr>
+      <p:grpSpPr>
+        <a:xfrm>
+          <a:off x="0" y="0"/>
+          <a:ext cx="0" cy="0"/>
+          <a:chOff x="0" y="0"/>
+          <a:chExt cx="0" cy="0"/>
+        </a:xfrm>
+      </p:grpSpPr>
+      <p:sp>
+        <p:nvSpPr>
+          <p:cNvPr id="2" name="Slide Image Placeholder 1"/>
+          <p:cNvSpPr>
+            <a:spLocks noGrp="1" noRot="1" noChangeAspect="1"/>
+          </p:cNvSpPr>
+          <p:nvPr>
+            <p:ph type="sldImg"/>
+          </p:nvPr>
+        </p:nvSpPr>
+        <p:spPr/>
+      </p:sp>
+      <p:sp>
+        <p:nvSpPr>
+          <p:cNvPr id="3" name="Notes Placeholder 2"/>
+          <p:cNvSpPr>
+            <a:spLocks noGrp="1"/>
+          </p:cNvSpPr>
+          <p:nvPr>
+            <p:ph type="body" idx="1"/>
+          </p:nvPr>
+        </p:nvSpPr>
+        <p:spPr/>
+        <p:txBody>
+          <a:bodyPr/>
+          <a:lstStyle/>
+          <a:p>
+            <a:r>
+              <a:rPr lang="en-US" dirty="0" smtClean="0"/>
+              <a:t>To consider:</a:t>
+            </a:r>
+          </a:p>
+          <a:p>
+            <a:r>
+              <a:rPr lang="en-US" dirty="0" smtClean="0"/>
+              <a:t>Need to cross reference the language / categories between this Figure</a:t>
+            </a:r>
+            <a:r>
+              <a:rPr lang="en-US" baseline="0" dirty="0" smtClean="0"/>
+              <a:t> and </a:t>
+            </a:r>
+            <a:r>
+              <a:rPr lang="en-US" dirty="0" smtClean="0"/>
+              <a:t>Table 1</a:t>
+            </a:r>
+            <a:r>
+              <a:rPr lang="en-US" baseline="0" dirty="0" smtClean="0"/>
+              <a:t> (Lessons, Units, Data, Workshops, Courses, Programs).  </a:t>
+            </a:r>
+          </a:p>
+          <a:p>
+            <a:r>
+              <a:rPr lang="en-US" baseline="0" dirty="0" smtClean="0"/>
+              <a:t>Are the shapes inferring some classification?</a:t>
+            </a:r>
+          </a:p>
+          <a:p>
+            <a:r>
+              <a:rPr lang="en-US" baseline="0" dirty="0" smtClean="0"/>
+              <a:t>Do we want to group by online/in person?</a:t>
+            </a:r>
+            <a:endParaRPr lang="en-US" dirty="0"/>
+          </a:p>
+        </p:txBody>
+      </p:sp>
+      <p:sp>
+        <p:nvSpPr>
+          <p:cNvPr id="4" name="Slide Number Placeholder 3"/>
+          <p:cNvSpPr>
+            <a:spLocks noGrp="1"/>
+          </p:cNvSpPr>
+          <p:nvPr>
+            <p:ph type="sldNum" sz="quarter" idx="10"/>
+          </p:nvPr>
+        </p:nvSpPr>
+        <p:spPr/>
+        <p:txBody>
+          <a:bodyPr/>
+          <a:lstStyle/>
+          <a:p>
+            <a:fld id="{CE09061E-DCC8-1640-B238-B51D9C972A55}" type="slidenum">
+              <a:rPr lang="en-US" smtClean="0"/>
+              <a:t>2</a:t>
+            </a:fld>
+            <a:endParaRPr lang="en-US"/>
+          </a:p>
+        </p:txBody>
+      </p:sp>
+    </p:spTree>
+    <p:extLst>
+      <p:ext uri="{BB962C8B-B14F-4D97-AF65-F5344CB8AC3E}">
+        <p14:creationId xmlns:p14="http://schemas.microsoft.com/office/powerpoint/2010/main" val="2525294544"/>
+      </p:ext>
+    </p:extLst>
+  </p:cSld>
+  <p:clrMapOvr>
+    <a:masterClrMapping/>
+  </p:clrMapOvr>
+</p:notes>
+</file>
+
+<file path=ppt/notesSlides/notesSlide2.xml><?xml version="1.0" encoding="utf-8"?>
+<p:notes xmlns:a="http://schemas.openxmlformats.org/drawingml/2006/main" xmlns:r="http://schemas.openxmlformats.org/officeDocument/2006/relationships" xmlns:p="http://schemas.openxmlformats.org/presentationml/2006/main">
+  <p:cSld>
+    <p:spTree>
+      <p:nvGrpSpPr>
+        <p:cNvPr id="1" name=""/>
+        <p:cNvGrpSpPr/>
+        <p:nvPr/>
+      </p:nvGrpSpPr>
+      <p:grpSpPr>
+        <a:xfrm>
+          <a:off x="0" y="0"/>
+          <a:ext cx="0" cy="0"/>
+          <a:chOff x="0" y="0"/>
+          <a:chExt cx="0" cy="0"/>
+        </a:xfrm>
+      </p:grpSpPr>
+      <p:sp>
+        <p:nvSpPr>
+          <p:cNvPr id="2" name="Slide Image Placeholder 1"/>
+          <p:cNvSpPr>
+            <a:spLocks noGrp="1" noRot="1" noChangeAspect="1"/>
+          </p:cNvSpPr>
+          <p:nvPr>
+            <p:ph type="sldImg"/>
+          </p:nvPr>
+        </p:nvSpPr>
+        <p:spPr/>
+      </p:sp>
+      <p:sp>
+        <p:nvSpPr>
+          <p:cNvPr id="3" name="Notes Placeholder 2"/>
+          <p:cNvSpPr>
+            <a:spLocks noGrp="1"/>
+          </p:cNvSpPr>
+          <p:nvPr>
+            <p:ph type="body" idx="1"/>
+          </p:nvPr>
+        </p:nvSpPr>
+        <p:spPr/>
+        <p:txBody>
+          <a:bodyPr/>
+          <a:lstStyle/>
+          <a:p>
+            <a:r>
+              <a:rPr lang="en-US" dirty="0" smtClean="0"/>
+              <a:t>Alternate representation where materials feed into formal and informal learning pedagogies</a:t>
+            </a:r>
+            <a:endParaRPr lang="en-US" dirty="0"/>
+          </a:p>
+        </p:txBody>
+      </p:sp>
+      <p:sp>
+        <p:nvSpPr>
+          <p:cNvPr id="4" name="Slide Number Placeholder 3"/>
+          <p:cNvSpPr>
+            <a:spLocks noGrp="1"/>
+          </p:cNvSpPr>
+          <p:nvPr>
+            <p:ph type="sldNum" sz="quarter" idx="10"/>
+          </p:nvPr>
+        </p:nvSpPr>
+        <p:spPr/>
+        <p:txBody>
+          <a:bodyPr/>
+          <a:lstStyle/>
+          <a:p>
+            <a:fld id="{CE09061E-DCC8-1640-B238-B51D9C972A55}" type="slidenum">
+              <a:rPr lang="en-US" smtClean="0"/>
+              <a:t>3</a:t>
+            </a:fld>
+            <a:endParaRPr lang="en-US"/>
+          </a:p>
+        </p:txBody>
+      </p:sp>
+    </p:spTree>
+    <p:extLst>
+      <p:ext uri="{BB962C8B-B14F-4D97-AF65-F5344CB8AC3E}">
+        <p14:creationId xmlns:p14="http://schemas.microsoft.com/office/powerpoint/2010/main" val="2525294544"/>
+      </p:ext>
+    </p:extLst>
+  </p:cSld>
+  <p:clrMapOvr>
+    <a:masterClrMapping/>
+  </p:clrMapOvr>
+</p:notes>
 </file>
 
 <file path=ppt/slideLayouts/slideLayout1.xml><?xml version="1.0" encoding="utf-8"?>
@@ -4195,6 +4756,2454 @@
   <p:clrMapOvr>
     <a:masterClrMapping/>
   </p:clrMapOvr>
+  <p:timing>
+    <p:tnLst>
+      <p:par>
+        <p:cTn xmlns:p14="http://schemas.microsoft.com/office/powerpoint/2010/main" id="1" dur="indefinite" restart="never" nodeType="tmRoot"/>
+      </p:par>
+    </p:tnLst>
+  </p:timing>
+</p:sld>
+</file>
+
+<file path=ppt/slides/slide2.xml><?xml version="1.0" encoding="utf-8"?>
+<p:sld xmlns:a="http://schemas.openxmlformats.org/drawingml/2006/main" xmlns:r="http://schemas.openxmlformats.org/officeDocument/2006/relationships" xmlns:p="http://schemas.openxmlformats.org/presentationml/2006/main">
+  <p:cSld>
+    <p:spTree>
+      <p:nvGrpSpPr>
+        <p:cNvPr id="1" name=""/>
+        <p:cNvGrpSpPr/>
+        <p:nvPr/>
+      </p:nvGrpSpPr>
+      <p:grpSpPr>
+        <a:xfrm>
+          <a:off x="0" y="0"/>
+          <a:ext cx="0" cy="0"/>
+          <a:chOff x="0" y="0"/>
+          <a:chExt cx="0" cy="0"/>
+        </a:xfrm>
+      </p:grpSpPr>
+      <p:sp>
+        <p:nvSpPr>
+          <p:cNvPr id="2" name="Title 1"/>
+          <p:cNvSpPr>
+            <a:spLocks noGrp="1"/>
+          </p:cNvSpPr>
+          <p:nvPr>
+            <p:ph type="ctrTitle"/>
+          </p:nvPr>
+        </p:nvSpPr>
+        <p:spPr>
+          <a:xfrm>
+            <a:off x="542715" y="-48801"/>
+            <a:ext cx="7772400" cy="1470025"/>
+          </a:xfrm>
+        </p:spPr>
+        <p:txBody>
+          <a:bodyPr>
+            <a:normAutofit/>
+          </a:bodyPr>
+          <a:lstStyle/>
+          <a:p>
+            <a:r>
+              <a:rPr lang="en-US" sz="2800" dirty="0" smtClean="0"/>
+              <a:t>The space of data-intensive education for environmental science</a:t>
+            </a:r>
+            <a:endParaRPr lang="en-US" sz="2800" dirty="0"/>
+          </a:p>
+        </p:txBody>
+      </p:sp>
+      <p:sp>
+        <p:nvSpPr>
+          <p:cNvPr id="3" name="Rounded Rectangle 2"/>
+          <p:cNvSpPr/>
+          <p:nvPr/>
+        </p:nvSpPr>
+        <p:spPr>
+          <a:xfrm>
+            <a:off x="3252788" y="1421224"/>
+            <a:ext cx="2651125" cy="5166901"/>
+          </a:xfrm>
+          <a:prstGeom prst="roundRect">
+            <a:avLst>
+              <a:gd name="adj" fmla="val 4048"/>
+            </a:avLst>
+          </a:prstGeom>
+          <a:solidFill>
+            <a:schemeClr val="accent5">
+              <a:lumMod val="20000"/>
+              <a:lumOff val="80000"/>
+            </a:schemeClr>
+          </a:solidFill>
+          <a:ln>
+            <a:solidFill>
+              <a:schemeClr val="accent5">
+                <a:lumMod val="50000"/>
+              </a:schemeClr>
+            </a:solidFill>
+          </a:ln>
+        </p:spPr>
+        <p:style>
+          <a:lnRef idx="1">
+            <a:schemeClr val="accent1"/>
+          </a:lnRef>
+          <a:fillRef idx="3">
+            <a:schemeClr val="accent1"/>
+          </a:fillRef>
+          <a:effectRef idx="2">
+            <a:schemeClr val="accent1"/>
+          </a:effectRef>
+          <a:fontRef idx="minor">
+            <a:schemeClr val="lt1"/>
+          </a:fontRef>
+        </p:style>
+        <p:txBody>
+          <a:bodyPr rtlCol="0" anchor="t"/>
+          <a:lstStyle/>
+          <a:p>
+            <a:pPr algn="ctr"/>
+            <a:r>
+              <a:rPr lang="en-US" sz="2600" b="1" dirty="0" smtClean="0">
+                <a:solidFill>
+                  <a:schemeClr val="tx1">
+                    <a:lumMod val="85000"/>
+                    <a:lumOff val="15000"/>
+                  </a:schemeClr>
+                </a:solidFill>
+              </a:rPr>
+              <a:t>Curricula</a:t>
+            </a:r>
+            <a:endParaRPr lang="en-US" sz="2600" b="1" dirty="0">
+              <a:solidFill>
+                <a:schemeClr val="tx1">
+                  <a:lumMod val="85000"/>
+                  <a:lumOff val="15000"/>
+                </a:schemeClr>
+              </a:solidFill>
+            </a:endParaRPr>
+          </a:p>
+        </p:txBody>
+      </p:sp>
+      <p:sp>
+        <p:nvSpPr>
+          <p:cNvPr id="42" name="Rounded Rectangle 41"/>
+          <p:cNvSpPr/>
+          <p:nvPr/>
+        </p:nvSpPr>
+        <p:spPr>
+          <a:xfrm>
+            <a:off x="3321050" y="2020299"/>
+            <a:ext cx="2514600" cy="944151"/>
+          </a:xfrm>
+          <a:prstGeom prst="roundRect">
+            <a:avLst>
+              <a:gd name="adj" fmla="val 9921"/>
+            </a:avLst>
+          </a:prstGeom>
+          <a:solidFill>
+            <a:schemeClr val="accent4">
+              <a:lumMod val="20000"/>
+              <a:lumOff val="80000"/>
+              <a:alpha val="96000"/>
+            </a:schemeClr>
+          </a:solidFill>
+          <a:ln>
+            <a:solidFill>
+              <a:schemeClr val="accent4">
+                <a:lumMod val="75000"/>
+              </a:schemeClr>
+            </a:solidFill>
+          </a:ln>
+        </p:spPr>
+        <p:style>
+          <a:lnRef idx="1">
+            <a:schemeClr val="accent1"/>
+          </a:lnRef>
+          <a:fillRef idx="3">
+            <a:schemeClr val="accent1"/>
+          </a:fillRef>
+          <a:effectRef idx="2">
+            <a:schemeClr val="accent1"/>
+          </a:effectRef>
+          <a:fontRef idx="minor">
+            <a:schemeClr val="lt1"/>
+          </a:fontRef>
+        </p:style>
+        <p:txBody>
+          <a:bodyPr rtlCol="0" anchor="ctr"/>
+          <a:lstStyle/>
+          <a:p>
+            <a:pPr algn="ctr"/>
+            <a:r>
+              <a:rPr lang="en-US" dirty="0" smtClean="0">
+                <a:solidFill>
+                  <a:schemeClr val="tx1">
+                    <a:lumMod val="85000"/>
+                    <a:lumOff val="15000"/>
+                  </a:schemeClr>
+                </a:solidFill>
+              </a:rPr>
+              <a:t>Quantitative</a:t>
+            </a:r>
+            <a:br>
+              <a:rPr lang="en-US" dirty="0" smtClean="0">
+                <a:solidFill>
+                  <a:schemeClr val="tx1">
+                    <a:lumMod val="85000"/>
+                    <a:lumOff val="15000"/>
+                  </a:schemeClr>
+                </a:solidFill>
+              </a:rPr>
+            </a:br>
+            <a:r>
+              <a:rPr lang="en-US" dirty="0" smtClean="0">
+                <a:solidFill>
+                  <a:schemeClr val="tx1">
+                    <a:lumMod val="85000"/>
+                    <a:lumOff val="15000"/>
+                  </a:schemeClr>
+                </a:solidFill>
+              </a:rPr>
+              <a:t>Courses</a:t>
+            </a:r>
+            <a:endParaRPr lang="en-US" dirty="0">
+              <a:solidFill>
+                <a:schemeClr val="tx1">
+                  <a:lumMod val="85000"/>
+                  <a:lumOff val="15000"/>
+                </a:schemeClr>
+              </a:solidFill>
+            </a:endParaRPr>
+          </a:p>
+        </p:txBody>
+      </p:sp>
+      <p:sp>
+        <p:nvSpPr>
+          <p:cNvPr id="48" name="Rounded Rectangle 47"/>
+          <p:cNvSpPr/>
+          <p:nvPr/>
+        </p:nvSpPr>
+        <p:spPr>
+          <a:xfrm>
+            <a:off x="3321050" y="5554074"/>
+            <a:ext cx="2514600" cy="944151"/>
+          </a:xfrm>
+          <a:prstGeom prst="roundRect">
+            <a:avLst>
+              <a:gd name="adj" fmla="val 9921"/>
+            </a:avLst>
+          </a:prstGeom>
+          <a:solidFill>
+            <a:schemeClr val="accent4">
+              <a:lumMod val="20000"/>
+              <a:lumOff val="80000"/>
+              <a:alpha val="96000"/>
+            </a:schemeClr>
+          </a:solidFill>
+          <a:ln>
+            <a:solidFill>
+              <a:schemeClr val="accent4">
+                <a:lumMod val="75000"/>
+              </a:schemeClr>
+            </a:solidFill>
+          </a:ln>
+        </p:spPr>
+        <p:style>
+          <a:lnRef idx="1">
+            <a:schemeClr val="accent1"/>
+          </a:lnRef>
+          <a:fillRef idx="3">
+            <a:schemeClr val="accent1"/>
+          </a:fillRef>
+          <a:effectRef idx="2">
+            <a:schemeClr val="accent1"/>
+          </a:effectRef>
+          <a:fontRef idx="minor">
+            <a:schemeClr val="lt1"/>
+          </a:fontRef>
+        </p:style>
+        <p:txBody>
+          <a:bodyPr rtlCol="0" anchor="ctr"/>
+          <a:lstStyle/>
+          <a:p>
+            <a:pPr algn="ctr"/>
+            <a:r>
+              <a:rPr lang="en-US" dirty="0" smtClean="0">
+                <a:solidFill>
+                  <a:schemeClr val="tx1">
+                    <a:lumMod val="85000"/>
+                    <a:lumOff val="15000"/>
+                  </a:schemeClr>
+                </a:solidFill>
+              </a:rPr>
+              <a:t>Upper-Level</a:t>
+            </a:r>
+            <a:br>
+              <a:rPr lang="en-US" dirty="0" smtClean="0">
+                <a:solidFill>
+                  <a:schemeClr val="tx1">
+                    <a:lumMod val="85000"/>
+                    <a:lumOff val="15000"/>
+                  </a:schemeClr>
+                </a:solidFill>
+              </a:rPr>
+            </a:br>
+            <a:r>
+              <a:rPr lang="en-US" dirty="0" smtClean="0">
+                <a:solidFill>
+                  <a:schemeClr val="tx1">
+                    <a:lumMod val="85000"/>
+                    <a:lumOff val="15000"/>
+                  </a:schemeClr>
+                </a:solidFill>
+              </a:rPr>
+              <a:t>Biology</a:t>
+            </a:r>
+            <a:endParaRPr lang="en-US" dirty="0">
+              <a:solidFill>
+                <a:schemeClr val="tx1">
+                  <a:lumMod val="85000"/>
+                  <a:lumOff val="15000"/>
+                </a:schemeClr>
+              </a:solidFill>
+            </a:endParaRPr>
+          </a:p>
+        </p:txBody>
+      </p:sp>
+      <p:sp>
+        <p:nvSpPr>
+          <p:cNvPr id="49" name="Rounded Rectangle 48"/>
+          <p:cNvSpPr/>
+          <p:nvPr/>
+        </p:nvSpPr>
+        <p:spPr>
+          <a:xfrm>
+            <a:off x="3321050" y="3039562"/>
+            <a:ext cx="2514600" cy="2439400"/>
+          </a:xfrm>
+          <a:prstGeom prst="roundRect">
+            <a:avLst>
+              <a:gd name="adj" fmla="val 4064"/>
+            </a:avLst>
+          </a:prstGeom>
+          <a:solidFill>
+            <a:schemeClr val="accent4">
+              <a:lumMod val="20000"/>
+              <a:lumOff val="80000"/>
+              <a:alpha val="96000"/>
+            </a:schemeClr>
+          </a:solidFill>
+          <a:ln>
+            <a:solidFill>
+              <a:schemeClr val="accent4">
+                <a:lumMod val="75000"/>
+              </a:schemeClr>
+            </a:solidFill>
+          </a:ln>
+        </p:spPr>
+        <p:style>
+          <a:lnRef idx="1">
+            <a:schemeClr val="accent1"/>
+          </a:lnRef>
+          <a:fillRef idx="3">
+            <a:schemeClr val="accent1"/>
+          </a:fillRef>
+          <a:effectRef idx="2">
+            <a:schemeClr val="accent1"/>
+          </a:effectRef>
+          <a:fontRef idx="minor">
+            <a:schemeClr val="lt1"/>
+          </a:fontRef>
+        </p:style>
+        <p:txBody>
+          <a:bodyPr rtlCol="0" anchor="t"/>
+          <a:lstStyle/>
+          <a:p>
+            <a:pPr algn="ctr"/>
+            <a:r>
+              <a:rPr lang="en-US" dirty="0" smtClean="0">
+                <a:solidFill>
+                  <a:schemeClr val="tx1">
+                    <a:lumMod val="85000"/>
+                    <a:lumOff val="15000"/>
+                  </a:schemeClr>
+                </a:solidFill>
+              </a:rPr>
+              <a:t>Biology</a:t>
+            </a:r>
+            <a:br>
+              <a:rPr lang="en-US" dirty="0" smtClean="0">
+                <a:solidFill>
+                  <a:schemeClr val="tx1">
+                    <a:lumMod val="85000"/>
+                    <a:lumOff val="15000"/>
+                  </a:schemeClr>
+                </a:solidFill>
+              </a:rPr>
+            </a:br>
+            <a:r>
+              <a:rPr lang="en-US" dirty="0" smtClean="0">
+                <a:solidFill>
+                  <a:schemeClr val="tx1">
+                    <a:lumMod val="85000"/>
+                    <a:lumOff val="15000"/>
+                  </a:schemeClr>
+                </a:solidFill>
+              </a:rPr>
+              <a:t>Core</a:t>
+            </a:r>
+            <a:endParaRPr lang="en-US" dirty="0">
+              <a:solidFill>
+                <a:schemeClr val="tx1">
+                  <a:lumMod val="85000"/>
+                  <a:lumOff val="15000"/>
+                </a:schemeClr>
+              </a:solidFill>
+            </a:endParaRPr>
+          </a:p>
+        </p:txBody>
+      </p:sp>
+      <p:sp>
+        <p:nvSpPr>
+          <p:cNvPr id="50" name="Rounded Rectangle 49"/>
+          <p:cNvSpPr/>
+          <p:nvPr/>
+        </p:nvSpPr>
+        <p:spPr>
+          <a:xfrm>
+            <a:off x="3562350" y="3780249"/>
+            <a:ext cx="2089150" cy="633002"/>
+          </a:xfrm>
+          <a:prstGeom prst="roundRect">
+            <a:avLst>
+              <a:gd name="adj" fmla="val 9921"/>
+            </a:avLst>
+          </a:prstGeom>
+          <a:solidFill>
+            <a:schemeClr val="accent2">
+              <a:lumMod val="40000"/>
+              <a:lumOff val="60000"/>
+              <a:alpha val="96000"/>
+            </a:schemeClr>
+          </a:solidFill>
+          <a:ln>
+            <a:solidFill>
+              <a:schemeClr val="accent2">
+                <a:lumMod val="50000"/>
+              </a:schemeClr>
+            </a:solidFill>
+          </a:ln>
+        </p:spPr>
+        <p:style>
+          <a:lnRef idx="1">
+            <a:schemeClr val="accent1"/>
+          </a:lnRef>
+          <a:fillRef idx="3">
+            <a:schemeClr val="accent1"/>
+          </a:fillRef>
+          <a:effectRef idx="2">
+            <a:schemeClr val="accent1"/>
+          </a:effectRef>
+          <a:fontRef idx="minor">
+            <a:schemeClr val="lt1"/>
+          </a:fontRef>
+        </p:style>
+        <p:txBody>
+          <a:bodyPr rtlCol="0" anchor="ctr"/>
+          <a:lstStyle/>
+          <a:p>
+            <a:pPr algn="ctr"/>
+            <a:r>
+              <a:rPr lang="en-US" dirty="0" smtClean="0">
+                <a:solidFill>
+                  <a:schemeClr val="tx1">
+                    <a:lumMod val="85000"/>
+                    <a:lumOff val="15000"/>
+                  </a:schemeClr>
+                </a:solidFill>
+              </a:rPr>
+              <a:t>Labs</a:t>
+            </a:r>
+            <a:endParaRPr lang="en-US" dirty="0">
+              <a:solidFill>
+                <a:schemeClr val="tx1">
+                  <a:lumMod val="85000"/>
+                  <a:lumOff val="15000"/>
+                </a:schemeClr>
+              </a:solidFill>
+            </a:endParaRPr>
+          </a:p>
+        </p:txBody>
+      </p:sp>
+      <p:sp>
+        <p:nvSpPr>
+          <p:cNvPr id="51" name="Rounded Rectangle 50"/>
+          <p:cNvSpPr/>
+          <p:nvPr/>
+        </p:nvSpPr>
+        <p:spPr>
+          <a:xfrm>
+            <a:off x="3562350" y="4631149"/>
+            <a:ext cx="2089150" cy="633002"/>
+          </a:xfrm>
+          <a:prstGeom prst="roundRect">
+            <a:avLst>
+              <a:gd name="adj" fmla="val 9921"/>
+            </a:avLst>
+          </a:prstGeom>
+          <a:solidFill>
+            <a:srgbClr val="E6B9B8">
+              <a:alpha val="96000"/>
+            </a:srgbClr>
+          </a:solidFill>
+          <a:ln>
+            <a:solidFill>
+              <a:srgbClr val="632523"/>
+            </a:solidFill>
+          </a:ln>
+        </p:spPr>
+        <p:style>
+          <a:lnRef idx="1">
+            <a:schemeClr val="accent1"/>
+          </a:lnRef>
+          <a:fillRef idx="3">
+            <a:schemeClr val="accent1"/>
+          </a:fillRef>
+          <a:effectRef idx="2">
+            <a:schemeClr val="accent1"/>
+          </a:effectRef>
+          <a:fontRef idx="minor">
+            <a:schemeClr val="lt1"/>
+          </a:fontRef>
+        </p:style>
+        <p:txBody>
+          <a:bodyPr rtlCol="0" anchor="ctr"/>
+          <a:lstStyle/>
+          <a:p>
+            <a:pPr algn="ctr"/>
+            <a:r>
+              <a:rPr lang="en-US" dirty="0" smtClean="0">
+                <a:solidFill>
+                  <a:schemeClr val="tx1">
+                    <a:lumMod val="85000"/>
+                    <a:lumOff val="15000"/>
+                  </a:schemeClr>
+                </a:solidFill>
+              </a:rPr>
+              <a:t>Lecture</a:t>
+            </a:r>
+            <a:endParaRPr lang="en-US" dirty="0">
+              <a:solidFill>
+                <a:schemeClr val="tx1">
+                  <a:lumMod val="85000"/>
+                  <a:lumOff val="15000"/>
+                </a:schemeClr>
+              </a:solidFill>
+            </a:endParaRPr>
+          </a:p>
+        </p:txBody>
+      </p:sp>
+      <p:sp>
+        <p:nvSpPr>
+          <p:cNvPr id="20" name="Diamond 19"/>
+          <p:cNvSpPr/>
+          <p:nvPr/>
+        </p:nvSpPr>
+        <p:spPr>
+          <a:xfrm>
+            <a:off x="6537115" y="3984625"/>
+            <a:ext cx="2222500" cy="1381125"/>
+          </a:xfrm>
+          <a:prstGeom prst="diamond">
+            <a:avLst/>
+          </a:prstGeom>
+          <a:solidFill>
+            <a:schemeClr val="accent3">
+              <a:lumMod val="40000"/>
+              <a:lumOff val="60000"/>
+            </a:schemeClr>
+          </a:solidFill>
+          <a:ln>
+            <a:solidFill>
+              <a:schemeClr val="accent3">
+                <a:lumMod val="50000"/>
+              </a:schemeClr>
+            </a:solidFill>
+          </a:ln>
+        </p:spPr>
+        <p:style>
+          <a:lnRef idx="1">
+            <a:schemeClr val="accent1"/>
+          </a:lnRef>
+          <a:fillRef idx="3">
+            <a:schemeClr val="accent1"/>
+          </a:fillRef>
+          <a:effectRef idx="2">
+            <a:schemeClr val="accent1"/>
+          </a:effectRef>
+          <a:fontRef idx="minor">
+            <a:schemeClr val="lt1"/>
+          </a:fontRef>
+        </p:style>
+        <p:txBody>
+          <a:bodyPr rtlCol="0" anchor="ctr"/>
+          <a:lstStyle/>
+          <a:p>
+            <a:pPr algn="ctr"/>
+            <a:r>
+              <a:rPr lang="en-US" dirty="0" smtClean="0">
+                <a:solidFill>
+                  <a:schemeClr val="tx1">
+                    <a:lumMod val="85000"/>
+                    <a:lumOff val="15000"/>
+                  </a:schemeClr>
+                </a:solidFill>
+              </a:rPr>
+              <a:t>Lessons</a:t>
+            </a:r>
+            <a:endParaRPr lang="en-US" dirty="0">
+              <a:solidFill>
+                <a:schemeClr val="tx1">
+                  <a:lumMod val="85000"/>
+                  <a:lumOff val="15000"/>
+                </a:schemeClr>
+              </a:solidFill>
+            </a:endParaRPr>
+          </a:p>
+        </p:txBody>
+      </p:sp>
+      <p:sp>
+        <p:nvSpPr>
+          <p:cNvPr id="52" name="Diamond 51"/>
+          <p:cNvSpPr/>
+          <p:nvPr/>
+        </p:nvSpPr>
+        <p:spPr>
+          <a:xfrm>
+            <a:off x="6537115" y="2458449"/>
+            <a:ext cx="2222500" cy="1381125"/>
+          </a:xfrm>
+          <a:prstGeom prst="diamond">
+            <a:avLst/>
+          </a:prstGeom>
+          <a:solidFill>
+            <a:schemeClr val="accent3">
+              <a:lumMod val="40000"/>
+              <a:lumOff val="60000"/>
+            </a:schemeClr>
+          </a:solidFill>
+          <a:ln>
+            <a:solidFill>
+              <a:schemeClr val="accent3">
+                <a:lumMod val="50000"/>
+              </a:schemeClr>
+            </a:solidFill>
+          </a:ln>
+        </p:spPr>
+        <p:style>
+          <a:lnRef idx="1">
+            <a:schemeClr val="accent1"/>
+          </a:lnRef>
+          <a:fillRef idx="3">
+            <a:schemeClr val="accent1"/>
+          </a:fillRef>
+          <a:effectRef idx="2">
+            <a:schemeClr val="accent1"/>
+          </a:effectRef>
+          <a:fontRef idx="minor">
+            <a:schemeClr val="lt1"/>
+          </a:fontRef>
+        </p:style>
+        <p:txBody>
+          <a:bodyPr rtlCol="0" anchor="ctr"/>
+          <a:lstStyle/>
+          <a:p>
+            <a:pPr algn="ctr"/>
+            <a:r>
+              <a:rPr lang="en-US" dirty="0" smtClean="0">
+                <a:solidFill>
+                  <a:schemeClr val="tx1">
+                    <a:lumMod val="85000"/>
+                    <a:lumOff val="15000"/>
+                  </a:schemeClr>
+                </a:solidFill>
+              </a:rPr>
+              <a:t>Modules</a:t>
+            </a:r>
+            <a:endParaRPr lang="en-US" dirty="0">
+              <a:solidFill>
+                <a:schemeClr val="tx1">
+                  <a:lumMod val="85000"/>
+                  <a:lumOff val="15000"/>
+                </a:schemeClr>
+              </a:solidFill>
+            </a:endParaRPr>
+          </a:p>
+        </p:txBody>
+      </p:sp>
+      <p:cxnSp>
+        <p:nvCxnSpPr>
+          <p:cNvPr id="54" name="Elbow Connector 53"/>
+          <p:cNvCxnSpPr>
+            <a:stCxn id="20" idx="1"/>
+            <a:endCxn id="49" idx="3"/>
+          </p:cNvCxnSpPr>
+          <p:nvPr/>
+        </p:nvCxnSpPr>
+        <p:spPr>
+          <a:xfrm rot="10800000">
+            <a:off x="5835651" y="4259262"/>
+            <a:ext cx="701465" cy="415926"/>
+          </a:xfrm>
+          <a:prstGeom prst="bentConnector3">
+            <a:avLst/>
+          </a:prstGeom>
+          <a:ln>
+            <a:solidFill>
+              <a:schemeClr val="tx1">
+                <a:lumMod val="85000"/>
+                <a:lumOff val="15000"/>
+              </a:schemeClr>
+            </a:solidFill>
+            <a:tailEnd type="arrow"/>
+          </a:ln>
+        </p:spPr>
+        <p:style>
+          <a:lnRef idx="2">
+            <a:schemeClr val="accent1"/>
+          </a:lnRef>
+          <a:fillRef idx="0">
+            <a:schemeClr val="accent1"/>
+          </a:fillRef>
+          <a:effectRef idx="1">
+            <a:schemeClr val="accent1"/>
+          </a:effectRef>
+          <a:fontRef idx="minor">
+            <a:schemeClr val="tx1"/>
+          </a:fontRef>
+        </p:style>
+      </p:cxnSp>
+      <p:cxnSp>
+        <p:nvCxnSpPr>
+          <p:cNvPr id="57" name="Elbow Connector 56"/>
+          <p:cNvCxnSpPr>
+            <a:stCxn id="20" idx="1"/>
+            <a:endCxn id="48" idx="3"/>
+          </p:cNvCxnSpPr>
+          <p:nvPr/>
+        </p:nvCxnSpPr>
+        <p:spPr>
+          <a:xfrm rot="10800000" flipV="1">
+            <a:off x="5835651" y="4675188"/>
+            <a:ext cx="701465" cy="1350962"/>
+          </a:xfrm>
+          <a:prstGeom prst="bentConnector3">
+            <a:avLst/>
+          </a:prstGeom>
+          <a:ln>
+            <a:solidFill>
+              <a:schemeClr val="tx1">
+                <a:lumMod val="85000"/>
+                <a:lumOff val="15000"/>
+              </a:schemeClr>
+            </a:solidFill>
+            <a:tailEnd type="arrow"/>
+          </a:ln>
+        </p:spPr>
+        <p:style>
+          <a:lnRef idx="2">
+            <a:schemeClr val="accent1"/>
+          </a:lnRef>
+          <a:fillRef idx="0">
+            <a:schemeClr val="accent1"/>
+          </a:fillRef>
+          <a:effectRef idx="1">
+            <a:schemeClr val="accent1"/>
+          </a:effectRef>
+          <a:fontRef idx="minor">
+            <a:schemeClr val="tx1"/>
+          </a:fontRef>
+        </p:style>
+      </p:cxnSp>
+      <p:cxnSp>
+        <p:nvCxnSpPr>
+          <p:cNvPr id="59" name="Elbow Connector 58"/>
+          <p:cNvCxnSpPr>
+            <a:stCxn id="52" idx="1"/>
+            <a:endCxn id="42" idx="3"/>
+          </p:cNvCxnSpPr>
+          <p:nvPr/>
+        </p:nvCxnSpPr>
+        <p:spPr>
+          <a:xfrm rot="10800000">
+            <a:off x="5835651" y="2492376"/>
+            <a:ext cx="701465" cy="656637"/>
+          </a:xfrm>
+          <a:prstGeom prst="bentConnector3">
+            <a:avLst/>
+          </a:prstGeom>
+          <a:ln>
+            <a:solidFill>
+              <a:schemeClr val="tx1">
+                <a:lumMod val="85000"/>
+                <a:lumOff val="15000"/>
+              </a:schemeClr>
+            </a:solidFill>
+            <a:tailEnd type="arrow"/>
+          </a:ln>
+        </p:spPr>
+        <p:style>
+          <a:lnRef idx="2">
+            <a:schemeClr val="accent1"/>
+          </a:lnRef>
+          <a:fillRef idx="0">
+            <a:schemeClr val="accent1"/>
+          </a:fillRef>
+          <a:effectRef idx="1">
+            <a:schemeClr val="accent1"/>
+          </a:effectRef>
+          <a:fontRef idx="minor">
+            <a:schemeClr val="tx1"/>
+          </a:fontRef>
+        </p:style>
+      </p:cxnSp>
+      <p:cxnSp>
+        <p:nvCxnSpPr>
+          <p:cNvPr id="62" name="Elbow Connector 61"/>
+          <p:cNvCxnSpPr>
+            <a:stCxn id="52" idx="1"/>
+            <a:endCxn id="49" idx="3"/>
+          </p:cNvCxnSpPr>
+          <p:nvPr/>
+        </p:nvCxnSpPr>
+        <p:spPr>
+          <a:xfrm rot="10800000" flipV="1">
+            <a:off x="5835651" y="3149012"/>
+            <a:ext cx="701465" cy="1110250"/>
+          </a:xfrm>
+          <a:prstGeom prst="bentConnector3">
+            <a:avLst>
+              <a:gd name="adj1" fmla="val 50000"/>
+            </a:avLst>
+          </a:prstGeom>
+          <a:ln>
+            <a:solidFill>
+              <a:schemeClr val="tx1">
+                <a:lumMod val="85000"/>
+                <a:lumOff val="15000"/>
+              </a:schemeClr>
+            </a:solidFill>
+            <a:tailEnd type="arrow"/>
+          </a:ln>
+        </p:spPr>
+        <p:style>
+          <a:lnRef idx="2">
+            <a:schemeClr val="accent1"/>
+          </a:lnRef>
+          <a:fillRef idx="0">
+            <a:schemeClr val="accent1"/>
+          </a:fillRef>
+          <a:effectRef idx="1">
+            <a:schemeClr val="accent1"/>
+          </a:effectRef>
+          <a:fontRef idx="minor">
+            <a:schemeClr val="tx1"/>
+          </a:fontRef>
+        </p:style>
+      </p:cxnSp>
+      <p:sp>
+        <p:nvSpPr>
+          <p:cNvPr id="65" name="Oval 64"/>
+          <p:cNvSpPr/>
+          <p:nvPr/>
+        </p:nvSpPr>
+        <p:spPr>
+          <a:xfrm>
+            <a:off x="449262" y="2847191"/>
+            <a:ext cx="2089570" cy="1079500"/>
+          </a:xfrm>
+          <a:prstGeom prst="ellipse">
+            <a:avLst/>
+          </a:prstGeom>
+          <a:solidFill>
+            <a:schemeClr val="accent6">
+              <a:lumMod val="60000"/>
+              <a:lumOff val="40000"/>
+            </a:schemeClr>
+          </a:solidFill>
+          <a:ln>
+            <a:solidFill>
+              <a:schemeClr val="accent6">
+                <a:lumMod val="50000"/>
+              </a:schemeClr>
+            </a:solidFill>
+          </a:ln>
+        </p:spPr>
+        <p:style>
+          <a:lnRef idx="1">
+            <a:schemeClr val="accent1"/>
+          </a:lnRef>
+          <a:fillRef idx="3">
+            <a:schemeClr val="accent1"/>
+          </a:fillRef>
+          <a:effectRef idx="2">
+            <a:schemeClr val="accent1"/>
+          </a:effectRef>
+          <a:fontRef idx="minor">
+            <a:schemeClr val="lt1"/>
+          </a:fontRef>
+        </p:style>
+        <p:txBody>
+          <a:bodyPr rtlCol="0" anchor="ctr"/>
+          <a:lstStyle/>
+          <a:p>
+            <a:pPr algn="ctr"/>
+            <a:r>
+              <a:rPr lang="en-US" dirty="0" smtClean="0">
+                <a:solidFill>
+                  <a:schemeClr val="tx1">
+                    <a:lumMod val="85000"/>
+                    <a:lumOff val="15000"/>
+                  </a:schemeClr>
+                </a:solidFill>
+              </a:rPr>
+              <a:t>Online Courses</a:t>
+            </a:r>
+            <a:endParaRPr lang="en-US" dirty="0">
+              <a:solidFill>
+                <a:schemeClr val="tx1">
+                  <a:lumMod val="85000"/>
+                  <a:lumOff val="15000"/>
+                </a:schemeClr>
+              </a:solidFill>
+            </a:endParaRPr>
+          </a:p>
+        </p:txBody>
+      </p:sp>
+      <p:sp>
+        <p:nvSpPr>
+          <p:cNvPr id="66" name="Oval 65"/>
+          <p:cNvSpPr/>
+          <p:nvPr/>
+        </p:nvSpPr>
+        <p:spPr>
+          <a:xfrm>
+            <a:off x="450430" y="4082658"/>
+            <a:ext cx="2089570" cy="1079500"/>
+          </a:xfrm>
+          <a:prstGeom prst="ellipse">
+            <a:avLst/>
+          </a:prstGeom>
+          <a:solidFill>
+            <a:schemeClr val="accent6">
+              <a:lumMod val="60000"/>
+              <a:lumOff val="40000"/>
+            </a:schemeClr>
+          </a:solidFill>
+          <a:ln>
+            <a:solidFill>
+              <a:schemeClr val="accent6">
+                <a:lumMod val="50000"/>
+              </a:schemeClr>
+            </a:solidFill>
+          </a:ln>
+        </p:spPr>
+        <p:style>
+          <a:lnRef idx="1">
+            <a:schemeClr val="accent1"/>
+          </a:lnRef>
+          <a:fillRef idx="3">
+            <a:schemeClr val="accent1"/>
+          </a:fillRef>
+          <a:effectRef idx="2">
+            <a:schemeClr val="accent1"/>
+          </a:effectRef>
+          <a:fontRef idx="minor">
+            <a:schemeClr val="lt1"/>
+          </a:fontRef>
+        </p:style>
+        <p:txBody>
+          <a:bodyPr rtlCol="0" anchor="ctr"/>
+          <a:lstStyle/>
+          <a:p>
+            <a:pPr algn="ctr"/>
+            <a:r>
+              <a:rPr lang="en-US" dirty="0" smtClean="0">
+                <a:solidFill>
+                  <a:schemeClr val="tx1">
+                    <a:lumMod val="85000"/>
+                    <a:lumOff val="15000"/>
+                  </a:schemeClr>
+                </a:solidFill>
+              </a:rPr>
+              <a:t>Online Collaborative Activities</a:t>
+            </a:r>
+            <a:endParaRPr lang="en-US" dirty="0">
+              <a:solidFill>
+                <a:schemeClr val="tx1">
+                  <a:lumMod val="85000"/>
+                  <a:lumOff val="15000"/>
+                </a:schemeClr>
+              </a:solidFill>
+            </a:endParaRPr>
+          </a:p>
+        </p:txBody>
+      </p:sp>
+      <p:sp>
+        <p:nvSpPr>
+          <p:cNvPr id="67" name="Oval 66"/>
+          <p:cNvSpPr/>
+          <p:nvPr/>
+        </p:nvSpPr>
+        <p:spPr>
+          <a:xfrm>
+            <a:off x="449262" y="5318125"/>
+            <a:ext cx="2089570" cy="1079500"/>
+          </a:xfrm>
+          <a:prstGeom prst="ellipse">
+            <a:avLst/>
+          </a:prstGeom>
+          <a:solidFill>
+            <a:schemeClr val="accent6">
+              <a:lumMod val="60000"/>
+              <a:lumOff val="40000"/>
+            </a:schemeClr>
+          </a:solidFill>
+          <a:ln>
+            <a:solidFill>
+              <a:schemeClr val="accent6">
+                <a:lumMod val="50000"/>
+              </a:schemeClr>
+            </a:solidFill>
+          </a:ln>
+        </p:spPr>
+        <p:style>
+          <a:lnRef idx="1">
+            <a:schemeClr val="accent1"/>
+          </a:lnRef>
+          <a:fillRef idx="3">
+            <a:schemeClr val="accent1"/>
+          </a:fillRef>
+          <a:effectRef idx="2">
+            <a:schemeClr val="accent1"/>
+          </a:effectRef>
+          <a:fontRef idx="minor">
+            <a:schemeClr val="lt1"/>
+          </a:fontRef>
+        </p:style>
+        <p:txBody>
+          <a:bodyPr rtlCol="0" anchor="ctr"/>
+          <a:lstStyle/>
+          <a:p>
+            <a:pPr algn="ctr"/>
+            <a:r>
+              <a:rPr lang="en-US" dirty="0" smtClean="0">
+                <a:solidFill>
+                  <a:schemeClr val="tx1">
+                    <a:lumMod val="85000"/>
+                    <a:lumOff val="15000"/>
+                  </a:schemeClr>
+                </a:solidFill>
+              </a:rPr>
+              <a:t>Workshops</a:t>
+            </a:r>
+            <a:endParaRPr lang="en-US" dirty="0">
+              <a:solidFill>
+                <a:schemeClr val="tx1">
+                  <a:lumMod val="85000"/>
+                  <a:lumOff val="15000"/>
+                </a:schemeClr>
+              </a:solidFill>
+            </a:endParaRPr>
+          </a:p>
+        </p:txBody>
+      </p:sp>
+      <p:sp>
+        <p:nvSpPr>
+          <p:cNvPr id="68" name="Oval 67"/>
+          <p:cNvSpPr/>
+          <p:nvPr/>
+        </p:nvSpPr>
+        <p:spPr>
+          <a:xfrm>
+            <a:off x="449262" y="1611724"/>
+            <a:ext cx="2089570" cy="1079500"/>
+          </a:xfrm>
+          <a:prstGeom prst="ellipse">
+            <a:avLst/>
+          </a:prstGeom>
+          <a:solidFill>
+            <a:schemeClr val="accent6">
+              <a:lumMod val="60000"/>
+              <a:lumOff val="40000"/>
+            </a:schemeClr>
+          </a:solidFill>
+          <a:ln>
+            <a:solidFill>
+              <a:schemeClr val="accent6">
+                <a:lumMod val="50000"/>
+              </a:schemeClr>
+            </a:solidFill>
+          </a:ln>
+        </p:spPr>
+        <p:style>
+          <a:lnRef idx="1">
+            <a:schemeClr val="accent1"/>
+          </a:lnRef>
+          <a:fillRef idx="3">
+            <a:schemeClr val="accent1"/>
+          </a:fillRef>
+          <a:effectRef idx="2">
+            <a:schemeClr val="accent1"/>
+          </a:effectRef>
+          <a:fontRef idx="minor">
+            <a:schemeClr val="lt1"/>
+          </a:fontRef>
+        </p:style>
+        <p:txBody>
+          <a:bodyPr rtlCol="0" anchor="ctr"/>
+          <a:lstStyle/>
+          <a:p>
+            <a:pPr algn="ctr"/>
+            <a:r>
+              <a:rPr lang="en-US" dirty="0" smtClean="0">
+                <a:solidFill>
+                  <a:schemeClr val="tx1">
+                    <a:lumMod val="85000"/>
+                    <a:lumOff val="15000"/>
+                  </a:schemeClr>
+                </a:solidFill>
+              </a:rPr>
+              <a:t>Short Courses</a:t>
+            </a:r>
+            <a:endParaRPr lang="en-US" dirty="0">
+              <a:solidFill>
+                <a:schemeClr val="tx1">
+                  <a:lumMod val="85000"/>
+                  <a:lumOff val="15000"/>
+                </a:schemeClr>
+              </a:solidFill>
+            </a:endParaRPr>
+          </a:p>
+        </p:txBody>
+      </p:sp>
+    </p:spTree>
+    <p:extLst>
+      <p:ext uri="{BB962C8B-B14F-4D97-AF65-F5344CB8AC3E}">
+        <p14:creationId xmlns:p14="http://schemas.microsoft.com/office/powerpoint/2010/main" val="2722885221"/>
+      </p:ext>
+    </p:extLst>
+  </p:cSld>
+  <p:clrMapOvr>
+    <a:masterClrMapping/>
+  </p:clrMapOvr>
+  <p:timing>
+    <p:tnLst>
+      <p:par>
+        <p:cTn xmlns:p14="http://schemas.microsoft.com/office/powerpoint/2010/main" id="1" dur="indefinite" restart="never" nodeType="tmRoot"/>
+      </p:par>
+    </p:tnLst>
+  </p:timing>
+</p:sld>
+</file>
+
+<file path=ppt/slides/slide3.xml><?xml version="1.0" encoding="utf-8"?>
+<p:sld xmlns:a="http://schemas.openxmlformats.org/drawingml/2006/main" xmlns:r="http://schemas.openxmlformats.org/officeDocument/2006/relationships" xmlns:p="http://schemas.openxmlformats.org/presentationml/2006/main">
+  <p:cSld>
+    <p:spTree>
+      <p:nvGrpSpPr>
+        <p:cNvPr id="1" name=""/>
+        <p:cNvGrpSpPr/>
+        <p:nvPr/>
+      </p:nvGrpSpPr>
+      <p:grpSpPr>
+        <a:xfrm>
+          <a:off x="0" y="0"/>
+          <a:ext cx="0" cy="0"/>
+          <a:chOff x="0" y="0"/>
+          <a:chExt cx="0" cy="0"/>
+        </a:xfrm>
+      </p:grpSpPr>
+      <p:sp>
+        <p:nvSpPr>
+          <p:cNvPr id="19" name="Rounded Rectangle 18"/>
+          <p:cNvSpPr/>
+          <p:nvPr/>
+        </p:nvSpPr>
+        <p:spPr>
+          <a:xfrm>
+            <a:off x="6167438" y="1462499"/>
+            <a:ext cx="2651125" cy="5166901"/>
+          </a:xfrm>
+          <a:prstGeom prst="roundRect">
+            <a:avLst>
+              <a:gd name="adj" fmla="val 4048"/>
+            </a:avLst>
+          </a:prstGeom>
+          <a:solidFill>
+            <a:schemeClr val="accent5">
+              <a:lumMod val="20000"/>
+              <a:lumOff val="80000"/>
+            </a:schemeClr>
+          </a:solidFill>
+          <a:ln>
+            <a:solidFill>
+              <a:schemeClr val="accent5">
+                <a:lumMod val="50000"/>
+              </a:schemeClr>
+            </a:solidFill>
+          </a:ln>
+        </p:spPr>
+        <p:style>
+          <a:lnRef idx="1">
+            <a:schemeClr val="accent1"/>
+          </a:lnRef>
+          <a:fillRef idx="3">
+            <a:schemeClr val="accent1"/>
+          </a:fillRef>
+          <a:effectRef idx="2">
+            <a:schemeClr val="accent1"/>
+          </a:effectRef>
+          <a:fontRef idx="minor">
+            <a:schemeClr val="lt1"/>
+          </a:fontRef>
+        </p:style>
+        <p:txBody>
+          <a:bodyPr rtlCol="0" anchor="t"/>
+          <a:lstStyle/>
+          <a:p>
+            <a:pPr algn="ctr"/>
+            <a:r>
+              <a:rPr lang="en-US" sz="2600" b="1" dirty="0" smtClean="0">
+                <a:solidFill>
+                  <a:schemeClr val="tx1">
+                    <a:lumMod val="85000"/>
+                    <a:lumOff val="15000"/>
+                  </a:schemeClr>
+                </a:solidFill>
+              </a:rPr>
+              <a:t>Non-Curricula</a:t>
+            </a:r>
+            <a:endParaRPr lang="en-US" sz="2600" b="1" dirty="0">
+              <a:solidFill>
+                <a:schemeClr val="tx1">
+                  <a:lumMod val="85000"/>
+                  <a:lumOff val="15000"/>
+                </a:schemeClr>
+              </a:solidFill>
+            </a:endParaRPr>
+          </a:p>
+        </p:txBody>
+      </p:sp>
+      <p:sp>
+        <p:nvSpPr>
+          <p:cNvPr id="65" name="Oval 64"/>
+          <p:cNvSpPr/>
+          <p:nvPr/>
+        </p:nvSpPr>
+        <p:spPr>
+          <a:xfrm>
+            <a:off x="6481762" y="3299216"/>
+            <a:ext cx="2089570" cy="929099"/>
+          </a:xfrm>
+          <a:prstGeom prst="ellipse">
+            <a:avLst/>
+          </a:prstGeom>
+          <a:solidFill>
+            <a:schemeClr val="accent6">
+              <a:lumMod val="60000"/>
+              <a:lumOff val="40000"/>
+            </a:schemeClr>
+          </a:solidFill>
+          <a:ln>
+            <a:solidFill>
+              <a:schemeClr val="accent6">
+                <a:lumMod val="50000"/>
+              </a:schemeClr>
+            </a:solidFill>
+          </a:ln>
+        </p:spPr>
+        <p:style>
+          <a:lnRef idx="1">
+            <a:schemeClr val="accent1"/>
+          </a:lnRef>
+          <a:fillRef idx="3">
+            <a:schemeClr val="accent1"/>
+          </a:fillRef>
+          <a:effectRef idx="2">
+            <a:schemeClr val="accent1"/>
+          </a:effectRef>
+          <a:fontRef idx="minor">
+            <a:schemeClr val="lt1"/>
+          </a:fontRef>
+        </p:style>
+        <p:txBody>
+          <a:bodyPr rtlCol="0" anchor="ctr"/>
+          <a:lstStyle/>
+          <a:p>
+            <a:pPr algn="ctr"/>
+            <a:r>
+              <a:rPr lang="en-US" dirty="0" smtClean="0">
+                <a:solidFill>
+                  <a:schemeClr val="tx1">
+                    <a:lumMod val="85000"/>
+                    <a:lumOff val="15000"/>
+                  </a:schemeClr>
+                </a:solidFill>
+              </a:rPr>
+              <a:t>Online Courses</a:t>
+            </a:r>
+            <a:endParaRPr lang="en-US" dirty="0">
+              <a:solidFill>
+                <a:schemeClr val="tx1">
+                  <a:lumMod val="85000"/>
+                  <a:lumOff val="15000"/>
+                </a:schemeClr>
+              </a:solidFill>
+            </a:endParaRPr>
+          </a:p>
+        </p:txBody>
+      </p:sp>
+      <p:sp>
+        <p:nvSpPr>
+          <p:cNvPr id="66" name="Oval 65"/>
+          <p:cNvSpPr/>
+          <p:nvPr/>
+        </p:nvSpPr>
+        <p:spPr>
+          <a:xfrm>
+            <a:off x="6482930" y="4423558"/>
+            <a:ext cx="2089570" cy="929099"/>
+          </a:xfrm>
+          <a:prstGeom prst="ellipse">
+            <a:avLst/>
+          </a:prstGeom>
+          <a:solidFill>
+            <a:schemeClr val="accent6">
+              <a:lumMod val="60000"/>
+              <a:lumOff val="40000"/>
+            </a:schemeClr>
+          </a:solidFill>
+          <a:ln>
+            <a:solidFill>
+              <a:schemeClr val="accent6">
+                <a:lumMod val="50000"/>
+              </a:schemeClr>
+            </a:solidFill>
+          </a:ln>
+        </p:spPr>
+        <p:style>
+          <a:lnRef idx="1">
+            <a:schemeClr val="accent1"/>
+          </a:lnRef>
+          <a:fillRef idx="3">
+            <a:schemeClr val="accent1"/>
+          </a:fillRef>
+          <a:effectRef idx="2">
+            <a:schemeClr val="accent1"/>
+          </a:effectRef>
+          <a:fontRef idx="minor">
+            <a:schemeClr val="lt1"/>
+          </a:fontRef>
+        </p:style>
+        <p:txBody>
+          <a:bodyPr rtlCol="0" anchor="ctr"/>
+          <a:lstStyle/>
+          <a:p>
+            <a:pPr algn="ctr"/>
+            <a:r>
+              <a:rPr lang="en-US" dirty="0" smtClean="0">
+                <a:solidFill>
+                  <a:schemeClr val="tx1">
+                    <a:lumMod val="85000"/>
+                    <a:lumOff val="15000"/>
+                  </a:schemeClr>
+                </a:solidFill>
+              </a:rPr>
+              <a:t>Online Collaborative Activities</a:t>
+            </a:r>
+            <a:endParaRPr lang="en-US" dirty="0">
+              <a:solidFill>
+                <a:schemeClr val="tx1">
+                  <a:lumMod val="85000"/>
+                  <a:lumOff val="15000"/>
+                </a:schemeClr>
+              </a:solidFill>
+            </a:endParaRPr>
+          </a:p>
+        </p:txBody>
+      </p:sp>
+      <p:sp>
+        <p:nvSpPr>
+          <p:cNvPr id="67" name="Oval 66"/>
+          <p:cNvSpPr/>
+          <p:nvPr/>
+        </p:nvSpPr>
+        <p:spPr>
+          <a:xfrm>
+            <a:off x="6481762" y="5547900"/>
+            <a:ext cx="2089570" cy="929099"/>
+          </a:xfrm>
+          <a:prstGeom prst="ellipse">
+            <a:avLst/>
+          </a:prstGeom>
+          <a:solidFill>
+            <a:schemeClr val="accent6">
+              <a:lumMod val="60000"/>
+              <a:lumOff val="40000"/>
+            </a:schemeClr>
+          </a:solidFill>
+          <a:ln>
+            <a:solidFill>
+              <a:schemeClr val="accent6">
+                <a:lumMod val="50000"/>
+              </a:schemeClr>
+            </a:solidFill>
+          </a:ln>
+        </p:spPr>
+        <p:style>
+          <a:lnRef idx="1">
+            <a:schemeClr val="accent1"/>
+          </a:lnRef>
+          <a:fillRef idx="3">
+            <a:schemeClr val="accent1"/>
+          </a:fillRef>
+          <a:effectRef idx="2">
+            <a:schemeClr val="accent1"/>
+          </a:effectRef>
+          <a:fontRef idx="minor">
+            <a:schemeClr val="lt1"/>
+          </a:fontRef>
+        </p:style>
+        <p:txBody>
+          <a:bodyPr rtlCol="0" anchor="ctr"/>
+          <a:lstStyle/>
+          <a:p>
+            <a:pPr algn="ctr"/>
+            <a:r>
+              <a:rPr lang="en-US" dirty="0" smtClean="0">
+                <a:solidFill>
+                  <a:schemeClr val="tx1">
+                    <a:lumMod val="85000"/>
+                    <a:lumOff val="15000"/>
+                  </a:schemeClr>
+                </a:solidFill>
+              </a:rPr>
+              <a:t>Workshops</a:t>
+            </a:r>
+            <a:endParaRPr lang="en-US" dirty="0">
+              <a:solidFill>
+                <a:schemeClr val="tx1">
+                  <a:lumMod val="85000"/>
+                  <a:lumOff val="15000"/>
+                </a:schemeClr>
+              </a:solidFill>
+            </a:endParaRPr>
+          </a:p>
+        </p:txBody>
+      </p:sp>
+      <p:sp>
+        <p:nvSpPr>
+          <p:cNvPr id="68" name="Oval 67"/>
+          <p:cNvSpPr/>
+          <p:nvPr/>
+        </p:nvSpPr>
+        <p:spPr>
+          <a:xfrm>
+            <a:off x="6481762" y="2174874"/>
+            <a:ext cx="2089570" cy="929099"/>
+          </a:xfrm>
+          <a:prstGeom prst="ellipse">
+            <a:avLst/>
+          </a:prstGeom>
+          <a:solidFill>
+            <a:schemeClr val="accent6">
+              <a:lumMod val="60000"/>
+              <a:lumOff val="40000"/>
+            </a:schemeClr>
+          </a:solidFill>
+          <a:ln>
+            <a:solidFill>
+              <a:schemeClr val="accent6">
+                <a:lumMod val="50000"/>
+              </a:schemeClr>
+            </a:solidFill>
+          </a:ln>
+        </p:spPr>
+        <p:style>
+          <a:lnRef idx="1">
+            <a:schemeClr val="accent1"/>
+          </a:lnRef>
+          <a:fillRef idx="3">
+            <a:schemeClr val="accent1"/>
+          </a:fillRef>
+          <a:effectRef idx="2">
+            <a:schemeClr val="accent1"/>
+          </a:effectRef>
+          <a:fontRef idx="minor">
+            <a:schemeClr val="lt1"/>
+          </a:fontRef>
+        </p:style>
+        <p:txBody>
+          <a:bodyPr rtlCol="0" anchor="ctr"/>
+          <a:lstStyle/>
+          <a:p>
+            <a:pPr algn="ctr"/>
+            <a:r>
+              <a:rPr lang="en-US" dirty="0" smtClean="0">
+                <a:solidFill>
+                  <a:schemeClr val="tx1">
+                    <a:lumMod val="85000"/>
+                    <a:lumOff val="15000"/>
+                  </a:schemeClr>
+                </a:solidFill>
+              </a:rPr>
+              <a:t>Short Courses</a:t>
+            </a:r>
+            <a:endParaRPr lang="en-US" dirty="0">
+              <a:solidFill>
+                <a:schemeClr val="tx1">
+                  <a:lumMod val="85000"/>
+                  <a:lumOff val="15000"/>
+                </a:schemeClr>
+              </a:solidFill>
+            </a:endParaRPr>
+          </a:p>
+        </p:txBody>
+      </p:sp>
+      <p:sp>
+        <p:nvSpPr>
+          <p:cNvPr id="2" name="Title 1"/>
+          <p:cNvSpPr>
+            <a:spLocks noGrp="1"/>
+          </p:cNvSpPr>
+          <p:nvPr>
+            <p:ph type="ctrTitle"/>
+          </p:nvPr>
+        </p:nvSpPr>
+        <p:spPr>
+          <a:xfrm>
+            <a:off x="542715" y="-48801"/>
+            <a:ext cx="7772400" cy="1470025"/>
+          </a:xfrm>
+        </p:spPr>
+        <p:txBody>
+          <a:bodyPr>
+            <a:normAutofit/>
+          </a:bodyPr>
+          <a:lstStyle/>
+          <a:p>
+            <a:r>
+              <a:rPr lang="en-US" sz="2800" dirty="0" smtClean="0"/>
+              <a:t>The space of data-intensive education for environmental science</a:t>
+            </a:r>
+            <a:endParaRPr lang="en-US" sz="2800" dirty="0"/>
+          </a:p>
+        </p:txBody>
+      </p:sp>
+      <p:sp>
+        <p:nvSpPr>
+          <p:cNvPr id="3" name="Rounded Rectangle 2"/>
+          <p:cNvSpPr/>
+          <p:nvPr/>
+        </p:nvSpPr>
+        <p:spPr>
+          <a:xfrm>
+            <a:off x="363538" y="1421224"/>
+            <a:ext cx="2651125" cy="5166901"/>
+          </a:xfrm>
+          <a:prstGeom prst="roundRect">
+            <a:avLst>
+              <a:gd name="adj" fmla="val 4048"/>
+            </a:avLst>
+          </a:prstGeom>
+          <a:solidFill>
+            <a:schemeClr val="accent5">
+              <a:lumMod val="20000"/>
+              <a:lumOff val="80000"/>
+            </a:schemeClr>
+          </a:solidFill>
+          <a:ln>
+            <a:solidFill>
+              <a:schemeClr val="accent5">
+                <a:lumMod val="50000"/>
+              </a:schemeClr>
+            </a:solidFill>
+          </a:ln>
+        </p:spPr>
+        <p:style>
+          <a:lnRef idx="1">
+            <a:schemeClr val="accent1"/>
+          </a:lnRef>
+          <a:fillRef idx="3">
+            <a:schemeClr val="accent1"/>
+          </a:fillRef>
+          <a:effectRef idx="2">
+            <a:schemeClr val="accent1"/>
+          </a:effectRef>
+          <a:fontRef idx="minor">
+            <a:schemeClr val="lt1"/>
+          </a:fontRef>
+        </p:style>
+        <p:txBody>
+          <a:bodyPr rtlCol="0" anchor="t"/>
+          <a:lstStyle/>
+          <a:p>
+            <a:pPr algn="ctr"/>
+            <a:r>
+              <a:rPr lang="en-US" sz="2600" b="1" dirty="0" smtClean="0">
+                <a:solidFill>
+                  <a:schemeClr val="tx1">
+                    <a:lumMod val="85000"/>
+                    <a:lumOff val="15000"/>
+                  </a:schemeClr>
+                </a:solidFill>
+              </a:rPr>
+              <a:t>Curricula</a:t>
+            </a:r>
+            <a:endParaRPr lang="en-US" sz="2600" b="1" dirty="0">
+              <a:solidFill>
+                <a:schemeClr val="tx1">
+                  <a:lumMod val="85000"/>
+                  <a:lumOff val="15000"/>
+                </a:schemeClr>
+              </a:solidFill>
+            </a:endParaRPr>
+          </a:p>
+        </p:txBody>
+      </p:sp>
+      <p:sp>
+        <p:nvSpPr>
+          <p:cNvPr id="42" name="Rounded Rectangle 41"/>
+          <p:cNvSpPr/>
+          <p:nvPr/>
+        </p:nvSpPr>
+        <p:spPr>
+          <a:xfrm>
+            <a:off x="431800" y="2020299"/>
+            <a:ext cx="2514600" cy="944151"/>
+          </a:xfrm>
+          <a:prstGeom prst="roundRect">
+            <a:avLst>
+              <a:gd name="adj" fmla="val 9921"/>
+            </a:avLst>
+          </a:prstGeom>
+          <a:solidFill>
+            <a:schemeClr val="accent4">
+              <a:lumMod val="20000"/>
+              <a:lumOff val="80000"/>
+              <a:alpha val="96000"/>
+            </a:schemeClr>
+          </a:solidFill>
+          <a:ln>
+            <a:solidFill>
+              <a:schemeClr val="accent4">
+                <a:lumMod val="75000"/>
+              </a:schemeClr>
+            </a:solidFill>
+          </a:ln>
+        </p:spPr>
+        <p:style>
+          <a:lnRef idx="1">
+            <a:schemeClr val="accent1"/>
+          </a:lnRef>
+          <a:fillRef idx="3">
+            <a:schemeClr val="accent1"/>
+          </a:fillRef>
+          <a:effectRef idx="2">
+            <a:schemeClr val="accent1"/>
+          </a:effectRef>
+          <a:fontRef idx="minor">
+            <a:schemeClr val="lt1"/>
+          </a:fontRef>
+        </p:style>
+        <p:txBody>
+          <a:bodyPr rtlCol="0" anchor="ctr"/>
+          <a:lstStyle/>
+          <a:p>
+            <a:pPr algn="ctr"/>
+            <a:r>
+              <a:rPr lang="en-US" dirty="0" smtClean="0">
+                <a:solidFill>
+                  <a:schemeClr val="tx1">
+                    <a:lumMod val="85000"/>
+                    <a:lumOff val="15000"/>
+                  </a:schemeClr>
+                </a:solidFill>
+              </a:rPr>
+              <a:t>Quantitative</a:t>
+            </a:r>
+            <a:br>
+              <a:rPr lang="en-US" dirty="0" smtClean="0">
+                <a:solidFill>
+                  <a:schemeClr val="tx1">
+                    <a:lumMod val="85000"/>
+                    <a:lumOff val="15000"/>
+                  </a:schemeClr>
+                </a:solidFill>
+              </a:rPr>
+            </a:br>
+            <a:r>
+              <a:rPr lang="en-US" dirty="0" smtClean="0">
+                <a:solidFill>
+                  <a:schemeClr val="tx1">
+                    <a:lumMod val="85000"/>
+                    <a:lumOff val="15000"/>
+                  </a:schemeClr>
+                </a:solidFill>
+              </a:rPr>
+              <a:t>Courses</a:t>
+            </a:r>
+            <a:endParaRPr lang="en-US" dirty="0">
+              <a:solidFill>
+                <a:schemeClr val="tx1">
+                  <a:lumMod val="85000"/>
+                  <a:lumOff val="15000"/>
+                </a:schemeClr>
+              </a:solidFill>
+            </a:endParaRPr>
+          </a:p>
+        </p:txBody>
+      </p:sp>
+      <p:sp>
+        <p:nvSpPr>
+          <p:cNvPr id="48" name="Rounded Rectangle 47"/>
+          <p:cNvSpPr/>
+          <p:nvPr/>
+        </p:nvSpPr>
+        <p:spPr>
+          <a:xfrm>
+            <a:off x="431800" y="5554074"/>
+            <a:ext cx="2514600" cy="944151"/>
+          </a:xfrm>
+          <a:prstGeom prst="roundRect">
+            <a:avLst>
+              <a:gd name="adj" fmla="val 9921"/>
+            </a:avLst>
+          </a:prstGeom>
+          <a:solidFill>
+            <a:schemeClr val="accent4">
+              <a:lumMod val="20000"/>
+              <a:lumOff val="80000"/>
+              <a:alpha val="96000"/>
+            </a:schemeClr>
+          </a:solidFill>
+          <a:ln>
+            <a:solidFill>
+              <a:schemeClr val="accent4">
+                <a:lumMod val="75000"/>
+              </a:schemeClr>
+            </a:solidFill>
+          </a:ln>
+        </p:spPr>
+        <p:style>
+          <a:lnRef idx="1">
+            <a:schemeClr val="accent1"/>
+          </a:lnRef>
+          <a:fillRef idx="3">
+            <a:schemeClr val="accent1"/>
+          </a:fillRef>
+          <a:effectRef idx="2">
+            <a:schemeClr val="accent1"/>
+          </a:effectRef>
+          <a:fontRef idx="minor">
+            <a:schemeClr val="lt1"/>
+          </a:fontRef>
+        </p:style>
+        <p:txBody>
+          <a:bodyPr rtlCol="0" anchor="ctr"/>
+          <a:lstStyle/>
+          <a:p>
+            <a:pPr algn="ctr"/>
+            <a:r>
+              <a:rPr lang="en-US" dirty="0" smtClean="0">
+                <a:solidFill>
+                  <a:schemeClr val="tx1">
+                    <a:lumMod val="85000"/>
+                    <a:lumOff val="15000"/>
+                  </a:schemeClr>
+                </a:solidFill>
+              </a:rPr>
+              <a:t>Upper-Level</a:t>
+            </a:r>
+            <a:br>
+              <a:rPr lang="en-US" dirty="0" smtClean="0">
+                <a:solidFill>
+                  <a:schemeClr val="tx1">
+                    <a:lumMod val="85000"/>
+                    <a:lumOff val="15000"/>
+                  </a:schemeClr>
+                </a:solidFill>
+              </a:rPr>
+            </a:br>
+            <a:r>
+              <a:rPr lang="en-US" dirty="0" smtClean="0">
+                <a:solidFill>
+                  <a:schemeClr val="tx1">
+                    <a:lumMod val="85000"/>
+                    <a:lumOff val="15000"/>
+                  </a:schemeClr>
+                </a:solidFill>
+              </a:rPr>
+              <a:t>Biology</a:t>
+            </a:r>
+            <a:endParaRPr lang="en-US" dirty="0">
+              <a:solidFill>
+                <a:schemeClr val="tx1">
+                  <a:lumMod val="85000"/>
+                  <a:lumOff val="15000"/>
+                </a:schemeClr>
+              </a:solidFill>
+            </a:endParaRPr>
+          </a:p>
+        </p:txBody>
+      </p:sp>
+      <p:sp>
+        <p:nvSpPr>
+          <p:cNvPr id="49" name="Rounded Rectangle 48"/>
+          <p:cNvSpPr/>
+          <p:nvPr/>
+        </p:nvSpPr>
+        <p:spPr>
+          <a:xfrm>
+            <a:off x="431800" y="3039562"/>
+            <a:ext cx="2514600" cy="2439400"/>
+          </a:xfrm>
+          <a:prstGeom prst="roundRect">
+            <a:avLst>
+              <a:gd name="adj" fmla="val 4064"/>
+            </a:avLst>
+          </a:prstGeom>
+          <a:solidFill>
+            <a:schemeClr val="accent4">
+              <a:lumMod val="20000"/>
+              <a:lumOff val="80000"/>
+              <a:alpha val="96000"/>
+            </a:schemeClr>
+          </a:solidFill>
+          <a:ln>
+            <a:solidFill>
+              <a:schemeClr val="accent4">
+                <a:lumMod val="75000"/>
+              </a:schemeClr>
+            </a:solidFill>
+          </a:ln>
+        </p:spPr>
+        <p:style>
+          <a:lnRef idx="1">
+            <a:schemeClr val="accent1"/>
+          </a:lnRef>
+          <a:fillRef idx="3">
+            <a:schemeClr val="accent1"/>
+          </a:fillRef>
+          <a:effectRef idx="2">
+            <a:schemeClr val="accent1"/>
+          </a:effectRef>
+          <a:fontRef idx="minor">
+            <a:schemeClr val="lt1"/>
+          </a:fontRef>
+        </p:style>
+        <p:txBody>
+          <a:bodyPr rtlCol="0" anchor="t"/>
+          <a:lstStyle/>
+          <a:p>
+            <a:pPr algn="ctr"/>
+            <a:r>
+              <a:rPr lang="en-US" dirty="0" smtClean="0">
+                <a:solidFill>
+                  <a:schemeClr val="tx1">
+                    <a:lumMod val="85000"/>
+                    <a:lumOff val="15000"/>
+                  </a:schemeClr>
+                </a:solidFill>
+              </a:rPr>
+              <a:t>Biology</a:t>
+            </a:r>
+            <a:br>
+              <a:rPr lang="en-US" dirty="0" smtClean="0">
+                <a:solidFill>
+                  <a:schemeClr val="tx1">
+                    <a:lumMod val="85000"/>
+                    <a:lumOff val="15000"/>
+                  </a:schemeClr>
+                </a:solidFill>
+              </a:rPr>
+            </a:br>
+            <a:r>
+              <a:rPr lang="en-US" dirty="0" smtClean="0">
+                <a:solidFill>
+                  <a:schemeClr val="tx1">
+                    <a:lumMod val="85000"/>
+                    <a:lumOff val="15000"/>
+                  </a:schemeClr>
+                </a:solidFill>
+              </a:rPr>
+              <a:t>Core</a:t>
+            </a:r>
+            <a:endParaRPr lang="en-US" dirty="0">
+              <a:solidFill>
+                <a:schemeClr val="tx1">
+                  <a:lumMod val="85000"/>
+                  <a:lumOff val="15000"/>
+                </a:schemeClr>
+              </a:solidFill>
+            </a:endParaRPr>
+          </a:p>
+        </p:txBody>
+      </p:sp>
+      <p:sp>
+        <p:nvSpPr>
+          <p:cNvPr id="50" name="Rounded Rectangle 49"/>
+          <p:cNvSpPr/>
+          <p:nvPr/>
+        </p:nvSpPr>
+        <p:spPr>
+          <a:xfrm>
+            <a:off x="673100" y="3780249"/>
+            <a:ext cx="2089150" cy="633002"/>
+          </a:xfrm>
+          <a:prstGeom prst="roundRect">
+            <a:avLst>
+              <a:gd name="adj" fmla="val 9921"/>
+            </a:avLst>
+          </a:prstGeom>
+          <a:solidFill>
+            <a:schemeClr val="accent2">
+              <a:lumMod val="40000"/>
+              <a:lumOff val="60000"/>
+              <a:alpha val="96000"/>
+            </a:schemeClr>
+          </a:solidFill>
+          <a:ln>
+            <a:solidFill>
+              <a:schemeClr val="accent2">
+                <a:lumMod val="50000"/>
+              </a:schemeClr>
+            </a:solidFill>
+          </a:ln>
+        </p:spPr>
+        <p:style>
+          <a:lnRef idx="1">
+            <a:schemeClr val="accent1"/>
+          </a:lnRef>
+          <a:fillRef idx="3">
+            <a:schemeClr val="accent1"/>
+          </a:fillRef>
+          <a:effectRef idx="2">
+            <a:schemeClr val="accent1"/>
+          </a:effectRef>
+          <a:fontRef idx="minor">
+            <a:schemeClr val="lt1"/>
+          </a:fontRef>
+        </p:style>
+        <p:txBody>
+          <a:bodyPr rtlCol="0" anchor="ctr"/>
+          <a:lstStyle/>
+          <a:p>
+            <a:pPr algn="ctr"/>
+            <a:r>
+              <a:rPr lang="en-US" dirty="0" smtClean="0">
+                <a:solidFill>
+                  <a:schemeClr val="tx1">
+                    <a:lumMod val="85000"/>
+                    <a:lumOff val="15000"/>
+                  </a:schemeClr>
+                </a:solidFill>
+              </a:rPr>
+              <a:t>Labs</a:t>
+            </a:r>
+            <a:endParaRPr lang="en-US" dirty="0">
+              <a:solidFill>
+                <a:schemeClr val="tx1">
+                  <a:lumMod val="85000"/>
+                  <a:lumOff val="15000"/>
+                </a:schemeClr>
+              </a:solidFill>
+            </a:endParaRPr>
+          </a:p>
+        </p:txBody>
+      </p:sp>
+      <p:sp>
+        <p:nvSpPr>
+          <p:cNvPr id="51" name="Rounded Rectangle 50"/>
+          <p:cNvSpPr/>
+          <p:nvPr/>
+        </p:nvSpPr>
+        <p:spPr>
+          <a:xfrm>
+            <a:off x="673100" y="4631149"/>
+            <a:ext cx="2089150" cy="633002"/>
+          </a:xfrm>
+          <a:prstGeom prst="roundRect">
+            <a:avLst>
+              <a:gd name="adj" fmla="val 9921"/>
+            </a:avLst>
+          </a:prstGeom>
+          <a:solidFill>
+            <a:srgbClr val="E6B9B8">
+              <a:alpha val="96000"/>
+            </a:srgbClr>
+          </a:solidFill>
+          <a:ln>
+            <a:solidFill>
+              <a:srgbClr val="632523"/>
+            </a:solidFill>
+          </a:ln>
+        </p:spPr>
+        <p:style>
+          <a:lnRef idx="1">
+            <a:schemeClr val="accent1"/>
+          </a:lnRef>
+          <a:fillRef idx="3">
+            <a:schemeClr val="accent1"/>
+          </a:fillRef>
+          <a:effectRef idx="2">
+            <a:schemeClr val="accent1"/>
+          </a:effectRef>
+          <a:fontRef idx="minor">
+            <a:schemeClr val="lt1"/>
+          </a:fontRef>
+        </p:style>
+        <p:txBody>
+          <a:bodyPr rtlCol="0" anchor="ctr"/>
+          <a:lstStyle/>
+          <a:p>
+            <a:pPr algn="ctr"/>
+            <a:r>
+              <a:rPr lang="en-US" dirty="0" smtClean="0">
+                <a:solidFill>
+                  <a:schemeClr val="tx1">
+                    <a:lumMod val="85000"/>
+                    <a:lumOff val="15000"/>
+                  </a:schemeClr>
+                </a:solidFill>
+              </a:rPr>
+              <a:t>Lecture</a:t>
+            </a:r>
+            <a:endParaRPr lang="en-US" dirty="0">
+              <a:solidFill>
+                <a:schemeClr val="tx1">
+                  <a:lumMod val="85000"/>
+                  <a:lumOff val="15000"/>
+                </a:schemeClr>
+              </a:solidFill>
+            </a:endParaRPr>
+          </a:p>
+        </p:txBody>
+      </p:sp>
+      <p:sp>
+        <p:nvSpPr>
+          <p:cNvPr id="20" name="Diamond 19"/>
+          <p:cNvSpPr/>
+          <p:nvPr/>
+        </p:nvSpPr>
+        <p:spPr>
+          <a:xfrm>
+            <a:off x="3457365" y="3984625"/>
+            <a:ext cx="2222500" cy="1381125"/>
+          </a:xfrm>
+          <a:prstGeom prst="diamond">
+            <a:avLst/>
+          </a:prstGeom>
+          <a:solidFill>
+            <a:schemeClr val="accent3">
+              <a:lumMod val="40000"/>
+              <a:lumOff val="60000"/>
+            </a:schemeClr>
+          </a:solidFill>
+          <a:ln>
+            <a:solidFill>
+              <a:schemeClr val="accent3">
+                <a:lumMod val="50000"/>
+              </a:schemeClr>
+            </a:solidFill>
+          </a:ln>
+        </p:spPr>
+        <p:style>
+          <a:lnRef idx="1">
+            <a:schemeClr val="accent1"/>
+          </a:lnRef>
+          <a:fillRef idx="3">
+            <a:schemeClr val="accent1"/>
+          </a:fillRef>
+          <a:effectRef idx="2">
+            <a:schemeClr val="accent1"/>
+          </a:effectRef>
+          <a:fontRef idx="minor">
+            <a:schemeClr val="lt1"/>
+          </a:fontRef>
+        </p:style>
+        <p:txBody>
+          <a:bodyPr rtlCol="0" anchor="ctr"/>
+          <a:lstStyle/>
+          <a:p>
+            <a:pPr algn="ctr"/>
+            <a:r>
+              <a:rPr lang="en-US" dirty="0" smtClean="0">
+                <a:solidFill>
+                  <a:schemeClr val="tx1">
+                    <a:lumMod val="85000"/>
+                    <a:lumOff val="15000"/>
+                  </a:schemeClr>
+                </a:solidFill>
+              </a:rPr>
+              <a:t>Lessons</a:t>
+            </a:r>
+            <a:endParaRPr lang="en-US" dirty="0">
+              <a:solidFill>
+                <a:schemeClr val="tx1">
+                  <a:lumMod val="85000"/>
+                  <a:lumOff val="15000"/>
+                </a:schemeClr>
+              </a:solidFill>
+            </a:endParaRPr>
+          </a:p>
+        </p:txBody>
+      </p:sp>
+      <p:sp>
+        <p:nvSpPr>
+          <p:cNvPr id="52" name="Diamond 51"/>
+          <p:cNvSpPr/>
+          <p:nvPr/>
+        </p:nvSpPr>
+        <p:spPr>
+          <a:xfrm>
+            <a:off x="3457365" y="2458449"/>
+            <a:ext cx="2222500" cy="1381125"/>
+          </a:xfrm>
+          <a:prstGeom prst="diamond">
+            <a:avLst/>
+          </a:prstGeom>
+          <a:solidFill>
+            <a:schemeClr val="accent3">
+              <a:lumMod val="40000"/>
+              <a:lumOff val="60000"/>
+            </a:schemeClr>
+          </a:solidFill>
+          <a:ln>
+            <a:solidFill>
+              <a:schemeClr val="accent3">
+                <a:lumMod val="50000"/>
+              </a:schemeClr>
+            </a:solidFill>
+          </a:ln>
+        </p:spPr>
+        <p:style>
+          <a:lnRef idx="1">
+            <a:schemeClr val="accent1"/>
+          </a:lnRef>
+          <a:fillRef idx="3">
+            <a:schemeClr val="accent1"/>
+          </a:fillRef>
+          <a:effectRef idx="2">
+            <a:schemeClr val="accent1"/>
+          </a:effectRef>
+          <a:fontRef idx="minor">
+            <a:schemeClr val="lt1"/>
+          </a:fontRef>
+        </p:style>
+        <p:txBody>
+          <a:bodyPr rtlCol="0" anchor="ctr"/>
+          <a:lstStyle/>
+          <a:p>
+            <a:pPr algn="ctr"/>
+            <a:r>
+              <a:rPr lang="en-US" dirty="0" smtClean="0">
+                <a:solidFill>
+                  <a:schemeClr val="tx1">
+                    <a:lumMod val="85000"/>
+                    <a:lumOff val="15000"/>
+                  </a:schemeClr>
+                </a:solidFill>
+              </a:rPr>
+              <a:t>Modules</a:t>
+            </a:r>
+            <a:endParaRPr lang="en-US" dirty="0">
+              <a:solidFill>
+                <a:schemeClr val="tx1">
+                  <a:lumMod val="85000"/>
+                  <a:lumOff val="15000"/>
+                </a:schemeClr>
+              </a:solidFill>
+            </a:endParaRPr>
+          </a:p>
+        </p:txBody>
+      </p:sp>
+      <p:cxnSp>
+        <p:nvCxnSpPr>
+          <p:cNvPr id="54" name="Elbow Connector 53"/>
+          <p:cNvCxnSpPr>
+            <a:stCxn id="20" idx="1"/>
+            <a:endCxn id="49" idx="3"/>
+          </p:cNvCxnSpPr>
+          <p:nvPr/>
+        </p:nvCxnSpPr>
+        <p:spPr>
+          <a:xfrm rot="10800000">
+            <a:off x="2946401" y="4259262"/>
+            <a:ext cx="510965" cy="415926"/>
+          </a:xfrm>
+          <a:prstGeom prst="bentConnector3">
+            <a:avLst/>
+          </a:prstGeom>
+          <a:ln>
+            <a:solidFill>
+              <a:schemeClr val="tx1">
+                <a:lumMod val="85000"/>
+                <a:lumOff val="15000"/>
+              </a:schemeClr>
+            </a:solidFill>
+            <a:tailEnd type="arrow"/>
+          </a:ln>
+        </p:spPr>
+        <p:style>
+          <a:lnRef idx="2">
+            <a:schemeClr val="accent1"/>
+          </a:lnRef>
+          <a:fillRef idx="0">
+            <a:schemeClr val="accent1"/>
+          </a:fillRef>
+          <a:effectRef idx="1">
+            <a:schemeClr val="accent1"/>
+          </a:effectRef>
+          <a:fontRef idx="minor">
+            <a:schemeClr val="tx1"/>
+          </a:fontRef>
+        </p:style>
+      </p:cxnSp>
+      <p:cxnSp>
+        <p:nvCxnSpPr>
+          <p:cNvPr id="57" name="Elbow Connector 56"/>
+          <p:cNvCxnSpPr>
+            <a:stCxn id="20" idx="1"/>
+            <a:endCxn id="48" idx="3"/>
+          </p:cNvCxnSpPr>
+          <p:nvPr/>
+        </p:nvCxnSpPr>
+        <p:spPr>
+          <a:xfrm rot="10800000" flipV="1">
+            <a:off x="2946401" y="4675188"/>
+            <a:ext cx="510965" cy="1350962"/>
+          </a:xfrm>
+          <a:prstGeom prst="bentConnector3">
+            <a:avLst/>
+          </a:prstGeom>
+          <a:ln>
+            <a:solidFill>
+              <a:schemeClr val="tx1">
+                <a:lumMod val="85000"/>
+                <a:lumOff val="15000"/>
+              </a:schemeClr>
+            </a:solidFill>
+            <a:tailEnd type="arrow"/>
+          </a:ln>
+        </p:spPr>
+        <p:style>
+          <a:lnRef idx="2">
+            <a:schemeClr val="accent1"/>
+          </a:lnRef>
+          <a:fillRef idx="0">
+            <a:schemeClr val="accent1"/>
+          </a:fillRef>
+          <a:effectRef idx="1">
+            <a:schemeClr val="accent1"/>
+          </a:effectRef>
+          <a:fontRef idx="minor">
+            <a:schemeClr val="tx1"/>
+          </a:fontRef>
+        </p:style>
+      </p:cxnSp>
+      <p:cxnSp>
+        <p:nvCxnSpPr>
+          <p:cNvPr id="59" name="Elbow Connector 58"/>
+          <p:cNvCxnSpPr>
+            <a:stCxn id="52" idx="1"/>
+            <a:endCxn id="42" idx="3"/>
+          </p:cNvCxnSpPr>
+          <p:nvPr/>
+        </p:nvCxnSpPr>
+        <p:spPr>
+          <a:xfrm rot="10800000">
+            <a:off x="2946401" y="2492376"/>
+            <a:ext cx="510965" cy="656637"/>
+          </a:xfrm>
+          <a:prstGeom prst="bentConnector3">
+            <a:avLst/>
+          </a:prstGeom>
+          <a:ln>
+            <a:solidFill>
+              <a:schemeClr val="tx1">
+                <a:lumMod val="85000"/>
+                <a:lumOff val="15000"/>
+              </a:schemeClr>
+            </a:solidFill>
+            <a:tailEnd type="arrow"/>
+          </a:ln>
+        </p:spPr>
+        <p:style>
+          <a:lnRef idx="2">
+            <a:schemeClr val="accent1"/>
+          </a:lnRef>
+          <a:fillRef idx="0">
+            <a:schemeClr val="accent1"/>
+          </a:fillRef>
+          <a:effectRef idx="1">
+            <a:schemeClr val="accent1"/>
+          </a:effectRef>
+          <a:fontRef idx="minor">
+            <a:schemeClr val="tx1"/>
+          </a:fontRef>
+        </p:style>
+      </p:cxnSp>
+      <p:cxnSp>
+        <p:nvCxnSpPr>
+          <p:cNvPr id="62" name="Elbow Connector 61"/>
+          <p:cNvCxnSpPr>
+            <a:stCxn id="52" idx="1"/>
+            <a:endCxn id="49" idx="3"/>
+          </p:cNvCxnSpPr>
+          <p:nvPr/>
+        </p:nvCxnSpPr>
+        <p:spPr>
+          <a:xfrm rot="10800000" flipV="1">
+            <a:off x="2946401" y="3149012"/>
+            <a:ext cx="510965" cy="1110250"/>
+          </a:xfrm>
+          <a:prstGeom prst="bentConnector3">
+            <a:avLst>
+              <a:gd name="adj1" fmla="val 50000"/>
+            </a:avLst>
+          </a:prstGeom>
+          <a:ln>
+            <a:solidFill>
+              <a:schemeClr val="tx1">
+                <a:lumMod val="85000"/>
+                <a:lumOff val="15000"/>
+              </a:schemeClr>
+            </a:solidFill>
+            <a:tailEnd type="arrow"/>
+          </a:ln>
+        </p:spPr>
+        <p:style>
+          <a:lnRef idx="2">
+            <a:schemeClr val="accent1"/>
+          </a:lnRef>
+          <a:fillRef idx="0">
+            <a:schemeClr val="accent1"/>
+          </a:fillRef>
+          <a:effectRef idx="1">
+            <a:schemeClr val="accent1"/>
+          </a:effectRef>
+          <a:fontRef idx="minor">
+            <a:schemeClr val="tx1"/>
+          </a:fontRef>
+        </p:style>
+      </p:cxnSp>
+      <p:cxnSp>
+        <p:nvCxnSpPr>
+          <p:cNvPr id="21" name="Elbow Connector 20"/>
+          <p:cNvCxnSpPr>
+            <a:stCxn id="20" idx="3"/>
+            <a:endCxn id="19" idx="1"/>
+          </p:cNvCxnSpPr>
+          <p:nvPr/>
+        </p:nvCxnSpPr>
+        <p:spPr>
+          <a:xfrm flipV="1">
+            <a:off x="5679865" y="4045950"/>
+            <a:ext cx="487573" cy="629238"/>
+          </a:xfrm>
+          <a:prstGeom prst="bentConnector3">
+            <a:avLst>
+              <a:gd name="adj1" fmla="val 50000"/>
+            </a:avLst>
+          </a:prstGeom>
+          <a:ln>
+            <a:solidFill>
+              <a:schemeClr val="tx1">
+                <a:lumMod val="85000"/>
+                <a:lumOff val="15000"/>
+              </a:schemeClr>
+            </a:solidFill>
+            <a:tailEnd type="arrow"/>
+          </a:ln>
+        </p:spPr>
+        <p:style>
+          <a:lnRef idx="2">
+            <a:schemeClr val="accent1"/>
+          </a:lnRef>
+          <a:fillRef idx="0">
+            <a:schemeClr val="accent1"/>
+          </a:fillRef>
+          <a:effectRef idx="1">
+            <a:schemeClr val="accent1"/>
+          </a:effectRef>
+          <a:fontRef idx="minor">
+            <a:schemeClr val="tx1"/>
+          </a:fontRef>
+        </p:style>
+      </p:cxnSp>
+      <p:cxnSp>
+        <p:nvCxnSpPr>
+          <p:cNvPr id="23" name="Elbow Connector 22"/>
+          <p:cNvCxnSpPr>
+            <a:stCxn id="52" idx="3"/>
+            <a:endCxn id="19" idx="1"/>
+          </p:cNvCxnSpPr>
+          <p:nvPr/>
+        </p:nvCxnSpPr>
+        <p:spPr>
+          <a:xfrm>
+            <a:off x="5679865" y="3149012"/>
+            <a:ext cx="487573" cy="896938"/>
+          </a:xfrm>
+          <a:prstGeom prst="bentConnector3">
+            <a:avLst>
+              <a:gd name="adj1" fmla="val 50000"/>
+            </a:avLst>
+          </a:prstGeom>
+          <a:ln>
+            <a:solidFill>
+              <a:schemeClr val="tx1">
+                <a:lumMod val="85000"/>
+                <a:lumOff val="15000"/>
+              </a:schemeClr>
+            </a:solidFill>
+            <a:tailEnd type="arrow"/>
+          </a:ln>
+        </p:spPr>
+        <p:style>
+          <a:lnRef idx="2">
+            <a:schemeClr val="accent1"/>
+          </a:lnRef>
+          <a:fillRef idx="0">
+            <a:schemeClr val="accent1"/>
+          </a:fillRef>
+          <a:effectRef idx="1">
+            <a:schemeClr val="accent1"/>
+          </a:effectRef>
+          <a:fontRef idx="minor">
+            <a:schemeClr val="tx1"/>
+          </a:fontRef>
+        </p:style>
+      </p:cxnSp>
+    </p:spTree>
+    <p:extLst>
+      <p:ext uri="{BB962C8B-B14F-4D97-AF65-F5344CB8AC3E}">
+        <p14:creationId xmlns:p14="http://schemas.microsoft.com/office/powerpoint/2010/main" val="3244953779"/>
+      </p:ext>
+    </p:extLst>
+  </p:cSld>
+  <p:clrMapOvr>
+    <a:masterClrMapping/>
+  </p:clrMapOvr>
+  <p:timing>
+    <p:tnLst>
+      <p:par>
+        <p:cTn xmlns:p14="http://schemas.microsoft.com/office/powerpoint/2010/main" id="1" dur="indefinite" restart="never" nodeType="tmRoot"/>
+      </p:par>
+    </p:tnLst>
+  </p:timing>
 </p:sld>
 </file>
 
@@ -4516,4 +7525,324 @@
   </a:objectDefaults>
   <a:extraClrSchemeLst/>
 </a:theme>
+</file>
+
+<file path=ppt/theme/theme2.xml><?xml version="1.0" encoding="utf-8"?>
+<a:theme xmlns:a="http://schemas.openxmlformats.org/drawingml/2006/main" name="Office Theme">
+  <a:themeElements>
+    <a:clrScheme name="Office">
+      <a:dk1>
+        <a:sysClr val="windowText" lastClr="000000"/>
+      </a:dk1>
+      <a:lt1>
+        <a:sysClr val="window" lastClr="FFFFFF"/>
+      </a:lt1>
+      <a:dk2>
+        <a:srgbClr val="1F497D"/>
+      </a:dk2>
+      <a:lt2>
+        <a:srgbClr val="EEECE1"/>
+      </a:lt2>
+      <a:accent1>
+        <a:srgbClr val="4F81BD"/>
+      </a:accent1>
+      <a:accent2>
+        <a:srgbClr val="C0504D"/>
+      </a:accent2>
+      <a:accent3>
+        <a:srgbClr val="9BBB59"/>
+      </a:accent3>
+      <a:accent4>
+        <a:srgbClr val="8064A2"/>
+      </a:accent4>
+      <a:accent5>
+        <a:srgbClr val="4BACC6"/>
+      </a:accent5>
+      <a:accent6>
+        <a:srgbClr val="F79646"/>
+      </a:accent6>
+      <a:hlink>
+        <a:srgbClr val="0000FF"/>
+      </a:hlink>
+      <a:folHlink>
+        <a:srgbClr val="800080"/>
+      </a:folHlink>
+    </a:clrScheme>
+    <a:fontScheme name="Office">
+      <a:majorFont>
+        <a:latin typeface="Calibri"/>
+        <a:ea typeface=""/>
+        <a:cs typeface=""/>
+        <a:font script="Jpan" typeface="ＭＳ Ｐゴシック"/>
+        <a:font script="Hang" typeface="맑은 고딕"/>
+        <a:font script="Hans" typeface="宋体"/>
+        <a:font script="Hant" typeface="新細明體"/>
+        <a:font script="Arab" typeface="Times New Roman"/>
+        <a:font script="Hebr" typeface="Times New Roman"/>
+        <a:font script="Thai" typeface="Angsana New"/>
+        <a:font script="Ethi" typeface="Nyala"/>
+        <a:font script="Beng" typeface="Vrinda"/>
+        <a:font script="Gujr" typeface="Shruti"/>
+        <a:font script="Khmr" typeface="MoolBoran"/>
+        <a:font script="Knda" typeface="Tunga"/>
+        <a:font script="Guru" typeface="Raavi"/>
+        <a:font script="Cans" typeface="Euphemia"/>
+        <a:font script="Cher" typeface="Plantagenet Cherokee"/>
+        <a:font script="Yiii" typeface="Microsoft Yi Baiti"/>
+        <a:font script="Tibt" typeface="Microsoft Himalaya"/>
+        <a:font script="Thaa" typeface="MV Boli"/>
+        <a:font script="Deva" typeface="Mangal"/>
+        <a:font script="Telu" typeface="Gautami"/>
+        <a:font script="Taml" typeface="Latha"/>
+        <a:font script="Syrc" typeface="Estrangelo Edessa"/>
+        <a:font script="Orya" typeface="Kalinga"/>
+        <a:font script="Mlym" typeface="Kartika"/>
+        <a:font script="Laoo" typeface="DokChampa"/>
+        <a:font script="Sinh" typeface="Iskoola Pota"/>
+        <a:font script="Mong" typeface="Mongolian Baiti"/>
+        <a:font script="Viet" typeface="Times New Roman"/>
+        <a:font script="Uigh" typeface="Microsoft Uighur"/>
+        <a:font script="Geor" typeface="Sylfaen"/>
+      </a:majorFont>
+      <a:minorFont>
+        <a:latin typeface="Calibri"/>
+        <a:ea typeface=""/>
+        <a:cs typeface=""/>
+        <a:font script="Jpan" typeface="ＭＳ Ｐゴシック"/>
+        <a:font script="Hang" typeface="맑은 고딕"/>
+        <a:font script="Hans" typeface="宋体"/>
+        <a:font script="Hant" typeface="新細明體"/>
+        <a:font script="Arab" typeface="Arial"/>
+        <a:font script="Hebr" typeface="Arial"/>
+        <a:font script="Thai" typeface="Cordia New"/>
+        <a:font script="Ethi" typeface="Nyala"/>
+        <a:font script="Beng" typeface="Vrinda"/>
+        <a:font script="Gujr" typeface="Shruti"/>
+        <a:font script="Khmr" typeface="DaunPenh"/>
+        <a:font script="Knda" typeface="Tunga"/>
+        <a:font script="Guru" typeface="Raavi"/>
+        <a:font script="Cans" typeface="Euphemia"/>
+        <a:font script="Cher" typeface="Plantagenet Cherokee"/>
+        <a:font script="Yiii" typeface="Microsoft Yi Baiti"/>
+        <a:font script="Tibt" typeface="Microsoft Himalaya"/>
+        <a:font script="Thaa" typeface="MV Boli"/>
+        <a:font script="Deva" typeface="Mangal"/>
+        <a:font script="Telu" typeface="Gautami"/>
+        <a:font script="Taml" typeface="Latha"/>
+        <a:font script="Syrc" typeface="Estrangelo Edessa"/>
+        <a:font script="Orya" typeface="Kalinga"/>
+        <a:font script="Mlym" typeface="Kartika"/>
+        <a:font script="Laoo" typeface="DokChampa"/>
+        <a:font script="Sinh" typeface="Iskoola Pota"/>
+        <a:font script="Mong" typeface="Mongolian Baiti"/>
+        <a:font script="Viet" typeface="Arial"/>
+        <a:font script="Uigh" typeface="Microsoft Uighur"/>
+        <a:font script="Geor" typeface="Sylfaen"/>
+      </a:minorFont>
+    </a:fontScheme>
+    <a:fmtScheme name="Office">
+      <a:fillStyleLst>
+        <a:solidFill>
+          <a:schemeClr val="phClr"/>
+        </a:solidFill>
+        <a:gradFill rotWithShape="1">
+          <a:gsLst>
+            <a:gs pos="0">
+              <a:schemeClr val="phClr">
+                <a:tint val="50000"/>
+                <a:satMod val="300000"/>
+              </a:schemeClr>
+            </a:gs>
+            <a:gs pos="35000">
+              <a:schemeClr val="phClr">
+                <a:tint val="37000"/>
+                <a:satMod val="300000"/>
+              </a:schemeClr>
+            </a:gs>
+            <a:gs pos="100000">
+              <a:schemeClr val="phClr">
+                <a:tint val="15000"/>
+                <a:satMod val="350000"/>
+              </a:schemeClr>
+            </a:gs>
+          </a:gsLst>
+          <a:lin ang="16200000" scaled="1"/>
+        </a:gradFill>
+        <a:gradFill rotWithShape="1">
+          <a:gsLst>
+            <a:gs pos="0">
+              <a:schemeClr val="phClr">
+                <a:tint val="100000"/>
+                <a:shade val="100000"/>
+                <a:satMod val="130000"/>
+              </a:schemeClr>
+            </a:gs>
+            <a:gs pos="100000">
+              <a:schemeClr val="phClr">
+                <a:tint val="50000"/>
+                <a:shade val="100000"/>
+                <a:satMod val="350000"/>
+              </a:schemeClr>
+            </a:gs>
+          </a:gsLst>
+          <a:lin ang="16200000" scaled="0"/>
+        </a:gradFill>
+      </a:fillStyleLst>
+      <a:lnStyleLst>
+        <a:ln w="9525" cap="flat" cmpd="sng" algn="ctr">
+          <a:solidFill>
+            <a:schemeClr val="phClr">
+              <a:shade val="95000"/>
+              <a:satMod val="105000"/>
+            </a:schemeClr>
+          </a:solidFill>
+          <a:prstDash val="solid"/>
+        </a:ln>
+        <a:ln w="25400" cap="flat" cmpd="sng" algn="ctr">
+          <a:solidFill>
+            <a:schemeClr val="phClr"/>
+          </a:solidFill>
+          <a:prstDash val="solid"/>
+        </a:ln>
+        <a:ln w="38100" cap="flat" cmpd="sng" algn="ctr">
+          <a:solidFill>
+            <a:schemeClr val="phClr"/>
+          </a:solidFill>
+          <a:prstDash val="solid"/>
+        </a:ln>
+      </a:lnStyleLst>
+      <a:effectStyleLst>
+        <a:effectStyle>
+          <a:effectLst>
+            <a:outerShdw blurRad="40000" dist="20000" dir="5400000" rotWithShape="0">
+              <a:srgbClr val="000000">
+                <a:alpha val="38000"/>
+              </a:srgbClr>
+            </a:outerShdw>
+          </a:effectLst>
+        </a:effectStyle>
+        <a:effectStyle>
+          <a:effectLst>
+            <a:outerShdw blurRad="40000" dist="23000" dir="5400000" rotWithShape="0">
+              <a:srgbClr val="000000">
+                <a:alpha val="35000"/>
+              </a:srgbClr>
+            </a:outerShdw>
+          </a:effectLst>
+        </a:effectStyle>
+        <a:effectStyle>
+          <a:effectLst>
+            <a:outerShdw blurRad="40000" dist="23000" dir="5400000" rotWithShape="0">
+              <a:srgbClr val="000000">
+                <a:alpha val="35000"/>
+              </a:srgbClr>
+            </a:outerShdw>
+          </a:effectLst>
+          <a:scene3d>
+            <a:camera prst="orthographicFront">
+              <a:rot lat="0" lon="0" rev="0"/>
+            </a:camera>
+            <a:lightRig rig="threePt" dir="t">
+              <a:rot lat="0" lon="0" rev="1200000"/>
+            </a:lightRig>
+          </a:scene3d>
+          <a:sp3d>
+            <a:bevelT w="63500" h="25400"/>
+          </a:sp3d>
+        </a:effectStyle>
+      </a:effectStyleLst>
+      <a:bgFillStyleLst>
+        <a:solidFill>
+          <a:schemeClr val="phClr"/>
+        </a:solidFill>
+        <a:gradFill rotWithShape="1">
+          <a:gsLst>
+            <a:gs pos="0">
+              <a:schemeClr val="phClr">
+                <a:tint val="40000"/>
+                <a:satMod val="350000"/>
+              </a:schemeClr>
+            </a:gs>
+            <a:gs pos="40000">
+              <a:schemeClr val="phClr">
+                <a:tint val="45000"/>
+                <a:shade val="99000"/>
+                <a:satMod val="350000"/>
+              </a:schemeClr>
+            </a:gs>
+            <a:gs pos="100000">
+              <a:schemeClr val="phClr">
+                <a:shade val="20000"/>
+                <a:satMod val="255000"/>
+              </a:schemeClr>
+            </a:gs>
+          </a:gsLst>
+          <a:path path="circle">
+            <a:fillToRect l="50000" t="-80000" r="50000" b="180000"/>
+          </a:path>
+        </a:gradFill>
+        <a:gradFill rotWithShape="1">
+          <a:gsLst>
+            <a:gs pos="0">
+              <a:schemeClr val="phClr">
+                <a:tint val="80000"/>
+                <a:satMod val="300000"/>
+              </a:schemeClr>
+            </a:gs>
+            <a:gs pos="100000">
+              <a:schemeClr val="phClr">
+                <a:shade val="30000"/>
+                <a:satMod val="200000"/>
+              </a:schemeClr>
+            </a:gs>
+          </a:gsLst>
+          <a:path path="circle">
+            <a:fillToRect l="50000" t="50000" r="50000" b="50000"/>
+          </a:path>
+        </a:gradFill>
+      </a:bgFillStyleLst>
+    </a:fmtScheme>
+  </a:themeElements>
+  <a:objectDefaults>
+    <a:spDef>
+      <a:spPr/>
+      <a:bodyPr/>
+      <a:lstStyle/>
+      <a:style>
+        <a:lnRef idx="1">
+          <a:schemeClr val="accent1"/>
+        </a:lnRef>
+        <a:fillRef idx="3">
+          <a:schemeClr val="accent1"/>
+        </a:fillRef>
+        <a:effectRef idx="2">
+          <a:schemeClr val="accent1"/>
+        </a:effectRef>
+        <a:fontRef idx="minor">
+          <a:schemeClr val="lt1"/>
+        </a:fontRef>
+      </a:style>
+    </a:spDef>
+    <a:lnDef>
+      <a:spPr/>
+      <a:bodyPr/>
+      <a:lstStyle/>
+      <a:style>
+        <a:lnRef idx="2">
+          <a:schemeClr val="accent1"/>
+        </a:lnRef>
+        <a:fillRef idx="0">
+          <a:schemeClr val="accent1"/>
+        </a:fillRef>
+        <a:effectRef idx="1">
+          <a:schemeClr val="accent1"/>
+        </a:effectRef>
+        <a:fontRef idx="minor">
+          <a:schemeClr val="tx1"/>
+        </a:fontRef>
+      </a:style>
+    </a:lnDef>
+  </a:objectDefaults>
+  <a:extraClrSchemeLst/>
+</a:theme>
 </file>
</xml_diff>

<commit_message>
Restructured education space figure to correspond to taxonomy of class types.
Included Open Ed and Traditional Ed headers, revamped the nesting of courses and activities, and clarified relationships among the components in the figure.
</commit_message>
<xml_diff>
--- a/data-intensive-skills-overview/FigureSpaceDataEducation.pptx
+++ b/data-intensive-skills-overview/FigureSpaceDataEducation.pptx
@@ -5,12 +5,15 @@
     <p:sldMasterId id="2147483648" r:id="rId1"/>
   </p:sldMasterIdLst>
   <p:notesMasterIdLst>
-    <p:notesMasterId r:id="rId5"/>
+    <p:notesMasterId r:id="rId8"/>
   </p:notesMasterIdLst>
   <p:sldIdLst>
     <p:sldId id="256" r:id="rId2"/>
     <p:sldId id="257" r:id="rId3"/>
     <p:sldId id="258" r:id="rId4"/>
+    <p:sldId id="259" r:id="rId5"/>
+    <p:sldId id="260" r:id="rId6"/>
+    <p:sldId id="261" r:id="rId7"/>
   </p:sldIdLst>
   <p:sldSz cx="9144000" cy="6858000" type="screen4x3"/>
   <p:notesSz cx="6858000" cy="9144000"/>
@@ -112,6 +115,39 @@
 </p:presentation>
 </file>
 
+<file path=ppt/commentAuthors.xml><?xml version="1.0" encoding="utf-8"?>
+<p:cmAuthorLst xmlns:a="http://schemas.openxmlformats.org/drawingml/2006/main" xmlns:r="http://schemas.openxmlformats.org/officeDocument/2006/relationships" xmlns:p="http://schemas.openxmlformats.org/presentationml/2006/main">
+  <p:cmAuthor id="0" name="Matthew Jones" initials="MJ" lastIdx="3" clrIdx="0"/>
+</p:cmAuthorLst>
+</file>
+
+<file path=ppt/comments/comment1.xml><?xml version="1.0" encoding="utf-8"?>
+<p:cmLst xmlns:a="http://schemas.openxmlformats.org/drawingml/2006/main" xmlns:r="http://schemas.openxmlformats.org/officeDocument/2006/relationships" xmlns:p="http://schemas.openxmlformats.org/presentationml/2006/main">
+  <p:cm authorId="0" dt="2015-09-11T15:01:37.727" idx="1">
+    <p:pos x="354" y="2866"/>
+    <p:text>Clarify that these are examples, not comprehensive list of activities.</p:text>
+  </p:cm>
+</p:cmLst>
+</file>
+
+<file path=ppt/comments/comment2.xml><?xml version="1.0" encoding="utf-8"?>
+<p:cmLst xmlns:a="http://schemas.openxmlformats.org/drawingml/2006/main" xmlns:r="http://schemas.openxmlformats.org/officeDocument/2006/relationships" xmlns:p="http://schemas.openxmlformats.org/presentationml/2006/main">
+  <p:cm authorId="0" dt="2015-09-11T15:01:37.727" idx="2">
+    <p:pos x="354" y="2866"/>
+    <p:text>Clarify that these are examples, not comprehensive list of activities.</p:text>
+  </p:cm>
+</p:cmLst>
+</file>
+
+<file path=ppt/comments/comment3.xml><?xml version="1.0" encoding="utf-8"?>
+<p:cmLst xmlns:a="http://schemas.openxmlformats.org/drawingml/2006/main" xmlns:r="http://schemas.openxmlformats.org/officeDocument/2006/relationships" xmlns:p="http://schemas.openxmlformats.org/presentationml/2006/main">
+  <p:cm authorId="0" dt="2015-09-11T15:01:37.727" idx="3">
+    <p:pos x="354" y="2866"/>
+    <p:text>Clarify that these are examples, not comprehensive list of activities.</p:text>
+  </p:cm>
+</p:cmLst>
+</file>
+
 <file path=ppt/notesMasters/notesMaster1.xml><?xml version="1.0" encoding="utf-8"?>
 <p:notesMaster xmlns:a="http://schemas.openxmlformats.org/drawingml/2006/main" xmlns:r="http://schemas.openxmlformats.org/officeDocument/2006/relationships" xmlns:p="http://schemas.openxmlformats.org/presentationml/2006/main">
   <p:cSld>
@@ -194,7 +230,7 @@
           <a:p>
             <a:fld id="{7CA89149-D21F-1841-8EB0-67F7BC7F7E21}" type="datetimeFigureOut">
               <a:rPr lang="en-US" smtClean="0"/>
-              <a:t>9/10/15</a:t>
+              <a:t>9/11/15</a:t>
             </a:fld>
             <a:endParaRPr lang="en-US"/>
           </a:p>
@@ -668,6 +704,492 @@
 </p:notes>
 </file>
 
+<file path=ppt/notesSlides/notesSlide3.xml><?xml version="1.0" encoding="utf-8"?>
+<p:notes xmlns:a="http://schemas.openxmlformats.org/drawingml/2006/main" xmlns:r="http://schemas.openxmlformats.org/officeDocument/2006/relationships" xmlns:p="http://schemas.openxmlformats.org/presentationml/2006/main">
+  <p:cSld>
+    <p:spTree>
+      <p:nvGrpSpPr>
+        <p:cNvPr id="1" name=""/>
+        <p:cNvGrpSpPr/>
+        <p:nvPr/>
+      </p:nvGrpSpPr>
+      <p:grpSpPr>
+        <a:xfrm>
+          <a:off x="0" y="0"/>
+          <a:ext cx="0" cy="0"/>
+          <a:chOff x="0" y="0"/>
+          <a:chExt cx="0" cy="0"/>
+        </a:xfrm>
+      </p:grpSpPr>
+      <p:sp>
+        <p:nvSpPr>
+          <p:cNvPr id="2" name="Slide Image Placeholder 1"/>
+          <p:cNvSpPr>
+            <a:spLocks noGrp="1" noRot="1" noChangeAspect="1"/>
+          </p:cNvSpPr>
+          <p:nvPr>
+            <p:ph type="sldImg"/>
+          </p:nvPr>
+        </p:nvSpPr>
+        <p:spPr/>
+      </p:sp>
+      <p:sp>
+        <p:nvSpPr>
+          <p:cNvPr id="3" name="Notes Placeholder 2"/>
+          <p:cNvSpPr>
+            <a:spLocks noGrp="1"/>
+          </p:cNvSpPr>
+          <p:nvPr>
+            <p:ph type="body" idx="1"/>
+          </p:nvPr>
+        </p:nvSpPr>
+        <p:spPr/>
+        <p:txBody>
+          <a:bodyPr/>
+          <a:lstStyle/>
+          <a:p>
+            <a:r>
+              <a:rPr lang="en-US" sz="3200" dirty="0" smtClean="0"/>
+              <a:t>Alternate representation where materials feed into formal and informal learning </a:t>
+            </a:r>
+            <a:r>
+              <a:rPr lang="en-US" sz="3200" dirty="0" smtClean="0"/>
+              <a:t>pedagogies</a:t>
+            </a:r>
+          </a:p>
+          <a:p>
+            <a:endParaRPr lang="en-US" sz="3200" dirty="0" smtClean="0"/>
+          </a:p>
+          <a:p>
+            <a:r>
+              <a:rPr lang="en-US" sz="3200" baseline="0" dirty="0" smtClean="0"/>
+              <a:t>Resources: Lesson, Unit, Data</a:t>
+            </a:r>
+          </a:p>
+          <a:p>
+            <a:endParaRPr lang="en-US" sz="3200" baseline="0" dirty="0" smtClean="0"/>
+          </a:p>
+          <a:p>
+            <a:pPr marL="0" marR="0" indent="0" algn="l" defTabSz="457200" rtl="0" eaLnBrk="1" fontAlgn="auto" latinLnBrk="0" hangingPunct="1">
+              <a:lnSpc>
+                <a:spcPct val="100000"/>
+              </a:lnSpc>
+              <a:spcBef>
+                <a:spcPts val="0"/>
+              </a:spcBef>
+              <a:spcAft>
+                <a:spcPts val="0"/>
+              </a:spcAft>
+              <a:buClrTx/>
+              <a:buSzTx/>
+              <a:buFontTx/>
+              <a:buNone/>
+              <a:tabLst/>
+              <a:defRPr/>
+            </a:pPr>
+            <a:r>
+              <a:rPr lang="en-US" sz="3200" baseline="0" dirty="0" smtClean="0"/>
+              <a:t>Resource-format: slides, handouts, blog posts, videos, text documents, code, </a:t>
+            </a:r>
+            <a:r>
+              <a:rPr lang="en-US" sz="3200" baseline="0" dirty="0" err="1" smtClean="0"/>
+              <a:t>csv</a:t>
+            </a:r>
+            <a:r>
+              <a:rPr lang="en-US" sz="3200" baseline="0" dirty="0" smtClean="0"/>
+              <a:t> files </a:t>
+            </a:r>
+          </a:p>
+          <a:p>
+            <a:endParaRPr lang="en-US" sz="3200" baseline="0" dirty="0" smtClean="0"/>
+          </a:p>
+          <a:p>
+            <a:r>
+              <a:rPr lang="en-US" sz="3200" baseline="0" dirty="0" smtClean="0"/>
+              <a:t>Seminar, Workshop, Course, Program</a:t>
+            </a:r>
+          </a:p>
+          <a:p>
+            <a:endParaRPr lang="en-US" sz="3200" baseline="0" dirty="0" smtClean="0"/>
+          </a:p>
+          <a:p>
+            <a:r>
+              <a:rPr lang="en-US" sz="3200" baseline="0" dirty="0" smtClean="0"/>
+              <a:t>Activity type: Lecture, Lab, Hands-on Activity, Individual Project, Group Project, Discussion</a:t>
+            </a:r>
+          </a:p>
+          <a:p>
+            <a:endParaRPr lang="en-US" sz="3200" baseline="0" dirty="0" smtClean="0"/>
+          </a:p>
+          <a:p>
+            <a:r>
+              <a:rPr lang="en-US" sz="3200" baseline="0" dirty="0" smtClean="0"/>
+              <a:t>Delivery-mode: online, in person, self-paced</a:t>
+            </a:r>
+            <a:endParaRPr lang="en-US" sz="3200" dirty="0"/>
+          </a:p>
+        </p:txBody>
+      </p:sp>
+      <p:sp>
+        <p:nvSpPr>
+          <p:cNvPr id="4" name="Slide Number Placeholder 3"/>
+          <p:cNvSpPr>
+            <a:spLocks noGrp="1"/>
+          </p:cNvSpPr>
+          <p:nvPr>
+            <p:ph type="sldNum" sz="quarter" idx="10"/>
+          </p:nvPr>
+        </p:nvSpPr>
+        <p:spPr/>
+        <p:txBody>
+          <a:bodyPr/>
+          <a:lstStyle/>
+          <a:p>
+            <a:fld id="{CE09061E-DCC8-1640-B238-B51D9C972A55}" type="slidenum">
+              <a:rPr lang="en-US" smtClean="0"/>
+              <a:t>4</a:t>
+            </a:fld>
+            <a:endParaRPr lang="en-US"/>
+          </a:p>
+        </p:txBody>
+      </p:sp>
+    </p:spTree>
+    <p:extLst>
+      <p:ext uri="{BB962C8B-B14F-4D97-AF65-F5344CB8AC3E}">
+        <p14:creationId xmlns:p14="http://schemas.microsoft.com/office/powerpoint/2010/main" val="2525294544"/>
+      </p:ext>
+    </p:extLst>
+  </p:cSld>
+  <p:clrMapOvr>
+    <a:masterClrMapping/>
+  </p:clrMapOvr>
+</p:notes>
+</file>
+
+<file path=ppt/notesSlides/notesSlide4.xml><?xml version="1.0" encoding="utf-8"?>
+<p:notes xmlns:a="http://schemas.openxmlformats.org/drawingml/2006/main" xmlns:r="http://schemas.openxmlformats.org/officeDocument/2006/relationships" xmlns:p="http://schemas.openxmlformats.org/presentationml/2006/main">
+  <p:cSld>
+    <p:spTree>
+      <p:nvGrpSpPr>
+        <p:cNvPr id="1" name=""/>
+        <p:cNvGrpSpPr/>
+        <p:nvPr/>
+      </p:nvGrpSpPr>
+      <p:grpSpPr>
+        <a:xfrm>
+          <a:off x="0" y="0"/>
+          <a:ext cx="0" cy="0"/>
+          <a:chOff x="0" y="0"/>
+          <a:chExt cx="0" cy="0"/>
+        </a:xfrm>
+      </p:grpSpPr>
+      <p:sp>
+        <p:nvSpPr>
+          <p:cNvPr id="2" name="Slide Image Placeholder 1"/>
+          <p:cNvSpPr>
+            <a:spLocks noGrp="1" noRot="1" noChangeAspect="1"/>
+          </p:cNvSpPr>
+          <p:nvPr>
+            <p:ph type="sldImg"/>
+          </p:nvPr>
+        </p:nvSpPr>
+        <p:spPr/>
+      </p:sp>
+      <p:sp>
+        <p:nvSpPr>
+          <p:cNvPr id="3" name="Notes Placeholder 2"/>
+          <p:cNvSpPr>
+            <a:spLocks noGrp="1"/>
+          </p:cNvSpPr>
+          <p:nvPr>
+            <p:ph type="body" idx="1"/>
+          </p:nvPr>
+        </p:nvSpPr>
+        <p:spPr/>
+        <p:txBody>
+          <a:bodyPr/>
+          <a:lstStyle/>
+          <a:p>
+            <a:r>
+              <a:rPr lang="en-US" sz="3200" dirty="0" smtClean="0"/>
+              <a:t>Alternate representation where materials feed into formal and informal learning </a:t>
+            </a:r>
+            <a:r>
+              <a:rPr lang="en-US" sz="3200" dirty="0" smtClean="0"/>
+              <a:t>pedagogies</a:t>
+            </a:r>
+          </a:p>
+          <a:p>
+            <a:endParaRPr lang="en-US" sz="3200" dirty="0" smtClean="0"/>
+          </a:p>
+          <a:p>
+            <a:r>
+              <a:rPr lang="en-US" sz="3200" baseline="0" dirty="0" smtClean="0"/>
+              <a:t>Resources: Lesson, Unit, Data</a:t>
+            </a:r>
+          </a:p>
+          <a:p>
+            <a:endParaRPr lang="en-US" sz="3200" baseline="0" dirty="0" smtClean="0"/>
+          </a:p>
+          <a:p>
+            <a:pPr marL="0" marR="0" indent="0" algn="l" defTabSz="457200" rtl="0" eaLnBrk="1" fontAlgn="auto" latinLnBrk="0" hangingPunct="1">
+              <a:lnSpc>
+                <a:spcPct val="100000"/>
+              </a:lnSpc>
+              <a:spcBef>
+                <a:spcPts val="0"/>
+              </a:spcBef>
+              <a:spcAft>
+                <a:spcPts val="0"/>
+              </a:spcAft>
+              <a:buClrTx/>
+              <a:buSzTx/>
+              <a:buFontTx/>
+              <a:buNone/>
+              <a:tabLst/>
+              <a:defRPr/>
+            </a:pPr>
+            <a:r>
+              <a:rPr lang="en-US" sz="3200" baseline="0" dirty="0" smtClean="0"/>
+              <a:t>Resource-format: slides, handouts, blog posts, videos, text documents, code, </a:t>
+            </a:r>
+            <a:r>
+              <a:rPr lang="en-US" sz="3200" baseline="0" dirty="0" err="1" smtClean="0"/>
+              <a:t>csv</a:t>
+            </a:r>
+            <a:r>
+              <a:rPr lang="en-US" sz="3200" baseline="0" dirty="0" smtClean="0"/>
+              <a:t> files </a:t>
+            </a:r>
+          </a:p>
+          <a:p>
+            <a:endParaRPr lang="en-US" sz="3200" baseline="0" dirty="0" smtClean="0"/>
+          </a:p>
+          <a:p>
+            <a:r>
+              <a:rPr lang="en-US" sz="3200" baseline="0" dirty="0" smtClean="0"/>
+              <a:t>Seminar, Workshop, Course, Program</a:t>
+            </a:r>
+          </a:p>
+          <a:p>
+            <a:endParaRPr lang="en-US" sz="3200" baseline="0" dirty="0" smtClean="0"/>
+          </a:p>
+          <a:p>
+            <a:r>
+              <a:rPr lang="en-US" sz="3200" baseline="0" dirty="0" smtClean="0"/>
+              <a:t>Activity type: Lecture, Lab, Hands-on Activity, Individual Project, Group Project, Discussion</a:t>
+            </a:r>
+          </a:p>
+          <a:p>
+            <a:endParaRPr lang="en-US" sz="3200" baseline="0" dirty="0" smtClean="0"/>
+          </a:p>
+          <a:p>
+            <a:r>
+              <a:rPr lang="en-US" sz="3200" baseline="0" dirty="0" smtClean="0"/>
+              <a:t>Delivery-mode: online, in person, self-paced</a:t>
+            </a:r>
+            <a:endParaRPr lang="en-US" sz="3200" dirty="0"/>
+          </a:p>
+        </p:txBody>
+      </p:sp>
+      <p:sp>
+        <p:nvSpPr>
+          <p:cNvPr id="4" name="Slide Number Placeholder 3"/>
+          <p:cNvSpPr>
+            <a:spLocks noGrp="1"/>
+          </p:cNvSpPr>
+          <p:nvPr>
+            <p:ph type="sldNum" sz="quarter" idx="10"/>
+          </p:nvPr>
+        </p:nvSpPr>
+        <p:spPr/>
+        <p:txBody>
+          <a:bodyPr/>
+          <a:lstStyle/>
+          <a:p>
+            <a:fld id="{CE09061E-DCC8-1640-B238-B51D9C972A55}" type="slidenum">
+              <a:rPr lang="en-US" smtClean="0"/>
+              <a:t>5</a:t>
+            </a:fld>
+            <a:endParaRPr lang="en-US"/>
+          </a:p>
+        </p:txBody>
+      </p:sp>
+    </p:spTree>
+    <p:extLst>
+      <p:ext uri="{BB962C8B-B14F-4D97-AF65-F5344CB8AC3E}">
+        <p14:creationId xmlns:p14="http://schemas.microsoft.com/office/powerpoint/2010/main" val="2525294544"/>
+      </p:ext>
+    </p:extLst>
+  </p:cSld>
+  <p:clrMapOvr>
+    <a:masterClrMapping/>
+  </p:clrMapOvr>
+</p:notes>
+</file>
+
+<file path=ppt/notesSlides/notesSlide5.xml><?xml version="1.0" encoding="utf-8"?>
+<p:notes xmlns:a="http://schemas.openxmlformats.org/drawingml/2006/main" xmlns:r="http://schemas.openxmlformats.org/officeDocument/2006/relationships" xmlns:p="http://schemas.openxmlformats.org/presentationml/2006/main">
+  <p:cSld>
+    <p:spTree>
+      <p:nvGrpSpPr>
+        <p:cNvPr id="1" name=""/>
+        <p:cNvGrpSpPr/>
+        <p:nvPr/>
+      </p:nvGrpSpPr>
+      <p:grpSpPr>
+        <a:xfrm>
+          <a:off x="0" y="0"/>
+          <a:ext cx="0" cy="0"/>
+          <a:chOff x="0" y="0"/>
+          <a:chExt cx="0" cy="0"/>
+        </a:xfrm>
+      </p:grpSpPr>
+      <p:sp>
+        <p:nvSpPr>
+          <p:cNvPr id="2" name="Slide Image Placeholder 1"/>
+          <p:cNvSpPr>
+            <a:spLocks noGrp="1" noRot="1" noChangeAspect="1"/>
+          </p:cNvSpPr>
+          <p:nvPr>
+            <p:ph type="sldImg"/>
+          </p:nvPr>
+        </p:nvSpPr>
+        <p:spPr/>
+      </p:sp>
+      <p:sp>
+        <p:nvSpPr>
+          <p:cNvPr id="3" name="Notes Placeholder 2"/>
+          <p:cNvSpPr>
+            <a:spLocks noGrp="1"/>
+          </p:cNvSpPr>
+          <p:nvPr>
+            <p:ph type="body" idx="1"/>
+          </p:nvPr>
+        </p:nvSpPr>
+        <p:spPr/>
+        <p:txBody>
+          <a:bodyPr/>
+          <a:lstStyle/>
+          <a:p>
+            <a:r>
+              <a:rPr lang="en-US" sz="3200" dirty="0" smtClean="0"/>
+              <a:t>Alternate representation where materials feed into formal and informal learning </a:t>
+            </a:r>
+            <a:r>
+              <a:rPr lang="en-US" sz="3200" dirty="0" smtClean="0"/>
+              <a:t>pedagogies</a:t>
+            </a:r>
+          </a:p>
+          <a:p>
+            <a:endParaRPr lang="en-US" sz="3200" dirty="0" smtClean="0"/>
+          </a:p>
+          <a:p>
+            <a:r>
+              <a:rPr lang="en-US" sz="3200" baseline="0" dirty="0" smtClean="0"/>
+              <a:t>Resources: Lesson, Unit, Data</a:t>
+            </a:r>
+          </a:p>
+          <a:p>
+            <a:endParaRPr lang="en-US" sz="3200" baseline="0" dirty="0" smtClean="0"/>
+          </a:p>
+          <a:p>
+            <a:pPr marL="0" marR="0" indent="0" algn="l" defTabSz="457200" rtl="0" eaLnBrk="1" fontAlgn="auto" latinLnBrk="0" hangingPunct="1">
+              <a:lnSpc>
+                <a:spcPct val="100000"/>
+              </a:lnSpc>
+              <a:spcBef>
+                <a:spcPts val="0"/>
+              </a:spcBef>
+              <a:spcAft>
+                <a:spcPts val="0"/>
+              </a:spcAft>
+              <a:buClrTx/>
+              <a:buSzTx/>
+              <a:buFontTx/>
+              <a:buNone/>
+              <a:tabLst/>
+              <a:defRPr/>
+            </a:pPr>
+            <a:r>
+              <a:rPr lang="en-US" sz="3200" baseline="0" dirty="0" smtClean="0"/>
+              <a:t>Resource-format: slides, handouts, blog posts, videos, text documents, code, </a:t>
+            </a:r>
+            <a:r>
+              <a:rPr lang="en-US" sz="3200" baseline="0" dirty="0" err="1" smtClean="0"/>
+              <a:t>csv</a:t>
+            </a:r>
+            <a:r>
+              <a:rPr lang="en-US" sz="3200" baseline="0" dirty="0" smtClean="0"/>
+              <a:t> files </a:t>
+            </a:r>
+          </a:p>
+          <a:p>
+            <a:endParaRPr lang="en-US" sz="3200" baseline="0" dirty="0" smtClean="0"/>
+          </a:p>
+          <a:p>
+            <a:r>
+              <a:rPr lang="en-US" sz="3200" baseline="0" dirty="0" smtClean="0"/>
+              <a:t>Seminar, Workshop, Course, Program</a:t>
+            </a:r>
+          </a:p>
+          <a:p>
+            <a:endParaRPr lang="en-US" sz="3200" baseline="0" dirty="0" smtClean="0"/>
+          </a:p>
+          <a:p>
+            <a:r>
+              <a:rPr lang="en-US" sz="3200" baseline="0" dirty="0" smtClean="0"/>
+              <a:t>Activity type: Lecture, Lab, Hands-on Activity, Individual Project, Group Project, Discussion</a:t>
+            </a:r>
+          </a:p>
+          <a:p>
+            <a:endParaRPr lang="en-US" sz="3200" baseline="0" dirty="0" smtClean="0"/>
+          </a:p>
+          <a:p>
+            <a:r>
+              <a:rPr lang="en-US" sz="3200" baseline="0" dirty="0" smtClean="0"/>
+              <a:t>Delivery-mode: online, in person, self-paced</a:t>
+            </a:r>
+            <a:endParaRPr lang="en-US" sz="3200" dirty="0"/>
+          </a:p>
+        </p:txBody>
+      </p:sp>
+      <p:sp>
+        <p:nvSpPr>
+          <p:cNvPr id="4" name="Slide Number Placeholder 3"/>
+          <p:cNvSpPr>
+            <a:spLocks noGrp="1"/>
+          </p:cNvSpPr>
+          <p:nvPr>
+            <p:ph type="sldNum" sz="quarter" idx="10"/>
+          </p:nvPr>
+        </p:nvSpPr>
+        <p:spPr/>
+        <p:txBody>
+          <a:bodyPr/>
+          <a:lstStyle/>
+          <a:p>
+            <a:fld id="{CE09061E-DCC8-1640-B238-B51D9C972A55}" type="slidenum">
+              <a:rPr lang="en-US" smtClean="0"/>
+              <a:t>6</a:t>
+            </a:fld>
+            <a:endParaRPr lang="en-US"/>
+          </a:p>
+        </p:txBody>
+      </p:sp>
+    </p:spTree>
+    <p:extLst>
+      <p:ext uri="{BB962C8B-B14F-4D97-AF65-F5344CB8AC3E}">
+        <p14:creationId xmlns:p14="http://schemas.microsoft.com/office/powerpoint/2010/main" val="2525294544"/>
+      </p:ext>
+    </p:extLst>
+  </p:cSld>
+  <p:clrMapOvr>
+    <a:masterClrMapping/>
+  </p:clrMapOvr>
+</p:notes>
+</file>
+
 <file path=ppt/slideLayouts/slideLayout1.xml><?xml version="1.0" encoding="utf-8"?>
 <p:sldLayout xmlns:a="http://schemas.openxmlformats.org/drawingml/2006/main" xmlns:r="http://schemas.openxmlformats.org/officeDocument/2006/relationships" xmlns:p="http://schemas.openxmlformats.org/presentationml/2006/main" type="title" preserve="1">
   <p:cSld name="Title Slide">
@@ -849,7 +1371,7 @@
           <a:p>
             <a:fld id="{03BFE068-5F14-F44F-AF9C-C119BEA90396}" type="datetimeFigureOut">
               <a:rPr lang="en-US" smtClean="0"/>
-              <a:t>9/10/15</a:t>
+              <a:t>9/11/15</a:t>
             </a:fld>
             <a:endParaRPr lang="en-US"/>
           </a:p>
@@ -1019,7 +1541,7 @@
           <a:p>
             <a:fld id="{03BFE068-5F14-F44F-AF9C-C119BEA90396}" type="datetimeFigureOut">
               <a:rPr lang="en-US" smtClean="0"/>
-              <a:t>9/10/15</a:t>
+              <a:t>9/11/15</a:t>
             </a:fld>
             <a:endParaRPr lang="en-US"/>
           </a:p>
@@ -1199,7 +1721,7 @@
           <a:p>
             <a:fld id="{03BFE068-5F14-F44F-AF9C-C119BEA90396}" type="datetimeFigureOut">
               <a:rPr lang="en-US" smtClean="0"/>
-              <a:t>9/10/15</a:t>
+              <a:t>9/11/15</a:t>
             </a:fld>
             <a:endParaRPr lang="en-US"/>
           </a:p>
@@ -1369,7 +1891,7 @@
           <a:p>
             <a:fld id="{03BFE068-5F14-F44F-AF9C-C119BEA90396}" type="datetimeFigureOut">
               <a:rPr lang="en-US" smtClean="0"/>
-              <a:t>9/10/15</a:t>
+              <a:t>9/11/15</a:t>
             </a:fld>
             <a:endParaRPr lang="en-US"/>
           </a:p>
@@ -1615,7 +2137,7 @@
           <a:p>
             <a:fld id="{03BFE068-5F14-F44F-AF9C-C119BEA90396}" type="datetimeFigureOut">
               <a:rPr lang="en-US" smtClean="0"/>
-              <a:t>9/10/15</a:t>
+              <a:t>9/11/15</a:t>
             </a:fld>
             <a:endParaRPr lang="en-US"/>
           </a:p>
@@ -1903,7 +2425,7 @@
           <a:p>
             <a:fld id="{03BFE068-5F14-F44F-AF9C-C119BEA90396}" type="datetimeFigureOut">
               <a:rPr lang="en-US" smtClean="0"/>
-              <a:t>9/10/15</a:t>
+              <a:t>9/11/15</a:t>
             </a:fld>
             <a:endParaRPr lang="en-US"/>
           </a:p>
@@ -2325,7 +2847,7 @@
           <a:p>
             <a:fld id="{03BFE068-5F14-F44F-AF9C-C119BEA90396}" type="datetimeFigureOut">
               <a:rPr lang="en-US" smtClean="0"/>
-              <a:t>9/10/15</a:t>
+              <a:t>9/11/15</a:t>
             </a:fld>
             <a:endParaRPr lang="en-US"/>
           </a:p>
@@ -2443,7 +2965,7 @@
           <a:p>
             <a:fld id="{03BFE068-5F14-F44F-AF9C-C119BEA90396}" type="datetimeFigureOut">
               <a:rPr lang="en-US" smtClean="0"/>
-              <a:t>9/10/15</a:t>
+              <a:t>9/11/15</a:t>
             </a:fld>
             <a:endParaRPr lang="en-US"/>
           </a:p>
@@ -2538,7 +3060,7 @@
           <a:p>
             <a:fld id="{03BFE068-5F14-F44F-AF9C-C119BEA90396}" type="datetimeFigureOut">
               <a:rPr lang="en-US" smtClean="0"/>
-              <a:t>9/10/15</a:t>
+              <a:t>9/11/15</a:t>
             </a:fld>
             <a:endParaRPr lang="en-US"/>
           </a:p>
@@ -2815,7 +3337,7 @@
           <a:p>
             <a:fld id="{03BFE068-5F14-F44F-AF9C-C119BEA90396}" type="datetimeFigureOut">
               <a:rPr lang="en-US" smtClean="0"/>
-              <a:t>9/10/15</a:t>
+              <a:t>9/11/15</a:t>
             </a:fld>
             <a:endParaRPr lang="en-US"/>
           </a:p>
@@ -3068,7 +3590,7 @@
           <a:p>
             <a:fld id="{03BFE068-5F14-F44F-AF9C-C119BEA90396}" type="datetimeFigureOut">
               <a:rPr lang="en-US" smtClean="0"/>
-              <a:t>9/10/15</a:t>
+              <a:t>9/11/15</a:t>
             </a:fld>
             <a:endParaRPr lang="en-US"/>
           </a:p>
@@ -3281,7 +3803,7 @@
           <a:p>
             <a:fld id="{03BFE068-5F14-F44F-AF9C-C119BEA90396}" type="datetimeFigureOut">
               <a:rPr lang="en-US" smtClean="0"/>
-              <a:t>9/10/15</a:t>
+              <a:t>9/11/15</a:t>
             </a:fld>
             <a:endParaRPr lang="en-US"/>
           </a:p>
@@ -7191,6 +7713,3955 @@
     <p:extLst>
       <p:ext uri="{BB962C8B-B14F-4D97-AF65-F5344CB8AC3E}">
         <p14:creationId xmlns:p14="http://schemas.microsoft.com/office/powerpoint/2010/main" val="3244953779"/>
+      </p:ext>
+    </p:extLst>
+  </p:cSld>
+  <p:clrMapOvr>
+    <a:masterClrMapping/>
+  </p:clrMapOvr>
+  <p:timing>
+    <p:tnLst>
+      <p:par>
+        <p:cTn xmlns:p14="http://schemas.microsoft.com/office/powerpoint/2010/main" id="1" dur="indefinite" restart="never" nodeType="tmRoot"/>
+      </p:par>
+    </p:tnLst>
+  </p:timing>
+</p:sld>
+</file>
+
+<file path=ppt/slides/slide4.xml><?xml version="1.0" encoding="utf-8"?>
+<p:sld xmlns:a="http://schemas.openxmlformats.org/drawingml/2006/main" xmlns:r="http://schemas.openxmlformats.org/officeDocument/2006/relationships" xmlns:p="http://schemas.openxmlformats.org/presentationml/2006/main">
+  <p:cSld>
+    <p:spTree>
+      <p:nvGrpSpPr>
+        <p:cNvPr id="1" name=""/>
+        <p:cNvGrpSpPr/>
+        <p:nvPr/>
+      </p:nvGrpSpPr>
+      <p:grpSpPr>
+        <a:xfrm>
+          <a:off x="0" y="0"/>
+          <a:ext cx="0" cy="0"/>
+          <a:chOff x="0" y="0"/>
+          <a:chExt cx="0" cy="0"/>
+        </a:xfrm>
+      </p:grpSpPr>
+      <p:sp>
+        <p:nvSpPr>
+          <p:cNvPr id="19" name="Rounded Rectangle 18"/>
+          <p:cNvSpPr/>
+          <p:nvPr/>
+        </p:nvSpPr>
+        <p:spPr>
+          <a:xfrm>
+            <a:off x="296333" y="1499915"/>
+            <a:ext cx="2651125" cy="5166901"/>
+          </a:xfrm>
+          <a:prstGeom prst="roundRect">
+            <a:avLst>
+              <a:gd name="adj" fmla="val 4048"/>
+            </a:avLst>
+          </a:prstGeom>
+          <a:solidFill>
+            <a:schemeClr val="accent5">
+              <a:lumMod val="20000"/>
+              <a:lumOff val="80000"/>
+            </a:schemeClr>
+          </a:solidFill>
+          <a:ln>
+            <a:solidFill>
+              <a:schemeClr val="accent5">
+                <a:lumMod val="50000"/>
+              </a:schemeClr>
+            </a:solidFill>
+          </a:ln>
+        </p:spPr>
+        <p:style>
+          <a:lnRef idx="1">
+            <a:schemeClr val="accent1"/>
+          </a:lnRef>
+          <a:fillRef idx="3">
+            <a:schemeClr val="accent1"/>
+          </a:fillRef>
+          <a:effectRef idx="2">
+            <a:schemeClr val="accent1"/>
+          </a:effectRef>
+          <a:fontRef idx="minor">
+            <a:schemeClr val="lt1"/>
+          </a:fontRef>
+        </p:style>
+        <p:txBody>
+          <a:bodyPr rtlCol="0" anchor="t"/>
+          <a:lstStyle/>
+          <a:p>
+            <a:pPr algn="ctr"/>
+            <a:r>
+              <a:rPr lang="en-US" sz="2600" b="1" dirty="0" smtClean="0">
+                <a:solidFill>
+                  <a:schemeClr val="tx1">
+                    <a:lumMod val="85000"/>
+                    <a:lumOff val="15000"/>
+                  </a:schemeClr>
+                </a:solidFill>
+              </a:rPr>
+              <a:t>Open Ed</a:t>
+            </a:r>
+            <a:endParaRPr lang="en-US" sz="2600" b="1" dirty="0">
+              <a:solidFill>
+                <a:schemeClr val="tx1">
+                  <a:lumMod val="85000"/>
+                  <a:lumOff val="15000"/>
+                </a:schemeClr>
+              </a:solidFill>
+            </a:endParaRPr>
+          </a:p>
+        </p:txBody>
+      </p:sp>
+      <p:sp>
+        <p:nvSpPr>
+          <p:cNvPr id="2" name="Title 1"/>
+          <p:cNvSpPr>
+            <a:spLocks noGrp="1"/>
+          </p:cNvSpPr>
+          <p:nvPr>
+            <p:ph type="ctrTitle"/>
+          </p:nvPr>
+        </p:nvSpPr>
+        <p:spPr>
+          <a:xfrm>
+            <a:off x="542715" y="-48801"/>
+            <a:ext cx="7772400" cy="1470025"/>
+          </a:xfrm>
+        </p:spPr>
+        <p:txBody>
+          <a:bodyPr>
+            <a:normAutofit/>
+          </a:bodyPr>
+          <a:lstStyle/>
+          <a:p>
+            <a:r>
+              <a:rPr lang="en-US" sz="2800" dirty="0" smtClean="0"/>
+              <a:t>The space of data-intensive education for environmental science</a:t>
+            </a:r>
+            <a:endParaRPr lang="en-US" sz="2800" dirty="0"/>
+          </a:p>
+        </p:txBody>
+      </p:sp>
+      <p:sp>
+        <p:nvSpPr>
+          <p:cNvPr id="3" name="Rounded Rectangle 2"/>
+          <p:cNvSpPr/>
+          <p:nvPr/>
+        </p:nvSpPr>
+        <p:spPr>
+          <a:xfrm>
+            <a:off x="6275916" y="1401174"/>
+            <a:ext cx="2651125" cy="5166901"/>
+          </a:xfrm>
+          <a:prstGeom prst="roundRect">
+            <a:avLst>
+              <a:gd name="adj" fmla="val 4048"/>
+            </a:avLst>
+          </a:prstGeom>
+          <a:solidFill>
+            <a:schemeClr val="accent5">
+              <a:lumMod val="20000"/>
+              <a:lumOff val="80000"/>
+            </a:schemeClr>
+          </a:solidFill>
+          <a:ln>
+            <a:solidFill>
+              <a:schemeClr val="accent5">
+                <a:lumMod val="50000"/>
+              </a:schemeClr>
+            </a:solidFill>
+          </a:ln>
+        </p:spPr>
+        <p:style>
+          <a:lnRef idx="1">
+            <a:schemeClr val="accent1"/>
+          </a:lnRef>
+          <a:fillRef idx="3">
+            <a:schemeClr val="accent1"/>
+          </a:fillRef>
+          <a:effectRef idx="2">
+            <a:schemeClr val="accent1"/>
+          </a:effectRef>
+          <a:fontRef idx="minor">
+            <a:schemeClr val="lt1"/>
+          </a:fontRef>
+        </p:style>
+        <p:txBody>
+          <a:bodyPr rtlCol="0" anchor="t"/>
+          <a:lstStyle/>
+          <a:p>
+            <a:pPr algn="ctr"/>
+            <a:r>
+              <a:rPr lang="en-US" sz="2600" b="1" dirty="0" smtClean="0">
+                <a:solidFill>
+                  <a:schemeClr val="tx1">
+                    <a:lumMod val="85000"/>
+                    <a:lumOff val="15000"/>
+                  </a:schemeClr>
+                </a:solidFill>
+              </a:rPr>
+              <a:t>Traditional Ed</a:t>
+            </a:r>
+            <a:endParaRPr lang="en-US" sz="2600" b="1" dirty="0">
+              <a:solidFill>
+                <a:schemeClr val="tx1">
+                  <a:lumMod val="85000"/>
+                  <a:lumOff val="15000"/>
+                </a:schemeClr>
+              </a:solidFill>
+            </a:endParaRPr>
+          </a:p>
+        </p:txBody>
+      </p:sp>
+      <p:sp>
+        <p:nvSpPr>
+          <p:cNvPr id="42" name="Rounded Rectangle 41"/>
+          <p:cNvSpPr/>
+          <p:nvPr/>
+        </p:nvSpPr>
+        <p:spPr>
+          <a:xfrm>
+            <a:off x="6344178" y="2000249"/>
+            <a:ext cx="2514600" cy="4212168"/>
+          </a:xfrm>
+          <a:prstGeom prst="roundRect">
+            <a:avLst>
+              <a:gd name="adj" fmla="val 9921"/>
+            </a:avLst>
+          </a:prstGeom>
+          <a:solidFill>
+            <a:schemeClr val="accent4">
+              <a:lumMod val="20000"/>
+              <a:lumOff val="80000"/>
+              <a:alpha val="96000"/>
+            </a:schemeClr>
+          </a:solidFill>
+          <a:ln>
+            <a:solidFill>
+              <a:schemeClr val="accent4">
+                <a:lumMod val="75000"/>
+              </a:schemeClr>
+            </a:solidFill>
+          </a:ln>
+        </p:spPr>
+        <p:style>
+          <a:lnRef idx="1">
+            <a:schemeClr val="accent1"/>
+          </a:lnRef>
+          <a:fillRef idx="3">
+            <a:schemeClr val="accent1"/>
+          </a:fillRef>
+          <a:effectRef idx="2">
+            <a:schemeClr val="accent1"/>
+          </a:effectRef>
+          <a:fontRef idx="minor">
+            <a:schemeClr val="lt1"/>
+          </a:fontRef>
+        </p:style>
+        <p:txBody>
+          <a:bodyPr rtlCol="0" anchor="ctr"/>
+          <a:lstStyle/>
+          <a:p>
+            <a:pPr algn="ctr"/>
+            <a:r>
+              <a:rPr lang="en-US" dirty="0" smtClean="0">
+                <a:solidFill>
+                  <a:schemeClr val="tx1">
+                    <a:lumMod val="85000"/>
+                    <a:lumOff val="15000"/>
+                  </a:schemeClr>
+                </a:solidFill>
+              </a:rPr>
+              <a:t>Quantitative</a:t>
+            </a:r>
+            <a:br>
+              <a:rPr lang="en-US" dirty="0" smtClean="0">
+                <a:solidFill>
+                  <a:schemeClr val="tx1">
+                    <a:lumMod val="85000"/>
+                    <a:lumOff val="15000"/>
+                  </a:schemeClr>
+                </a:solidFill>
+              </a:rPr>
+            </a:br>
+            <a:r>
+              <a:rPr lang="en-US" dirty="0" smtClean="0">
+                <a:solidFill>
+                  <a:schemeClr val="tx1">
+                    <a:lumMod val="85000"/>
+                    <a:lumOff val="15000"/>
+                  </a:schemeClr>
+                </a:solidFill>
+              </a:rPr>
+              <a:t>Courses</a:t>
+            </a:r>
+            <a:endParaRPr lang="en-US" dirty="0">
+              <a:solidFill>
+                <a:schemeClr val="tx1">
+                  <a:lumMod val="85000"/>
+                  <a:lumOff val="15000"/>
+                </a:schemeClr>
+              </a:solidFill>
+            </a:endParaRPr>
+          </a:p>
+        </p:txBody>
+      </p:sp>
+      <p:sp>
+        <p:nvSpPr>
+          <p:cNvPr id="49" name="Rounded Rectangle 48"/>
+          <p:cNvSpPr/>
+          <p:nvPr/>
+        </p:nvSpPr>
+        <p:spPr>
+          <a:xfrm>
+            <a:off x="6441544" y="3019512"/>
+            <a:ext cx="2338917" cy="2917738"/>
+          </a:xfrm>
+          <a:prstGeom prst="roundRect">
+            <a:avLst>
+              <a:gd name="adj" fmla="val 4064"/>
+            </a:avLst>
+          </a:prstGeom>
+          <a:solidFill>
+            <a:schemeClr val="accent4">
+              <a:lumMod val="20000"/>
+              <a:lumOff val="80000"/>
+              <a:alpha val="96000"/>
+            </a:schemeClr>
+          </a:solidFill>
+          <a:ln>
+            <a:solidFill>
+              <a:schemeClr val="accent4">
+                <a:lumMod val="75000"/>
+              </a:schemeClr>
+            </a:solidFill>
+          </a:ln>
+        </p:spPr>
+        <p:style>
+          <a:lnRef idx="1">
+            <a:schemeClr val="accent1"/>
+          </a:lnRef>
+          <a:fillRef idx="3">
+            <a:schemeClr val="accent1"/>
+          </a:fillRef>
+          <a:effectRef idx="2">
+            <a:schemeClr val="accent1"/>
+          </a:effectRef>
+          <a:fontRef idx="minor">
+            <a:schemeClr val="lt1"/>
+          </a:fontRef>
+        </p:style>
+        <p:txBody>
+          <a:bodyPr rtlCol="0" anchor="t"/>
+          <a:lstStyle/>
+          <a:p>
+            <a:pPr algn="ctr"/>
+            <a:r>
+              <a:rPr lang="en-US" dirty="0" smtClean="0">
+                <a:solidFill>
+                  <a:schemeClr val="tx1">
+                    <a:lumMod val="85000"/>
+                    <a:lumOff val="15000"/>
+                  </a:schemeClr>
+                </a:solidFill>
+              </a:rPr>
+              <a:t>Course</a:t>
+            </a:r>
+            <a:endParaRPr lang="en-US" dirty="0">
+              <a:solidFill>
+                <a:schemeClr val="tx1">
+                  <a:lumMod val="85000"/>
+                  <a:lumOff val="15000"/>
+                </a:schemeClr>
+              </a:solidFill>
+            </a:endParaRPr>
+          </a:p>
+        </p:txBody>
+      </p:sp>
+      <p:sp>
+        <p:nvSpPr>
+          <p:cNvPr id="50" name="Rounded Rectangle 49"/>
+          <p:cNvSpPr/>
+          <p:nvPr/>
+        </p:nvSpPr>
+        <p:spPr>
+          <a:xfrm>
+            <a:off x="6585478" y="3760199"/>
+            <a:ext cx="2089150" cy="633002"/>
+          </a:xfrm>
+          <a:prstGeom prst="roundRect">
+            <a:avLst>
+              <a:gd name="adj" fmla="val 9921"/>
+            </a:avLst>
+          </a:prstGeom>
+          <a:solidFill>
+            <a:schemeClr val="accent2">
+              <a:lumMod val="40000"/>
+              <a:lumOff val="60000"/>
+              <a:alpha val="96000"/>
+            </a:schemeClr>
+          </a:solidFill>
+          <a:ln>
+            <a:solidFill>
+              <a:schemeClr val="accent2">
+                <a:lumMod val="50000"/>
+              </a:schemeClr>
+            </a:solidFill>
+          </a:ln>
+        </p:spPr>
+        <p:style>
+          <a:lnRef idx="1">
+            <a:schemeClr val="accent1"/>
+          </a:lnRef>
+          <a:fillRef idx="3">
+            <a:schemeClr val="accent1"/>
+          </a:fillRef>
+          <a:effectRef idx="2">
+            <a:schemeClr val="accent1"/>
+          </a:effectRef>
+          <a:fontRef idx="minor">
+            <a:schemeClr val="lt1"/>
+          </a:fontRef>
+        </p:style>
+        <p:txBody>
+          <a:bodyPr rtlCol="0" anchor="ctr"/>
+          <a:lstStyle/>
+          <a:p>
+            <a:pPr algn="ctr"/>
+            <a:r>
+              <a:rPr lang="en-US" dirty="0" smtClean="0">
+                <a:solidFill>
+                  <a:schemeClr val="tx1">
+                    <a:lumMod val="85000"/>
+                    <a:lumOff val="15000"/>
+                  </a:schemeClr>
+                </a:solidFill>
+              </a:rPr>
+              <a:t>Lab</a:t>
+            </a:r>
+            <a:endParaRPr lang="en-US" dirty="0">
+              <a:solidFill>
+                <a:schemeClr val="tx1">
+                  <a:lumMod val="85000"/>
+                  <a:lumOff val="15000"/>
+                </a:schemeClr>
+              </a:solidFill>
+            </a:endParaRPr>
+          </a:p>
+        </p:txBody>
+      </p:sp>
+      <p:sp>
+        <p:nvSpPr>
+          <p:cNvPr id="51" name="Rounded Rectangle 50"/>
+          <p:cNvSpPr/>
+          <p:nvPr/>
+        </p:nvSpPr>
+        <p:spPr>
+          <a:xfrm>
+            <a:off x="6585478" y="4488177"/>
+            <a:ext cx="2089150" cy="633002"/>
+          </a:xfrm>
+          <a:prstGeom prst="roundRect">
+            <a:avLst>
+              <a:gd name="adj" fmla="val 9921"/>
+            </a:avLst>
+          </a:prstGeom>
+          <a:solidFill>
+            <a:srgbClr val="E6B9B8">
+              <a:alpha val="96000"/>
+            </a:srgbClr>
+          </a:solidFill>
+          <a:ln>
+            <a:solidFill>
+              <a:srgbClr val="632523"/>
+            </a:solidFill>
+          </a:ln>
+        </p:spPr>
+        <p:style>
+          <a:lnRef idx="1">
+            <a:schemeClr val="accent1"/>
+          </a:lnRef>
+          <a:fillRef idx="3">
+            <a:schemeClr val="accent1"/>
+          </a:fillRef>
+          <a:effectRef idx="2">
+            <a:schemeClr val="accent1"/>
+          </a:effectRef>
+          <a:fontRef idx="minor">
+            <a:schemeClr val="lt1"/>
+          </a:fontRef>
+        </p:style>
+        <p:txBody>
+          <a:bodyPr rtlCol="0" anchor="ctr"/>
+          <a:lstStyle/>
+          <a:p>
+            <a:pPr algn="ctr"/>
+            <a:r>
+              <a:rPr lang="en-US" dirty="0" smtClean="0">
+                <a:solidFill>
+                  <a:schemeClr val="tx1">
+                    <a:lumMod val="85000"/>
+                    <a:lumOff val="15000"/>
+                  </a:schemeClr>
+                </a:solidFill>
+              </a:rPr>
+              <a:t>Lecture</a:t>
+            </a:r>
+            <a:endParaRPr lang="en-US" dirty="0">
+              <a:solidFill>
+                <a:schemeClr val="tx1">
+                  <a:lumMod val="85000"/>
+                  <a:lumOff val="15000"/>
+                </a:schemeClr>
+              </a:solidFill>
+            </a:endParaRPr>
+          </a:p>
+        </p:txBody>
+      </p:sp>
+      <p:sp>
+        <p:nvSpPr>
+          <p:cNvPr id="52" name="Diamond 51"/>
+          <p:cNvSpPr/>
+          <p:nvPr/>
+        </p:nvSpPr>
+        <p:spPr>
+          <a:xfrm>
+            <a:off x="3457365" y="1641533"/>
+            <a:ext cx="2222500" cy="1381125"/>
+          </a:xfrm>
+          <a:prstGeom prst="diamond">
+            <a:avLst/>
+          </a:prstGeom>
+          <a:solidFill>
+            <a:schemeClr val="accent3">
+              <a:lumMod val="40000"/>
+              <a:lumOff val="60000"/>
+            </a:schemeClr>
+          </a:solidFill>
+          <a:ln>
+            <a:solidFill>
+              <a:schemeClr val="accent3">
+                <a:lumMod val="50000"/>
+              </a:schemeClr>
+            </a:solidFill>
+          </a:ln>
+        </p:spPr>
+        <p:style>
+          <a:lnRef idx="1">
+            <a:schemeClr val="accent1"/>
+          </a:lnRef>
+          <a:fillRef idx="3">
+            <a:schemeClr val="accent1"/>
+          </a:fillRef>
+          <a:effectRef idx="2">
+            <a:schemeClr val="accent1"/>
+          </a:effectRef>
+          <a:fontRef idx="minor">
+            <a:schemeClr val="lt1"/>
+          </a:fontRef>
+        </p:style>
+        <p:txBody>
+          <a:bodyPr rtlCol="0" anchor="ctr"/>
+          <a:lstStyle/>
+          <a:p>
+            <a:pPr algn="ctr"/>
+            <a:r>
+              <a:rPr lang="en-US" dirty="0" smtClean="0">
+                <a:solidFill>
+                  <a:schemeClr val="tx1">
+                    <a:lumMod val="85000"/>
+                    <a:lumOff val="15000"/>
+                  </a:schemeClr>
+                </a:solidFill>
+              </a:rPr>
+              <a:t>Unit</a:t>
+            </a:r>
+            <a:endParaRPr lang="en-US" dirty="0">
+              <a:solidFill>
+                <a:schemeClr val="tx1">
+                  <a:lumMod val="85000"/>
+                  <a:lumOff val="15000"/>
+                </a:schemeClr>
+              </a:solidFill>
+            </a:endParaRPr>
+          </a:p>
+        </p:txBody>
+      </p:sp>
+      <p:sp>
+        <p:nvSpPr>
+          <p:cNvPr id="11" name="TextBox 10"/>
+          <p:cNvSpPr txBox="1"/>
+          <p:nvPr/>
+        </p:nvSpPr>
+        <p:spPr>
+          <a:xfrm>
+            <a:off x="7034211" y="2287084"/>
+            <a:ext cx="990212" cy="369332"/>
+          </a:xfrm>
+          <a:prstGeom prst="rect">
+            <a:avLst/>
+          </a:prstGeom>
+          <a:noFill/>
+        </p:spPr>
+        <p:txBody>
+          <a:bodyPr wrap="none" rtlCol="0">
+            <a:spAutoFit/>
+          </a:bodyPr>
+          <a:lstStyle/>
+          <a:p>
+            <a:r>
+              <a:rPr lang="en-US" dirty="0" smtClean="0"/>
+              <a:t>Program</a:t>
+            </a:r>
+            <a:endParaRPr lang="en-US" dirty="0"/>
+          </a:p>
+        </p:txBody>
+      </p:sp>
+      <p:sp>
+        <p:nvSpPr>
+          <p:cNvPr id="33" name="Rounded Rectangle 32"/>
+          <p:cNvSpPr/>
+          <p:nvPr/>
+        </p:nvSpPr>
+        <p:spPr>
+          <a:xfrm>
+            <a:off x="368190" y="2324499"/>
+            <a:ext cx="2514600" cy="1244233"/>
+          </a:xfrm>
+          <a:prstGeom prst="roundRect">
+            <a:avLst>
+              <a:gd name="adj" fmla="val 9921"/>
+            </a:avLst>
+          </a:prstGeom>
+          <a:solidFill>
+            <a:schemeClr val="accent4">
+              <a:lumMod val="20000"/>
+              <a:lumOff val="80000"/>
+              <a:alpha val="96000"/>
+            </a:schemeClr>
+          </a:solidFill>
+          <a:ln>
+            <a:solidFill>
+              <a:schemeClr val="accent4">
+                <a:lumMod val="75000"/>
+              </a:schemeClr>
+            </a:solidFill>
+          </a:ln>
+        </p:spPr>
+        <p:style>
+          <a:lnRef idx="1">
+            <a:schemeClr val="accent1"/>
+          </a:lnRef>
+          <a:fillRef idx="3">
+            <a:schemeClr val="accent1"/>
+          </a:fillRef>
+          <a:effectRef idx="2">
+            <a:schemeClr val="accent1"/>
+          </a:effectRef>
+          <a:fontRef idx="minor">
+            <a:schemeClr val="lt1"/>
+          </a:fontRef>
+        </p:style>
+        <p:txBody>
+          <a:bodyPr rtlCol="0" anchor="t"/>
+          <a:lstStyle/>
+          <a:p>
+            <a:pPr algn="ctr"/>
+            <a:r>
+              <a:rPr lang="en-US" dirty="0" smtClean="0">
+                <a:solidFill>
+                  <a:schemeClr val="tx1">
+                    <a:lumMod val="85000"/>
+                    <a:lumOff val="15000"/>
+                  </a:schemeClr>
+                </a:solidFill>
+              </a:rPr>
+              <a:t>(Short) Course</a:t>
+            </a:r>
+            <a:endParaRPr lang="en-US" dirty="0">
+              <a:solidFill>
+                <a:schemeClr val="tx1">
+                  <a:lumMod val="85000"/>
+                  <a:lumOff val="15000"/>
+                </a:schemeClr>
+              </a:solidFill>
+            </a:endParaRPr>
+          </a:p>
+        </p:txBody>
+      </p:sp>
+      <p:sp>
+        <p:nvSpPr>
+          <p:cNvPr id="34" name="Rounded Rectangle 33"/>
+          <p:cNvSpPr/>
+          <p:nvPr/>
+        </p:nvSpPr>
+        <p:spPr>
+          <a:xfrm>
+            <a:off x="368190" y="3855175"/>
+            <a:ext cx="2514600" cy="1487425"/>
+          </a:xfrm>
+          <a:prstGeom prst="roundRect">
+            <a:avLst>
+              <a:gd name="adj" fmla="val 9921"/>
+            </a:avLst>
+          </a:prstGeom>
+          <a:solidFill>
+            <a:schemeClr val="accent4">
+              <a:lumMod val="20000"/>
+              <a:lumOff val="80000"/>
+              <a:alpha val="96000"/>
+            </a:schemeClr>
+          </a:solidFill>
+          <a:ln>
+            <a:solidFill>
+              <a:schemeClr val="accent4">
+                <a:lumMod val="75000"/>
+              </a:schemeClr>
+            </a:solidFill>
+          </a:ln>
+        </p:spPr>
+        <p:style>
+          <a:lnRef idx="1">
+            <a:schemeClr val="accent1"/>
+          </a:lnRef>
+          <a:fillRef idx="3">
+            <a:schemeClr val="accent1"/>
+          </a:fillRef>
+          <a:effectRef idx="2">
+            <a:schemeClr val="accent1"/>
+          </a:effectRef>
+          <a:fontRef idx="minor">
+            <a:schemeClr val="lt1"/>
+          </a:fontRef>
+        </p:style>
+        <p:txBody>
+          <a:bodyPr rtlCol="0" anchor="t"/>
+          <a:lstStyle/>
+          <a:p>
+            <a:pPr algn="ctr"/>
+            <a:r>
+              <a:rPr lang="en-US" dirty="0" smtClean="0">
+                <a:solidFill>
+                  <a:schemeClr val="tx1">
+                    <a:lumMod val="85000"/>
+                    <a:lumOff val="15000"/>
+                  </a:schemeClr>
+                </a:solidFill>
+              </a:rPr>
+              <a:t>Workshop</a:t>
+            </a:r>
+            <a:endParaRPr lang="en-US" dirty="0">
+              <a:solidFill>
+                <a:schemeClr val="tx1">
+                  <a:lumMod val="85000"/>
+                  <a:lumOff val="15000"/>
+                </a:schemeClr>
+              </a:solidFill>
+            </a:endParaRPr>
+          </a:p>
+        </p:txBody>
+      </p:sp>
+      <p:sp>
+        <p:nvSpPr>
+          <p:cNvPr id="35" name="Rounded Rectangle 34"/>
+          <p:cNvSpPr/>
+          <p:nvPr/>
+        </p:nvSpPr>
+        <p:spPr>
+          <a:xfrm>
+            <a:off x="368190" y="5529791"/>
+            <a:ext cx="2514600" cy="814918"/>
+          </a:xfrm>
+          <a:prstGeom prst="roundRect">
+            <a:avLst>
+              <a:gd name="adj" fmla="val 9921"/>
+            </a:avLst>
+          </a:prstGeom>
+          <a:solidFill>
+            <a:schemeClr val="accent4">
+              <a:lumMod val="20000"/>
+              <a:lumOff val="80000"/>
+              <a:alpha val="96000"/>
+            </a:schemeClr>
+          </a:solidFill>
+          <a:ln>
+            <a:solidFill>
+              <a:schemeClr val="accent4">
+                <a:lumMod val="75000"/>
+              </a:schemeClr>
+            </a:solidFill>
+          </a:ln>
+        </p:spPr>
+        <p:style>
+          <a:lnRef idx="1">
+            <a:schemeClr val="accent1"/>
+          </a:lnRef>
+          <a:fillRef idx="3">
+            <a:schemeClr val="accent1"/>
+          </a:fillRef>
+          <a:effectRef idx="2">
+            <a:schemeClr val="accent1"/>
+          </a:effectRef>
+          <a:fontRef idx="minor">
+            <a:schemeClr val="lt1"/>
+          </a:fontRef>
+        </p:style>
+        <p:txBody>
+          <a:bodyPr rtlCol="0" anchor="ctr"/>
+          <a:lstStyle/>
+          <a:p>
+            <a:pPr algn="ctr"/>
+            <a:r>
+              <a:rPr lang="en-US" dirty="0" smtClean="0">
+                <a:solidFill>
+                  <a:schemeClr val="tx1">
+                    <a:lumMod val="85000"/>
+                    <a:lumOff val="15000"/>
+                  </a:schemeClr>
+                </a:solidFill>
+              </a:rPr>
+              <a:t>Seminar</a:t>
+            </a:r>
+            <a:endParaRPr lang="en-US" dirty="0">
+              <a:solidFill>
+                <a:schemeClr val="tx1">
+                  <a:lumMod val="85000"/>
+                  <a:lumOff val="15000"/>
+                </a:schemeClr>
+              </a:solidFill>
+            </a:endParaRPr>
+          </a:p>
+        </p:txBody>
+      </p:sp>
+      <p:sp>
+        <p:nvSpPr>
+          <p:cNvPr id="38" name="Rounded Rectangle 37"/>
+          <p:cNvSpPr/>
+          <p:nvPr/>
+        </p:nvSpPr>
+        <p:spPr>
+          <a:xfrm>
+            <a:off x="6585478" y="5207567"/>
+            <a:ext cx="2089150" cy="633002"/>
+          </a:xfrm>
+          <a:prstGeom prst="roundRect">
+            <a:avLst>
+              <a:gd name="adj" fmla="val 9921"/>
+            </a:avLst>
+          </a:prstGeom>
+          <a:solidFill>
+            <a:srgbClr val="E6B9B8">
+              <a:alpha val="96000"/>
+            </a:srgbClr>
+          </a:solidFill>
+          <a:ln>
+            <a:solidFill>
+              <a:srgbClr val="632523"/>
+            </a:solidFill>
+          </a:ln>
+        </p:spPr>
+        <p:style>
+          <a:lnRef idx="1">
+            <a:schemeClr val="accent1"/>
+          </a:lnRef>
+          <a:fillRef idx="3">
+            <a:schemeClr val="accent1"/>
+          </a:fillRef>
+          <a:effectRef idx="2">
+            <a:schemeClr val="accent1"/>
+          </a:effectRef>
+          <a:fontRef idx="minor">
+            <a:schemeClr val="lt1"/>
+          </a:fontRef>
+        </p:style>
+        <p:txBody>
+          <a:bodyPr rtlCol="0" anchor="ctr"/>
+          <a:lstStyle/>
+          <a:p>
+            <a:pPr algn="ctr"/>
+            <a:r>
+              <a:rPr lang="en-US" dirty="0" smtClean="0">
+                <a:solidFill>
+                  <a:schemeClr val="tx1">
+                    <a:lumMod val="85000"/>
+                    <a:lumOff val="15000"/>
+                  </a:schemeClr>
+                </a:solidFill>
+              </a:rPr>
+              <a:t>Discussion</a:t>
+            </a:r>
+            <a:endParaRPr lang="en-US" dirty="0">
+              <a:solidFill>
+                <a:schemeClr val="tx1">
+                  <a:lumMod val="85000"/>
+                  <a:lumOff val="15000"/>
+                </a:schemeClr>
+              </a:solidFill>
+            </a:endParaRPr>
+          </a:p>
+        </p:txBody>
+      </p:sp>
+      <p:sp>
+        <p:nvSpPr>
+          <p:cNvPr id="13" name="Oval 12"/>
+          <p:cNvSpPr/>
+          <p:nvPr/>
+        </p:nvSpPr>
+        <p:spPr>
+          <a:xfrm>
+            <a:off x="3393867" y="4621680"/>
+            <a:ext cx="1311485" cy="1034509"/>
+          </a:xfrm>
+          <a:prstGeom prst="ellipse">
+            <a:avLst/>
+          </a:prstGeom>
+        </p:spPr>
+        <p:style>
+          <a:lnRef idx="1">
+            <a:schemeClr val="accent1"/>
+          </a:lnRef>
+          <a:fillRef idx="3">
+            <a:schemeClr val="accent1"/>
+          </a:fillRef>
+          <a:effectRef idx="2">
+            <a:schemeClr val="accent1"/>
+          </a:effectRef>
+          <a:fontRef idx="minor">
+            <a:schemeClr val="lt1"/>
+          </a:fontRef>
+        </p:style>
+        <p:txBody>
+          <a:bodyPr rtlCol="0" anchor="ctr"/>
+          <a:lstStyle/>
+          <a:p>
+            <a:pPr algn="ctr"/>
+            <a:r>
+              <a:rPr lang="en-US" dirty="0" smtClean="0"/>
+              <a:t>Data</a:t>
+            </a:r>
+            <a:endParaRPr lang="en-US" dirty="0"/>
+          </a:p>
+        </p:txBody>
+      </p:sp>
+      <p:sp>
+        <p:nvSpPr>
+          <p:cNvPr id="40" name="Oval 39"/>
+          <p:cNvSpPr/>
+          <p:nvPr/>
+        </p:nvSpPr>
+        <p:spPr>
+          <a:xfrm>
+            <a:off x="4470412" y="4621681"/>
+            <a:ext cx="1305538" cy="1029818"/>
+          </a:xfrm>
+          <a:prstGeom prst="ellipse">
+            <a:avLst/>
+          </a:prstGeom>
+        </p:spPr>
+        <p:style>
+          <a:lnRef idx="1">
+            <a:schemeClr val="accent1"/>
+          </a:lnRef>
+          <a:fillRef idx="3">
+            <a:schemeClr val="accent1"/>
+          </a:fillRef>
+          <a:effectRef idx="2">
+            <a:schemeClr val="accent1"/>
+          </a:effectRef>
+          <a:fontRef idx="minor">
+            <a:schemeClr val="lt1"/>
+          </a:fontRef>
+        </p:style>
+        <p:txBody>
+          <a:bodyPr rtlCol="0" anchor="ctr"/>
+          <a:lstStyle/>
+          <a:p>
+            <a:pPr algn="ctr"/>
+            <a:r>
+              <a:rPr lang="en-US" dirty="0" smtClean="0"/>
+              <a:t>Code</a:t>
+            </a:r>
+            <a:endParaRPr lang="en-US" dirty="0"/>
+          </a:p>
+        </p:txBody>
+      </p:sp>
+      <p:sp>
+        <p:nvSpPr>
+          <p:cNvPr id="43" name="Rounded Rectangle 42"/>
+          <p:cNvSpPr/>
+          <p:nvPr/>
+        </p:nvSpPr>
+        <p:spPr>
+          <a:xfrm>
+            <a:off x="542715" y="4488177"/>
+            <a:ext cx="2089150" cy="633002"/>
+          </a:xfrm>
+          <a:prstGeom prst="roundRect">
+            <a:avLst>
+              <a:gd name="adj" fmla="val 9921"/>
+            </a:avLst>
+          </a:prstGeom>
+          <a:solidFill>
+            <a:srgbClr val="E6B9B8">
+              <a:alpha val="96000"/>
+            </a:srgbClr>
+          </a:solidFill>
+          <a:ln>
+            <a:solidFill>
+              <a:srgbClr val="632523"/>
+            </a:solidFill>
+          </a:ln>
+        </p:spPr>
+        <p:style>
+          <a:lnRef idx="1">
+            <a:schemeClr val="accent1"/>
+          </a:lnRef>
+          <a:fillRef idx="3">
+            <a:schemeClr val="accent1"/>
+          </a:fillRef>
+          <a:effectRef idx="2">
+            <a:schemeClr val="accent1"/>
+          </a:effectRef>
+          <a:fontRef idx="minor">
+            <a:schemeClr val="lt1"/>
+          </a:fontRef>
+        </p:style>
+        <p:txBody>
+          <a:bodyPr rtlCol="0" anchor="ctr"/>
+          <a:lstStyle/>
+          <a:p>
+            <a:pPr algn="ctr"/>
+            <a:r>
+              <a:rPr lang="en-US" dirty="0" smtClean="0">
+                <a:solidFill>
+                  <a:schemeClr val="tx1">
+                    <a:lumMod val="85000"/>
+                    <a:lumOff val="15000"/>
+                  </a:schemeClr>
+                </a:solidFill>
+              </a:rPr>
+              <a:t>Hands-on Activity</a:t>
+            </a:r>
+            <a:endParaRPr lang="en-US" dirty="0">
+              <a:solidFill>
+                <a:schemeClr val="tx1">
+                  <a:lumMod val="85000"/>
+                  <a:lumOff val="15000"/>
+                </a:schemeClr>
+              </a:solidFill>
+            </a:endParaRPr>
+          </a:p>
+        </p:txBody>
+      </p:sp>
+      <p:sp>
+        <p:nvSpPr>
+          <p:cNvPr id="44" name="Rounded Rectangle 43"/>
+          <p:cNvSpPr/>
+          <p:nvPr/>
+        </p:nvSpPr>
+        <p:spPr>
+          <a:xfrm>
+            <a:off x="542715" y="2757153"/>
+            <a:ext cx="2089150" cy="633002"/>
+          </a:xfrm>
+          <a:prstGeom prst="roundRect">
+            <a:avLst>
+              <a:gd name="adj" fmla="val 9921"/>
+            </a:avLst>
+          </a:prstGeom>
+          <a:solidFill>
+            <a:srgbClr val="E6B9B8">
+              <a:alpha val="96000"/>
+            </a:srgbClr>
+          </a:solidFill>
+          <a:ln>
+            <a:solidFill>
+              <a:srgbClr val="632523"/>
+            </a:solidFill>
+          </a:ln>
+        </p:spPr>
+        <p:style>
+          <a:lnRef idx="1">
+            <a:schemeClr val="accent1"/>
+          </a:lnRef>
+          <a:fillRef idx="3">
+            <a:schemeClr val="accent1"/>
+          </a:fillRef>
+          <a:effectRef idx="2">
+            <a:schemeClr val="accent1"/>
+          </a:effectRef>
+          <a:fontRef idx="minor">
+            <a:schemeClr val="lt1"/>
+          </a:fontRef>
+        </p:style>
+        <p:txBody>
+          <a:bodyPr rtlCol="0" anchor="ctr"/>
+          <a:lstStyle/>
+          <a:p>
+            <a:pPr algn="ctr"/>
+            <a:r>
+              <a:rPr lang="en-US" dirty="0" smtClean="0">
+                <a:solidFill>
+                  <a:schemeClr val="tx1">
+                    <a:lumMod val="85000"/>
+                    <a:lumOff val="15000"/>
+                  </a:schemeClr>
+                </a:solidFill>
+              </a:rPr>
+              <a:t>Group Project</a:t>
+            </a:r>
+            <a:endParaRPr lang="en-US" dirty="0">
+              <a:solidFill>
+                <a:schemeClr val="tx1">
+                  <a:lumMod val="85000"/>
+                  <a:lumOff val="15000"/>
+                </a:schemeClr>
+              </a:solidFill>
+            </a:endParaRPr>
+          </a:p>
+        </p:txBody>
+      </p:sp>
+      <p:sp>
+        <p:nvSpPr>
+          <p:cNvPr id="58" name="Diamond 57"/>
+          <p:cNvSpPr/>
+          <p:nvPr/>
+        </p:nvSpPr>
+        <p:spPr>
+          <a:xfrm>
+            <a:off x="3457365" y="3069636"/>
+            <a:ext cx="2222500" cy="1381125"/>
+          </a:xfrm>
+          <a:prstGeom prst="diamond">
+            <a:avLst/>
+          </a:prstGeom>
+          <a:solidFill>
+            <a:schemeClr val="accent3">
+              <a:lumMod val="40000"/>
+              <a:lumOff val="60000"/>
+            </a:schemeClr>
+          </a:solidFill>
+          <a:ln>
+            <a:solidFill>
+              <a:schemeClr val="accent3">
+                <a:lumMod val="50000"/>
+              </a:schemeClr>
+            </a:solidFill>
+          </a:ln>
+        </p:spPr>
+        <p:style>
+          <a:lnRef idx="1">
+            <a:schemeClr val="accent1"/>
+          </a:lnRef>
+          <a:fillRef idx="3">
+            <a:schemeClr val="accent1"/>
+          </a:fillRef>
+          <a:effectRef idx="2">
+            <a:schemeClr val="accent1"/>
+          </a:effectRef>
+          <a:fontRef idx="minor">
+            <a:schemeClr val="lt1"/>
+          </a:fontRef>
+        </p:style>
+        <p:txBody>
+          <a:bodyPr rtlCol="0" anchor="ctr"/>
+          <a:lstStyle/>
+          <a:p>
+            <a:pPr algn="ctr"/>
+            <a:r>
+              <a:rPr lang="en-US" dirty="0" smtClean="0">
+                <a:solidFill>
+                  <a:schemeClr val="tx1">
+                    <a:lumMod val="85000"/>
+                    <a:lumOff val="15000"/>
+                  </a:schemeClr>
+                </a:solidFill>
+              </a:rPr>
+              <a:t>Lesson</a:t>
+            </a:r>
+            <a:endParaRPr lang="en-US" dirty="0">
+              <a:solidFill>
+                <a:schemeClr val="tx1">
+                  <a:lumMod val="85000"/>
+                  <a:lumOff val="15000"/>
+                </a:schemeClr>
+              </a:solidFill>
+            </a:endParaRPr>
+          </a:p>
+        </p:txBody>
+      </p:sp>
+    </p:spTree>
+    <p:extLst>
+      <p:ext uri="{BB962C8B-B14F-4D97-AF65-F5344CB8AC3E}">
+        <p14:creationId xmlns:p14="http://schemas.microsoft.com/office/powerpoint/2010/main" val="1816265108"/>
+      </p:ext>
+    </p:extLst>
+  </p:cSld>
+  <p:clrMapOvr>
+    <a:masterClrMapping/>
+  </p:clrMapOvr>
+  <p:timing>
+    <p:tnLst>
+      <p:par>
+        <p:cTn xmlns:p14="http://schemas.microsoft.com/office/powerpoint/2010/main" id="1" dur="indefinite" restart="never" nodeType="tmRoot"/>
+      </p:par>
+    </p:tnLst>
+  </p:timing>
+</p:sld>
+</file>
+
+<file path=ppt/slides/slide5.xml><?xml version="1.0" encoding="utf-8"?>
+<p:sld xmlns:a="http://schemas.openxmlformats.org/drawingml/2006/main" xmlns:r="http://schemas.openxmlformats.org/officeDocument/2006/relationships" xmlns:p="http://schemas.openxmlformats.org/presentationml/2006/main">
+  <p:cSld>
+    <p:spTree>
+      <p:nvGrpSpPr>
+        <p:cNvPr id="1" name=""/>
+        <p:cNvGrpSpPr/>
+        <p:nvPr/>
+      </p:nvGrpSpPr>
+      <p:grpSpPr>
+        <a:xfrm>
+          <a:off x="0" y="0"/>
+          <a:ext cx="0" cy="0"/>
+          <a:chOff x="0" y="0"/>
+          <a:chExt cx="0" cy="0"/>
+        </a:xfrm>
+      </p:grpSpPr>
+      <p:sp>
+        <p:nvSpPr>
+          <p:cNvPr id="19" name="Rounded Rectangle 18"/>
+          <p:cNvSpPr/>
+          <p:nvPr/>
+        </p:nvSpPr>
+        <p:spPr>
+          <a:xfrm>
+            <a:off x="296333" y="1499915"/>
+            <a:ext cx="2651125" cy="5166901"/>
+          </a:xfrm>
+          <a:prstGeom prst="roundRect">
+            <a:avLst>
+              <a:gd name="adj" fmla="val 4048"/>
+            </a:avLst>
+          </a:prstGeom>
+          <a:solidFill>
+            <a:schemeClr val="accent5">
+              <a:lumMod val="20000"/>
+              <a:lumOff val="80000"/>
+            </a:schemeClr>
+          </a:solidFill>
+          <a:ln>
+            <a:solidFill>
+              <a:schemeClr val="accent5">
+                <a:lumMod val="50000"/>
+              </a:schemeClr>
+            </a:solidFill>
+          </a:ln>
+        </p:spPr>
+        <p:style>
+          <a:lnRef idx="1">
+            <a:schemeClr val="accent1"/>
+          </a:lnRef>
+          <a:fillRef idx="3">
+            <a:schemeClr val="accent1"/>
+          </a:fillRef>
+          <a:effectRef idx="2">
+            <a:schemeClr val="accent1"/>
+          </a:effectRef>
+          <a:fontRef idx="minor">
+            <a:schemeClr val="lt1"/>
+          </a:fontRef>
+        </p:style>
+        <p:txBody>
+          <a:bodyPr rtlCol="0" anchor="t"/>
+          <a:lstStyle/>
+          <a:p>
+            <a:pPr algn="ctr"/>
+            <a:r>
+              <a:rPr lang="en-US" sz="2600" b="1" dirty="0" smtClean="0">
+                <a:solidFill>
+                  <a:schemeClr val="tx1">
+                    <a:lumMod val="85000"/>
+                    <a:lumOff val="15000"/>
+                  </a:schemeClr>
+                </a:solidFill>
+              </a:rPr>
+              <a:t>Open Ed</a:t>
+            </a:r>
+            <a:endParaRPr lang="en-US" sz="2600" b="1" dirty="0">
+              <a:solidFill>
+                <a:schemeClr val="tx1">
+                  <a:lumMod val="85000"/>
+                  <a:lumOff val="15000"/>
+                </a:schemeClr>
+              </a:solidFill>
+            </a:endParaRPr>
+          </a:p>
+        </p:txBody>
+      </p:sp>
+      <p:sp>
+        <p:nvSpPr>
+          <p:cNvPr id="2" name="Title 1"/>
+          <p:cNvSpPr>
+            <a:spLocks noGrp="1"/>
+          </p:cNvSpPr>
+          <p:nvPr>
+            <p:ph type="ctrTitle"/>
+          </p:nvPr>
+        </p:nvSpPr>
+        <p:spPr>
+          <a:xfrm>
+            <a:off x="542715" y="-48801"/>
+            <a:ext cx="7772400" cy="1470025"/>
+          </a:xfrm>
+        </p:spPr>
+        <p:txBody>
+          <a:bodyPr>
+            <a:normAutofit/>
+          </a:bodyPr>
+          <a:lstStyle/>
+          <a:p>
+            <a:r>
+              <a:rPr lang="en-US" sz="2800" dirty="0" smtClean="0"/>
+              <a:t>The space of data-intensive education for environmental science</a:t>
+            </a:r>
+            <a:endParaRPr lang="en-US" sz="2800" dirty="0"/>
+          </a:p>
+        </p:txBody>
+      </p:sp>
+      <p:sp>
+        <p:nvSpPr>
+          <p:cNvPr id="3" name="Rounded Rectangle 2"/>
+          <p:cNvSpPr/>
+          <p:nvPr/>
+        </p:nvSpPr>
+        <p:spPr>
+          <a:xfrm>
+            <a:off x="6275916" y="1401174"/>
+            <a:ext cx="2651125" cy="5166901"/>
+          </a:xfrm>
+          <a:prstGeom prst="roundRect">
+            <a:avLst>
+              <a:gd name="adj" fmla="val 4048"/>
+            </a:avLst>
+          </a:prstGeom>
+          <a:solidFill>
+            <a:schemeClr val="accent5">
+              <a:lumMod val="20000"/>
+              <a:lumOff val="80000"/>
+            </a:schemeClr>
+          </a:solidFill>
+          <a:ln>
+            <a:solidFill>
+              <a:schemeClr val="accent5">
+                <a:lumMod val="50000"/>
+              </a:schemeClr>
+            </a:solidFill>
+          </a:ln>
+        </p:spPr>
+        <p:style>
+          <a:lnRef idx="1">
+            <a:schemeClr val="accent1"/>
+          </a:lnRef>
+          <a:fillRef idx="3">
+            <a:schemeClr val="accent1"/>
+          </a:fillRef>
+          <a:effectRef idx="2">
+            <a:schemeClr val="accent1"/>
+          </a:effectRef>
+          <a:fontRef idx="minor">
+            <a:schemeClr val="lt1"/>
+          </a:fontRef>
+        </p:style>
+        <p:txBody>
+          <a:bodyPr rtlCol="0" anchor="t"/>
+          <a:lstStyle/>
+          <a:p>
+            <a:pPr algn="ctr"/>
+            <a:r>
+              <a:rPr lang="en-US" sz="2600" b="1" dirty="0" smtClean="0">
+                <a:solidFill>
+                  <a:schemeClr val="tx1">
+                    <a:lumMod val="85000"/>
+                    <a:lumOff val="15000"/>
+                  </a:schemeClr>
+                </a:solidFill>
+              </a:rPr>
+              <a:t>Traditional Ed</a:t>
+            </a:r>
+            <a:endParaRPr lang="en-US" sz="2600" b="1" dirty="0">
+              <a:solidFill>
+                <a:schemeClr val="tx1">
+                  <a:lumMod val="85000"/>
+                  <a:lumOff val="15000"/>
+                </a:schemeClr>
+              </a:solidFill>
+            </a:endParaRPr>
+          </a:p>
+        </p:txBody>
+      </p:sp>
+      <p:sp>
+        <p:nvSpPr>
+          <p:cNvPr id="42" name="Rounded Rectangle 41"/>
+          <p:cNvSpPr/>
+          <p:nvPr/>
+        </p:nvSpPr>
+        <p:spPr>
+          <a:xfrm>
+            <a:off x="6344178" y="2000249"/>
+            <a:ext cx="2514600" cy="4212168"/>
+          </a:xfrm>
+          <a:prstGeom prst="roundRect">
+            <a:avLst>
+              <a:gd name="adj" fmla="val 9921"/>
+            </a:avLst>
+          </a:prstGeom>
+          <a:solidFill>
+            <a:schemeClr val="accent4">
+              <a:lumMod val="20000"/>
+              <a:lumOff val="80000"/>
+              <a:alpha val="96000"/>
+            </a:schemeClr>
+          </a:solidFill>
+          <a:ln>
+            <a:solidFill>
+              <a:schemeClr val="accent4">
+                <a:lumMod val="75000"/>
+              </a:schemeClr>
+            </a:solidFill>
+          </a:ln>
+        </p:spPr>
+        <p:style>
+          <a:lnRef idx="1">
+            <a:schemeClr val="accent1"/>
+          </a:lnRef>
+          <a:fillRef idx="3">
+            <a:schemeClr val="accent1"/>
+          </a:fillRef>
+          <a:effectRef idx="2">
+            <a:schemeClr val="accent1"/>
+          </a:effectRef>
+          <a:fontRef idx="minor">
+            <a:schemeClr val="lt1"/>
+          </a:fontRef>
+        </p:style>
+        <p:txBody>
+          <a:bodyPr rtlCol="0" anchor="ctr"/>
+          <a:lstStyle/>
+          <a:p>
+            <a:pPr algn="ctr"/>
+            <a:r>
+              <a:rPr lang="en-US" dirty="0" smtClean="0">
+                <a:solidFill>
+                  <a:schemeClr val="tx1">
+                    <a:lumMod val="85000"/>
+                    <a:lumOff val="15000"/>
+                  </a:schemeClr>
+                </a:solidFill>
+              </a:rPr>
+              <a:t>Quantitative</a:t>
+            </a:r>
+            <a:br>
+              <a:rPr lang="en-US" dirty="0" smtClean="0">
+                <a:solidFill>
+                  <a:schemeClr val="tx1">
+                    <a:lumMod val="85000"/>
+                    <a:lumOff val="15000"/>
+                  </a:schemeClr>
+                </a:solidFill>
+              </a:rPr>
+            </a:br>
+            <a:r>
+              <a:rPr lang="en-US" dirty="0" smtClean="0">
+                <a:solidFill>
+                  <a:schemeClr val="tx1">
+                    <a:lumMod val="85000"/>
+                    <a:lumOff val="15000"/>
+                  </a:schemeClr>
+                </a:solidFill>
+              </a:rPr>
+              <a:t>Courses</a:t>
+            </a:r>
+            <a:endParaRPr lang="en-US" dirty="0">
+              <a:solidFill>
+                <a:schemeClr val="tx1">
+                  <a:lumMod val="85000"/>
+                  <a:lumOff val="15000"/>
+                </a:schemeClr>
+              </a:solidFill>
+            </a:endParaRPr>
+          </a:p>
+        </p:txBody>
+      </p:sp>
+      <p:sp>
+        <p:nvSpPr>
+          <p:cNvPr id="49" name="Rounded Rectangle 48"/>
+          <p:cNvSpPr/>
+          <p:nvPr/>
+        </p:nvSpPr>
+        <p:spPr>
+          <a:xfrm>
+            <a:off x="6441544" y="3019512"/>
+            <a:ext cx="2338917" cy="2917738"/>
+          </a:xfrm>
+          <a:prstGeom prst="roundRect">
+            <a:avLst>
+              <a:gd name="adj" fmla="val 4064"/>
+            </a:avLst>
+          </a:prstGeom>
+          <a:solidFill>
+            <a:schemeClr val="accent4">
+              <a:lumMod val="20000"/>
+              <a:lumOff val="80000"/>
+              <a:alpha val="96000"/>
+            </a:schemeClr>
+          </a:solidFill>
+          <a:ln>
+            <a:solidFill>
+              <a:schemeClr val="accent4">
+                <a:lumMod val="75000"/>
+              </a:schemeClr>
+            </a:solidFill>
+          </a:ln>
+        </p:spPr>
+        <p:style>
+          <a:lnRef idx="1">
+            <a:schemeClr val="accent1"/>
+          </a:lnRef>
+          <a:fillRef idx="3">
+            <a:schemeClr val="accent1"/>
+          </a:fillRef>
+          <a:effectRef idx="2">
+            <a:schemeClr val="accent1"/>
+          </a:effectRef>
+          <a:fontRef idx="minor">
+            <a:schemeClr val="lt1"/>
+          </a:fontRef>
+        </p:style>
+        <p:txBody>
+          <a:bodyPr rtlCol="0" anchor="t"/>
+          <a:lstStyle/>
+          <a:p>
+            <a:pPr algn="ctr"/>
+            <a:r>
+              <a:rPr lang="en-US" dirty="0" smtClean="0">
+                <a:solidFill>
+                  <a:schemeClr val="tx1">
+                    <a:lumMod val="85000"/>
+                    <a:lumOff val="15000"/>
+                  </a:schemeClr>
+                </a:solidFill>
+              </a:rPr>
+              <a:t>Course</a:t>
+            </a:r>
+            <a:endParaRPr lang="en-US" dirty="0">
+              <a:solidFill>
+                <a:schemeClr val="tx1">
+                  <a:lumMod val="85000"/>
+                  <a:lumOff val="15000"/>
+                </a:schemeClr>
+              </a:solidFill>
+            </a:endParaRPr>
+          </a:p>
+        </p:txBody>
+      </p:sp>
+      <p:sp>
+        <p:nvSpPr>
+          <p:cNvPr id="50" name="Rounded Rectangle 49"/>
+          <p:cNvSpPr/>
+          <p:nvPr/>
+        </p:nvSpPr>
+        <p:spPr>
+          <a:xfrm>
+            <a:off x="6585478" y="3760199"/>
+            <a:ext cx="2089150" cy="633002"/>
+          </a:xfrm>
+          <a:prstGeom prst="roundRect">
+            <a:avLst>
+              <a:gd name="adj" fmla="val 9921"/>
+            </a:avLst>
+          </a:prstGeom>
+          <a:solidFill>
+            <a:schemeClr val="accent2">
+              <a:lumMod val="40000"/>
+              <a:lumOff val="60000"/>
+              <a:alpha val="96000"/>
+            </a:schemeClr>
+          </a:solidFill>
+          <a:ln>
+            <a:solidFill>
+              <a:schemeClr val="accent2">
+                <a:lumMod val="50000"/>
+              </a:schemeClr>
+            </a:solidFill>
+          </a:ln>
+        </p:spPr>
+        <p:style>
+          <a:lnRef idx="1">
+            <a:schemeClr val="accent1"/>
+          </a:lnRef>
+          <a:fillRef idx="3">
+            <a:schemeClr val="accent1"/>
+          </a:fillRef>
+          <a:effectRef idx="2">
+            <a:schemeClr val="accent1"/>
+          </a:effectRef>
+          <a:fontRef idx="minor">
+            <a:schemeClr val="lt1"/>
+          </a:fontRef>
+        </p:style>
+        <p:txBody>
+          <a:bodyPr rtlCol="0" anchor="ctr"/>
+          <a:lstStyle/>
+          <a:p>
+            <a:pPr algn="ctr"/>
+            <a:r>
+              <a:rPr lang="en-US" dirty="0" smtClean="0">
+                <a:solidFill>
+                  <a:schemeClr val="tx1">
+                    <a:lumMod val="85000"/>
+                    <a:lumOff val="15000"/>
+                  </a:schemeClr>
+                </a:solidFill>
+              </a:rPr>
+              <a:t>Lab</a:t>
+            </a:r>
+            <a:endParaRPr lang="en-US" dirty="0">
+              <a:solidFill>
+                <a:schemeClr val="tx1">
+                  <a:lumMod val="85000"/>
+                  <a:lumOff val="15000"/>
+                </a:schemeClr>
+              </a:solidFill>
+            </a:endParaRPr>
+          </a:p>
+        </p:txBody>
+      </p:sp>
+      <p:sp>
+        <p:nvSpPr>
+          <p:cNvPr id="51" name="Rounded Rectangle 50"/>
+          <p:cNvSpPr/>
+          <p:nvPr/>
+        </p:nvSpPr>
+        <p:spPr>
+          <a:xfrm>
+            <a:off x="6585478" y="4488177"/>
+            <a:ext cx="2089150" cy="633002"/>
+          </a:xfrm>
+          <a:prstGeom prst="roundRect">
+            <a:avLst>
+              <a:gd name="adj" fmla="val 9921"/>
+            </a:avLst>
+          </a:prstGeom>
+          <a:solidFill>
+            <a:srgbClr val="E6B9B8">
+              <a:alpha val="96000"/>
+            </a:srgbClr>
+          </a:solidFill>
+          <a:ln>
+            <a:solidFill>
+              <a:srgbClr val="632523"/>
+            </a:solidFill>
+          </a:ln>
+        </p:spPr>
+        <p:style>
+          <a:lnRef idx="1">
+            <a:schemeClr val="accent1"/>
+          </a:lnRef>
+          <a:fillRef idx="3">
+            <a:schemeClr val="accent1"/>
+          </a:fillRef>
+          <a:effectRef idx="2">
+            <a:schemeClr val="accent1"/>
+          </a:effectRef>
+          <a:fontRef idx="minor">
+            <a:schemeClr val="lt1"/>
+          </a:fontRef>
+        </p:style>
+        <p:txBody>
+          <a:bodyPr rtlCol="0" anchor="ctr"/>
+          <a:lstStyle/>
+          <a:p>
+            <a:pPr algn="ctr"/>
+            <a:r>
+              <a:rPr lang="en-US" dirty="0" smtClean="0">
+                <a:solidFill>
+                  <a:schemeClr val="tx1">
+                    <a:lumMod val="85000"/>
+                    <a:lumOff val="15000"/>
+                  </a:schemeClr>
+                </a:solidFill>
+              </a:rPr>
+              <a:t>Lecture</a:t>
+            </a:r>
+            <a:endParaRPr lang="en-US" dirty="0">
+              <a:solidFill>
+                <a:schemeClr val="tx1">
+                  <a:lumMod val="85000"/>
+                  <a:lumOff val="15000"/>
+                </a:schemeClr>
+              </a:solidFill>
+            </a:endParaRPr>
+          </a:p>
+        </p:txBody>
+      </p:sp>
+      <p:sp>
+        <p:nvSpPr>
+          <p:cNvPr id="52" name="Diamond 51"/>
+          <p:cNvSpPr/>
+          <p:nvPr/>
+        </p:nvSpPr>
+        <p:spPr>
+          <a:xfrm>
+            <a:off x="3200100" y="1641533"/>
+            <a:ext cx="2640384" cy="2980147"/>
+          </a:xfrm>
+          <a:prstGeom prst="diamond">
+            <a:avLst/>
+          </a:prstGeom>
+          <a:solidFill>
+            <a:schemeClr val="accent3">
+              <a:lumMod val="40000"/>
+              <a:lumOff val="60000"/>
+            </a:schemeClr>
+          </a:solidFill>
+          <a:ln>
+            <a:solidFill>
+              <a:schemeClr val="accent3">
+                <a:lumMod val="50000"/>
+              </a:schemeClr>
+            </a:solidFill>
+          </a:ln>
+        </p:spPr>
+        <p:style>
+          <a:lnRef idx="1">
+            <a:schemeClr val="accent1"/>
+          </a:lnRef>
+          <a:fillRef idx="3">
+            <a:schemeClr val="accent1"/>
+          </a:fillRef>
+          <a:effectRef idx="2">
+            <a:schemeClr val="accent1"/>
+          </a:effectRef>
+          <a:fontRef idx="minor">
+            <a:schemeClr val="lt1"/>
+          </a:fontRef>
+        </p:style>
+        <p:txBody>
+          <a:bodyPr rtlCol="0" anchor="t"/>
+          <a:lstStyle/>
+          <a:p>
+            <a:pPr algn="ctr"/>
+            <a:r>
+              <a:rPr lang="en-US" dirty="0" smtClean="0">
+                <a:solidFill>
+                  <a:schemeClr val="tx1">
+                    <a:lumMod val="85000"/>
+                    <a:lumOff val="15000"/>
+                  </a:schemeClr>
+                </a:solidFill>
+              </a:rPr>
+              <a:t>Unit</a:t>
+            </a:r>
+            <a:endParaRPr lang="en-US" dirty="0">
+              <a:solidFill>
+                <a:schemeClr val="tx1">
+                  <a:lumMod val="85000"/>
+                  <a:lumOff val="15000"/>
+                </a:schemeClr>
+              </a:solidFill>
+            </a:endParaRPr>
+          </a:p>
+        </p:txBody>
+      </p:sp>
+      <p:sp>
+        <p:nvSpPr>
+          <p:cNvPr id="11" name="TextBox 10"/>
+          <p:cNvSpPr txBox="1"/>
+          <p:nvPr/>
+        </p:nvSpPr>
+        <p:spPr>
+          <a:xfrm>
+            <a:off x="7034211" y="2287084"/>
+            <a:ext cx="990212" cy="369332"/>
+          </a:xfrm>
+          <a:prstGeom prst="rect">
+            <a:avLst/>
+          </a:prstGeom>
+          <a:noFill/>
+        </p:spPr>
+        <p:txBody>
+          <a:bodyPr wrap="none" rtlCol="0">
+            <a:spAutoFit/>
+          </a:bodyPr>
+          <a:lstStyle/>
+          <a:p>
+            <a:r>
+              <a:rPr lang="en-US" dirty="0" smtClean="0"/>
+              <a:t>Program</a:t>
+            </a:r>
+            <a:endParaRPr lang="en-US" dirty="0"/>
+          </a:p>
+        </p:txBody>
+      </p:sp>
+      <p:sp>
+        <p:nvSpPr>
+          <p:cNvPr id="33" name="Rounded Rectangle 32"/>
+          <p:cNvSpPr/>
+          <p:nvPr/>
+        </p:nvSpPr>
+        <p:spPr>
+          <a:xfrm>
+            <a:off x="368190" y="2324499"/>
+            <a:ext cx="2514600" cy="1244233"/>
+          </a:xfrm>
+          <a:prstGeom prst="roundRect">
+            <a:avLst>
+              <a:gd name="adj" fmla="val 9921"/>
+            </a:avLst>
+          </a:prstGeom>
+          <a:solidFill>
+            <a:schemeClr val="accent4">
+              <a:lumMod val="20000"/>
+              <a:lumOff val="80000"/>
+              <a:alpha val="96000"/>
+            </a:schemeClr>
+          </a:solidFill>
+          <a:ln>
+            <a:solidFill>
+              <a:schemeClr val="accent4">
+                <a:lumMod val="75000"/>
+              </a:schemeClr>
+            </a:solidFill>
+          </a:ln>
+        </p:spPr>
+        <p:style>
+          <a:lnRef idx="1">
+            <a:schemeClr val="accent1"/>
+          </a:lnRef>
+          <a:fillRef idx="3">
+            <a:schemeClr val="accent1"/>
+          </a:fillRef>
+          <a:effectRef idx="2">
+            <a:schemeClr val="accent1"/>
+          </a:effectRef>
+          <a:fontRef idx="minor">
+            <a:schemeClr val="lt1"/>
+          </a:fontRef>
+        </p:style>
+        <p:txBody>
+          <a:bodyPr rtlCol="0" anchor="t"/>
+          <a:lstStyle/>
+          <a:p>
+            <a:pPr algn="ctr"/>
+            <a:r>
+              <a:rPr lang="en-US" dirty="0" smtClean="0">
+                <a:solidFill>
+                  <a:schemeClr val="tx1">
+                    <a:lumMod val="85000"/>
+                    <a:lumOff val="15000"/>
+                  </a:schemeClr>
+                </a:solidFill>
+              </a:rPr>
+              <a:t>(Short) Course</a:t>
+            </a:r>
+            <a:endParaRPr lang="en-US" dirty="0">
+              <a:solidFill>
+                <a:schemeClr val="tx1">
+                  <a:lumMod val="85000"/>
+                  <a:lumOff val="15000"/>
+                </a:schemeClr>
+              </a:solidFill>
+            </a:endParaRPr>
+          </a:p>
+        </p:txBody>
+      </p:sp>
+      <p:sp>
+        <p:nvSpPr>
+          <p:cNvPr id="34" name="Rounded Rectangle 33"/>
+          <p:cNvSpPr/>
+          <p:nvPr/>
+        </p:nvSpPr>
+        <p:spPr>
+          <a:xfrm>
+            <a:off x="368190" y="3855175"/>
+            <a:ext cx="2514600" cy="1487425"/>
+          </a:xfrm>
+          <a:prstGeom prst="roundRect">
+            <a:avLst>
+              <a:gd name="adj" fmla="val 9921"/>
+            </a:avLst>
+          </a:prstGeom>
+          <a:solidFill>
+            <a:schemeClr val="accent4">
+              <a:lumMod val="20000"/>
+              <a:lumOff val="80000"/>
+              <a:alpha val="96000"/>
+            </a:schemeClr>
+          </a:solidFill>
+          <a:ln>
+            <a:solidFill>
+              <a:schemeClr val="accent4">
+                <a:lumMod val="75000"/>
+              </a:schemeClr>
+            </a:solidFill>
+          </a:ln>
+        </p:spPr>
+        <p:style>
+          <a:lnRef idx="1">
+            <a:schemeClr val="accent1"/>
+          </a:lnRef>
+          <a:fillRef idx="3">
+            <a:schemeClr val="accent1"/>
+          </a:fillRef>
+          <a:effectRef idx="2">
+            <a:schemeClr val="accent1"/>
+          </a:effectRef>
+          <a:fontRef idx="minor">
+            <a:schemeClr val="lt1"/>
+          </a:fontRef>
+        </p:style>
+        <p:txBody>
+          <a:bodyPr rtlCol="0" anchor="t"/>
+          <a:lstStyle/>
+          <a:p>
+            <a:pPr algn="ctr"/>
+            <a:r>
+              <a:rPr lang="en-US" dirty="0" smtClean="0">
+                <a:solidFill>
+                  <a:schemeClr val="tx1">
+                    <a:lumMod val="85000"/>
+                    <a:lumOff val="15000"/>
+                  </a:schemeClr>
+                </a:solidFill>
+              </a:rPr>
+              <a:t>Workshop</a:t>
+            </a:r>
+            <a:endParaRPr lang="en-US" dirty="0">
+              <a:solidFill>
+                <a:schemeClr val="tx1">
+                  <a:lumMod val="85000"/>
+                  <a:lumOff val="15000"/>
+                </a:schemeClr>
+              </a:solidFill>
+            </a:endParaRPr>
+          </a:p>
+        </p:txBody>
+      </p:sp>
+      <p:sp>
+        <p:nvSpPr>
+          <p:cNvPr id="35" name="Rounded Rectangle 34"/>
+          <p:cNvSpPr/>
+          <p:nvPr/>
+        </p:nvSpPr>
+        <p:spPr>
+          <a:xfrm>
+            <a:off x="368190" y="5529791"/>
+            <a:ext cx="2514600" cy="814918"/>
+          </a:xfrm>
+          <a:prstGeom prst="roundRect">
+            <a:avLst>
+              <a:gd name="adj" fmla="val 9921"/>
+            </a:avLst>
+          </a:prstGeom>
+          <a:solidFill>
+            <a:schemeClr val="accent4">
+              <a:lumMod val="20000"/>
+              <a:lumOff val="80000"/>
+              <a:alpha val="96000"/>
+            </a:schemeClr>
+          </a:solidFill>
+          <a:ln>
+            <a:solidFill>
+              <a:schemeClr val="accent4">
+                <a:lumMod val="75000"/>
+              </a:schemeClr>
+            </a:solidFill>
+          </a:ln>
+        </p:spPr>
+        <p:style>
+          <a:lnRef idx="1">
+            <a:schemeClr val="accent1"/>
+          </a:lnRef>
+          <a:fillRef idx="3">
+            <a:schemeClr val="accent1"/>
+          </a:fillRef>
+          <a:effectRef idx="2">
+            <a:schemeClr val="accent1"/>
+          </a:effectRef>
+          <a:fontRef idx="minor">
+            <a:schemeClr val="lt1"/>
+          </a:fontRef>
+        </p:style>
+        <p:txBody>
+          <a:bodyPr rtlCol="0" anchor="ctr"/>
+          <a:lstStyle/>
+          <a:p>
+            <a:pPr algn="ctr"/>
+            <a:r>
+              <a:rPr lang="en-US" dirty="0" smtClean="0">
+                <a:solidFill>
+                  <a:schemeClr val="tx1">
+                    <a:lumMod val="85000"/>
+                    <a:lumOff val="15000"/>
+                  </a:schemeClr>
+                </a:solidFill>
+              </a:rPr>
+              <a:t>Seminar</a:t>
+            </a:r>
+            <a:endParaRPr lang="en-US" dirty="0">
+              <a:solidFill>
+                <a:schemeClr val="tx1">
+                  <a:lumMod val="85000"/>
+                  <a:lumOff val="15000"/>
+                </a:schemeClr>
+              </a:solidFill>
+            </a:endParaRPr>
+          </a:p>
+        </p:txBody>
+      </p:sp>
+      <p:sp>
+        <p:nvSpPr>
+          <p:cNvPr id="38" name="Rounded Rectangle 37"/>
+          <p:cNvSpPr/>
+          <p:nvPr/>
+        </p:nvSpPr>
+        <p:spPr>
+          <a:xfrm>
+            <a:off x="6585478" y="5207567"/>
+            <a:ext cx="2089150" cy="633002"/>
+          </a:xfrm>
+          <a:prstGeom prst="roundRect">
+            <a:avLst>
+              <a:gd name="adj" fmla="val 9921"/>
+            </a:avLst>
+          </a:prstGeom>
+          <a:solidFill>
+            <a:srgbClr val="E6B9B8">
+              <a:alpha val="96000"/>
+            </a:srgbClr>
+          </a:solidFill>
+          <a:ln>
+            <a:solidFill>
+              <a:srgbClr val="632523"/>
+            </a:solidFill>
+          </a:ln>
+        </p:spPr>
+        <p:style>
+          <a:lnRef idx="1">
+            <a:schemeClr val="accent1"/>
+          </a:lnRef>
+          <a:fillRef idx="3">
+            <a:schemeClr val="accent1"/>
+          </a:fillRef>
+          <a:effectRef idx="2">
+            <a:schemeClr val="accent1"/>
+          </a:effectRef>
+          <a:fontRef idx="minor">
+            <a:schemeClr val="lt1"/>
+          </a:fontRef>
+        </p:style>
+        <p:txBody>
+          <a:bodyPr rtlCol="0" anchor="ctr"/>
+          <a:lstStyle/>
+          <a:p>
+            <a:pPr algn="ctr"/>
+            <a:r>
+              <a:rPr lang="en-US" dirty="0" smtClean="0">
+                <a:solidFill>
+                  <a:schemeClr val="tx1">
+                    <a:lumMod val="85000"/>
+                    <a:lumOff val="15000"/>
+                  </a:schemeClr>
+                </a:solidFill>
+              </a:rPr>
+              <a:t>Discussion</a:t>
+            </a:r>
+            <a:endParaRPr lang="en-US" dirty="0">
+              <a:solidFill>
+                <a:schemeClr val="tx1">
+                  <a:lumMod val="85000"/>
+                  <a:lumOff val="15000"/>
+                </a:schemeClr>
+              </a:solidFill>
+            </a:endParaRPr>
+          </a:p>
+        </p:txBody>
+      </p:sp>
+      <p:sp>
+        <p:nvSpPr>
+          <p:cNvPr id="13" name="Oval 12"/>
+          <p:cNvSpPr/>
+          <p:nvPr/>
+        </p:nvSpPr>
+        <p:spPr>
+          <a:xfrm>
+            <a:off x="3393867" y="4621680"/>
+            <a:ext cx="1311485" cy="1034509"/>
+          </a:xfrm>
+          <a:prstGeom prst="ellipse">
+            <a:avLst/>
+          </a:prstGeom>
+        </p:spPr>
+        <p:style>
+          <a:lnRef idx="1">
+            <a:schemeClr val="accent1"/>
+          </a:lnRef>
+          <a:fillRef idx="3">
+            <a:schemeClr val="accent1"/>
+          </a:fillRef>
+          <a:effectRef idx="2">
+            <a:schemeClr val="accent1"/>
+          </a:effectRef>
+          <a:fontRef idx="minor">
+            <a:schemeClr val="lt1"/>
+          </a:fontRef>
+        </p:style>
+        <p:txBody>
+          <a:bodyPr rtlCol="0" anchor="ctr"/>
+          <a:lstStyle/>
+          <a:p>
+            <a:pPr algn="ctr"/>
+            <a:r>
+              <a:rPr lang="en-US" dirty="0" smtClean="0"/>
+              <a:t>Data</a:t>
+            </a:r>
+            <a:endParaRPr lang="en-US" dirty="0"/>
+          </a:p>
+        </p:txBody>
+      </p:sp>
+      <p:sp>
+        <p:nvSpPr>
+          <p:cNvPr id="40" name="Oval 39"/>
+          <p:cNvSpPr/>
+          <p:nvPr/>
+        </p:nvSpPr>
+        <p:spPr>
+          <a:xfrm>
+            <a:off x="4470412" y="4621681"/>
+            <a:ext cx="1305538" cy="1029818"/>
+          </a:xfrm>
+          <a:prstGeom prst="ellipse">
+            <a:avLst/>
+          </a:prstGeom>
+        </p:spPr>
+        <p:style>
+          <a:lnRef idx="1">
+            <a:schemeClr val="accent1"/>
+          </a:lnRef>
+          <a:fillRef idx="3">
+            <a:schemeClr val="accent1"/>
+          </a:fillRef>
+          <a:effectRef idx="2">
+            <a:schemeClr val="accent1"/>
+          </a:effectRef>
+          <a:fontRef idx="minor">
+            <a:schemeClr val="lt1"/>
+          </a:fontRef>
+        </p:style>
+        <p:txBody>
+          <a:bodyPr rtlCol="0" anchor="ctr"/>
+          <a:lstStyle/>
+          <a:p>
+            <a:pPr algn="ctr"/>
+            <a:r>
+              <a:rPr lang="en-US" dirty="0" smtClean="0"/>
+              <a:t>Code</a:t>
+            </a:r>
+            <a:endParaRPr lang="en-US" dirty="0"/>
+          </a:p>
+        </p:txBody>
+      </p:sp>
+      <p:sp>
+        <p:nvSpPr>
+          <p:cNvPr id="43" name="Rounded Rectangle 42"/>
+          <p:cNvSpPr/>
+          <p:nvPr/>
+        </p:nvSpPr>
+        <p:spPr>
+          <a:xfrm>
+            <a:off x="542715" y="4488177"/>
+            <a:ext cx="2089150" cy="633002"/>
+          </a:xfrm>
+          <a:prstGeom prst="roundRect">
+            <a:avLst>
+              <a:gd name="adj" fmla="val 9921"/>
+            </a:avLst>
+          </a:prstGeom>
+          <a:solidFill>
+            <a:srgbClr val="E6B9B8">
+              <a:alpha val="96000"/>
+            </a:srgbClr>
+          </a:solidFill>
+          <a:ln>
+            <a:solidFill>
+              <a:srgbClr val="632523"/>
+            </a:solidFill>
+          </a:ln>
+        </p:spPr>
+        <p:style>
+          <a:lnRef idx="1">
+            <a:schemeClr val="accent1"/>
+          </a:lnRef>
+          <a:fillRef idx="3">
+            <a:schemeClr val="accent1"/>
+          </a:fillRef>
+          <a:effectRef idx="2">
+            <a:schemeClr val="accent1"/>
+          </a:effectRef>
+          <a:fontRef idx="minor">
+            <a:schemeClr val="lt1"/>
+          </a:fontRef>
+        </p:style>
+        <p:txBody>
+          <a:bodyPr rtlCol="0" anchor="ctr"/>
+          <a:lstStyle/>
+          <a:p>
+            <a:pPr algn="ctr"/>
+            <a:r>
+              <a:rPr lang="en-US" dirty="0" smtClean="0">
+                <a:solidFill>
+                  <a:schemeClr val="tx1">
+                    <a:lumMod val="85000"/>
+                    <a:lumOff val="15000"/>
+                  </a:schemeClr>
+                </a:solidFill>
+              </a:rPr>
+              <a:t>Hands-on Activity</a:t>
+            </a:r>
+            <a:endParaRPr lang="en-US" dirty="0">
+              <a:solidFill>
+                <a:schemeClr val="tx1">
+                  <a:lumMod val="85000"/>
+                  <a:lumOff val="15000"/>
+                </a:schemeClr>
+              </a:solidFill>
+            </a:endParaRPr>
+          </a:p>
+        </p:txBody>
+      </p:sp>
+      <p:sp>
+        <p:nvSpPr>
+          <p:cNvPr id="44" name="Rounded Rectangle 43"/>
+          <p:cNvSpPr/>
+          <p:nvPr/>
+        </p:nvSpPr>
+        <p:spPr>
+          <a:xfrm>
+            <a:off x="542715" y="2757153"/>
+            <a:ext cx="2089150" cy="633002"/>
+          </a:xfrm>
+          <a:prstGeom prst="roundRect">
+            <a:avLst>
+              <a:gd name="adj" fmla="val 9921"/>
+            </a:avLst>
+          </a:prstGeom>
+          <a:solidFill>
+            <a:srgbClr val="E6B9B8">
+              <a:alpha val="96000"/>
+            </a:srgbClr>
+          </a:solidFill>
+          <a:ln>
+            <a:solidFill>
+              <a:srgbClr val="632523"/>
+            </a:solidFill>
+          </a:ln>
+        </p:spPr>
+        <p:style>
+          <a:lnRef idx="1">
+            <a:schemeClr val="accent1"/>
+          </a:lnRef>
+          <a:fillRef idx="3">
+            <a:schemeClr val="accent1"/>
+          </a:fillRef>
+          <a:effectRef idx="2">
+            <a:schemeClr val="accent1"/>
+          </a:effectRef>
+          <a:fontRef idx="minor">
+            <a:schemeClr val="lt1"/>
+          </a:fontRef>
+        </p:style>
+        <p:txBody>
+          <a:bodyPr rtlCol="0" anchor="ctr"/>
+          <a:lstStyle/>
+          <a:p>
+            <a:pPr algn="ctr"/>
+            <a:r>
+              <a:rPr lang="en-US" dirty="0" smtClean="0">
+                <a:solidFill>
+                  <a:schemeClr val="tx1">
+                    <a:lumMod val="85000"/>
+                    <a:lumOff val="15000"/>
+                  </a:schemeClr>
+                </a:solidFill>
+              </a:rPr>
+              <a:t>Group Project</a:t>
+            </a:r>
+            <a:endParaRPr lang="en-US" dirty="0">
+              <a:solidFill>
+                <a:schemeClr val="tx1">
+                  <a:lumMod val="85000"/>
+                  <a:lumOff val="15000"/>
+                </a:schemeClr>
+              </a:solidFill>
+            </a:endParaRPr>
+          </a:p>
+        </p:txBody>
+      </p:sp>
+      <p:grpSp>
+        <p:nvGrpSpPr>
+          <p:cNvPr id="16" name="Group 15"/>
+          <p:cNvGrpSpPr/>
+          <p:nvPr/>
+        </p:nvGrpSpPr>
+        <p:grpSpPr>
+          <a:xfrm>
+            <a:off x="4010702" y="2879971"/>
+            <a:ext cx="951520" cy="1141583"/>
+            <a:chOff x="3457367" y="3243347"/>
+            <a:chExt cx="951520" cy="1141583"/>
+          </a:xfrm>
+        </p:grpSpPr>
+        <p:sp>
+          <p:nvSpPr>
+            <p:cNvPr id="15" name="Folded Corner 14"/>
+            <p:cNvSpPr/>
+            <p:nvPr/>
+          </p:nvSpPr>
+          <p:spPr>
+            <a:xfrm>
+              <a:off x="3457367" y="3243347"/>
+              <a:ext cx="688700" cy="881687"/>
+            </a:xfrm>
+            <a:prstGeom prst="foldedCorner">
+              <a:avLst/>
+            </a:prstGeom>
+          </p:spPr>
+          <p:style>
+            <a:lnRef idx="1">
+              <a:schemeClr val="accent1"/>
+            </a:lnRef>
+            <a:fillRef idx="3">
+              <a:schemeClr val="accent1"/>
+            </a:fillRef>
+            <a:effectRef idx="2">
+              <a:schemeClr val="accent1"/>
+            </a:effectRef>
+            <a:fontRef idx="minor">
+              <a:schemeClr val="lt1"/>
+            </a:fontRef>
+          </p:style>
+          <p:txBody>
+            <a:bodyPr rtlCol="0" anchor="ctr"/>
+            <a:lstStyle/>
+            <a:p>
+              <a:pPr algn="ctr"/>
+              <a:r>
+                <a:rPr lang="en-US" sz="1400" dirty="0" smtClean="0"/>
+                <a:t>Lesson</a:t>
+              </a:r>
+              <a:endParaRPr lang="en-US" sz="1400" dirty="0"/>
+            </a:p>
+          </p:txBody>
+        </p:sp>
+        <p:sp>
+          <p:nvSpPr>
+            <p:cNvPr id="46" name="Folded Corner 45"/>
+            <p:cNvSpPr/>
+            <p:nvPr/>
+          </p:nvSpPr>
+          <p:spPr>
+            <a:xfrm>
+              <a:off x="3536302" y="3319355"/>
+              <a:ext cx="688700" cy="881687"/>
+            </a:xfrm>
+            <a:prstGeom prst="foldedCorner">
+              <a:avLst/>
+            </a:prstGeom>
+          </p:spPr>
+          <p:style>
+            <a:lnRef idx="1">
+              <a:schemeClr val="accent1"/>
+            </a:lnRef>
+            <a:fillRef idx="3">
+              <a:schemeClr val="accent1"/>
+            </a:fillRef>
+            <a:effectRef idx="2">
+              <a:schemeClr val="accent1"/>
+            </a:effectRef>
+            <a:fontRef idx="minor">
+              <a:schemeClr val="lt1"/>
+            </a:fontRef>
+          </p:style>
+          <p:txBody>
+            <a:bodyPr rtlCol="0" anchor="ctr"/>
+            <a:lstStyle/>
+            <a:p>
+              <a:pPr algn="ctr"/>
+              <a:r>
+                <a:rPr lang="en-US" sz="1400" dirty="0" smtClean="0"/>
+                <a:t>Lesson</a:t>
+              </a:r>
+              <a:endParaRPr lang="en-US" sz="1400" dirty="0"/>
+            </a:p>
+          </p:txBody>
+        </p:sp>
+        <p:sp>
+          <p:nvSpPr>
+            <p:cNvPr id="55" name="Folded Corner 54"/>
+            <p:cNvSpPr/>
+            <p:nvPr/>
+          </p:nvSpPr>
+          <p:spPr>
+            <a:xfrm>
+              <a:off x="3625732" y="3408778"/>
+              <a:ext cx="688700" cy="881687"/>
+            </a:xfrm>
+            <a:prstGeom prst="foldedCorner">
+              <a:avLst/>
+            </a:prstGeom>
+          </p:spPr>
+          <p:style>
+            <a:lnRef idx="1">
+              <a:schemeClr val="accent1"/>
+            </a:lnRef>
+            <a:fillRef idx="3">
+              <a:schemeClr val="accent1"/>
+            </a:fillRef>
+            <a:effectRef idx="2">
+              <a:schemeClr val="accent1"/>
+            </a:effectRef>
+            <a:fontRef idx="minor">
+              <a:schemeClr val="lt1"/>
+            </a:fontRef>
+          </p:style>
+          <p:txBody>
+            <a:bodyPr rtlCol="0" anchor="ctr"/>
+            <a:lstStyle/>
+            <a:p>
+              <a:pPr algn="ctr"/>
+              <a:r>
+                <a:rPr lang="en-US" sz="1400" dirty="0" smtClean="0"/>
+                <a:t>Lesson</a:t>
+              </a:r>
+              <a:endParaRPr lang="en-US" sz="1400" dirty="0"/>
+            </a:p>
+          </p:txBody>
+        </p:sp>
+        <p:sp>
+          <p:nvSpPr>
+            <p:cNvPr id="56" name="Folded Corner 55"/>
+            <p:cNvSpPr/>
+            <p:nvPr/>
+          </p:nvSpPr>
+          <p:spPr>
+            <a:xfrm>
+              <a:off x="3720187" y="3503243"/>
+              <a:ext cx="688700" cy="881687"/>
+            </a:xfrm>
+            <a:prstGeom prst="foldedCorner">
+              <a:avLst/>
+            </a:prstGeom>
+          </p:spPr>
+          <p:style>
+            <a:lnRef idx="1">
+              <a:schemeClr val="accent1"/>
+            </a:lnRef>
+            <a:fillRef idx="3">
+              <a:schemeClr val="accent1"/>
+            </a:fillRef>
+            <a:effectRef idx="2">
+              <a:schemeClr val="accent1"/>
+            </a:effectRef>
+            <a:fontRef idx="minor">
+              <a:schemeClr val="lt1"/>
+            </a:fontRef>
+          </p:style>
+          <p:txBody>
+            <a:bodyPr rtlCol="0" anchor="ctr"/>
+            <a:lstStyle/>
+            <a:p>
+              <a:pPr algn="ctr"/>
+              <a:r>
+                <a:rPr lang="en-US" sz="1400" dirty="0" smtClean="0"/>
+                <a:t>Lesson</a:t>
+              </a:r>
+              <a:endParaRPr lang="en-US" sz="1400" dirty="0"/>
+            </a:p>
+          </p:txBody>
+        </p:sp>
+      </p:grpSp>
+    </p:spTree>
+    <p:extLst>
+      <p:ext uri="{BB962C8B-B14F-4D97-AF65-F5344CB8AC3E}">
+        <p14:creationId xmlns:p14="http://schemas.microsoft.com/office/powerpoint/2010/main" val="1594515012"/>
+      </p:ext>
+    </p:extLst>
+  </p:cSld>
+  <p:clrMapOvr>
+    <a:masterClrMapping/>
+  </p:clrMapOvr>
+  <p:timing>
+    <p:tnLst>
+      <p:par>
+        <p:cTn xmlns:p14="http://schemas.microsoft.com/office/powerpoint/2010/main" id="1" dur="indefinite" restart="never" nodeType="tmRoot"/>
+      </p:par>
+    </p:tnLst>
+  </p:timing>
+</p:sld>
+</file>
+
+<file path=ppt/slides/slide6.xml><?xml version="1.0" encoding="utf-8"?>
+<p:sld xmlns:a="http://schemas.openxmlformats.org/drawingml/2006/main" xmlns:r="http://schemas.openxmlformats.org/officeDocument/2006/relationships" xmlns:p="http://schemas.openxmlformats.org/presentationml/2006/main">
+  <p:cSld>
+    <p:spTree>
+      <p:nvGrpSpPr>
+        <p:cNvPr id="1" name=""/>
+        <p:cNvGrpSpPr/>
+        <p:nvPr/>
+      </p:nvGrpSpPr>
+      <p:grpSpPr>
+        <a:xfrm>
+          <a:off x="0" y="0"/>
+          <a:ext cx="0" cy="0"/>
+          <a:chOff x="0" y="0"/>
+          <a:chExt cx="0" cy="0"/>
+        </a:xfrm>
+      </p:grpSpPr>
+      <p:sp>
+        <p:nvSpPr>
+          <p:cNvPr id="19" name="Rounded Rectangle 18"/>
+          <p:cNvSpPr/>
+          <p:nvPr/>
+        </p:nvSpPr>
+        <p:spPr>
+          <a:xfrm>
+            <a:off x="296333" y="1499915"/>
+            <a:ext cx="2651125" cy="5166901"/>
+          </a:xfrm>
+          <a:prstGeom prst="roundRect">
+            <a:avLst>
+              <a:gd name="adj" fmla="val 4048"/>
+            </a:avLst>
+          </a:prstGeom>
+          <a:solidFill>
+            <a:schemeClr val="accent5">
+              <a:lumMod val="20000"/>
+              <a:lumOff val="80000"/>
+            </a:schemeClr>
+          </a:solidFill>
+          <a:ln>
+            <a:solidFill>
+              <a:schemeClr val="accent5">
+                <a:lumMod val="50000"/>
+              </a:schemeClr>
+            </a:solidFill>
+          </a:ln>
+        </p:spPr>
+        <p:style>
+          <a:lnRef idx="1">
+            <a:schemeClr val="accent1"/>
+          </a:lnRef>
+          <a:fillRef idx="3">
+            <a:schemeClr val="accent1"/>
+          </a:fillRef>
+          <a:effectRef idx="2">
+            <a:schemeClr val="accent1"/>
+          </a:effectRef>
+          <a:fontRef idx="minor">
+            <a:schemeClr val="lt1"/>
+          </a:fontRef>
+        </p:style>
+        <p:txBody>
+          <a:bodyPr rtlCol="0" anchor="t"/>
+          <a:lstStyle/>
+          <a:p>
+            <a:pPr algn="ctr"/>
+            <a:r>
+              <a:rPr lang="en-US" sz="2600" b="1" dirty="0" smtClean="0">
+                <a:solidFill>
+                  <a:schemeClr val="tx1">
+                    <a:lumMod val="85000"/>
+                    <a:lumOff val="15000"/>
+                  </a:schemeClr>
+                </a:solidFill>
+              </a:rPr>
+              <a:t>Open Ed</a:t>
+            </a:r>
+            <a:endParaRPr lang="en-US" sz="2600" b="1" dirty="0">
+              <a:solidFill>
+                <a:schemeClr val="tx1">
+                  <a:lumMod val="85000"/>
+                  <a:lumOff val="15000"/>
+                </a:schemeClr>
+              </a:solidFill>
+            </a:endParaRPr>
+          </a:p>
+        </p:txBody>
+      </p:sp>
+      <p:sp>
+        <p:nvSpPr>
+          <p:cNvPr id="2" name="Title 1"/>
+          <p:cNvSpPr>
+            <a:spLocks noGrp="1"/>
+          </p:cNvSpPr>
+          <p:nvPr>
+            <p:ph type="ctrTitle"/>
+          </p:nvPr>
+        </p:nvSpPr>
+        <p:spPr>
+          <a:xfrm>
+            <a:off x="542715" y="-48801"/>
+            <a:ext cx="7772400" cy="1470025"/>
+          </a:xfrm>
+        </p:spPr>
+        <p:txBody>
+          <a:bodyPr>
+            <a:normAutofit/>
+          </a:bodyPr>
+          <a:lstStyle/>
+          <a:p>
+            <a:r>
+              <a:rPr lang="en-US" sz="2800" dirty="0" smtClean="0"/>
+              <a:t>The space of data-intensive education for environmental science</a:t>
+            </a:r>
+            <a:endParaRPr lang="en-US" sz="2800" dirty="0"/>
+          </a:p>
+        </p:txBody>
+      </p:sp>
+      <p:sp>
+        <p:nvSpPr>
+          <p:cNvPr id="3" name="Rounded Rectangle 2"/>
+          <p:cNvSpPr/>
+          <p:nvPr/>
+        </p:nvSpPr>
+        <p:spPr>
+          <a:xfrm>
+            <a:off x="6275916" y="1401174"/>
+            <a:ext cx="2651125" cy="5166901"/>
+          </a:xfrm>
+          <a:prstGeom prst="roundRect">
+            <a:avLst>
+              <a:gd name="adj" fmla="val 4048"/>
+            </a:avLst>
+          </a:prstGeom>
+          <a:solidFill>
+            <a:schemeClr val="accent5">
+              <a:lumMod val="20000"/>
+              <a:lumOff val="80000"/>
+            </a:schemeClr>
+          </a:solidFill>
+          <a:ln>
+            <a:solidFill>
+              <a:schemeClr val="accent5">
+                <a:lumMod val="50000"/>
+              </a:schemeClr>
+            </a:solidFill>
+          </a:ln>
+        </p:spPr>
+        <p:style>
+          <a:lnRef idx="1">
+            <a:schemeClr val="accent1"/>
+          </a:lnRef>
+          <a:fillRef idx="3">
+            <a:schemeClr val="accent1"/>
+          </a:fillRef>
+          <a:effectRef idx="2">
+            <a:schemeClr val="accent1"/>
+          </a:effectRef>
+          <a:fontRef idx="minor">
+            <a:schemeClr val="lt1"/>
+          </a:fontRef>
+        </p:style>
+        <p:txBody>
+          <a:bodyPr rtlCol="0" anchor="t"/>
+          <a:lstStyle/>
+          <a:p>
+            <a:pPr algn="ctr"/>
+            <a:r>
+              <a:rPr lang="en-US" sz="2600" b="1" dirty="0" smtClean="0">
+                <a:solidFill>
+                  <a:schemeClr val="tx1">
+                    <a:lumMod val="85000"/>
+                    <a:lumOff val="15000"/>
+                  </a:schemeClr>
+                </a:solidFill>
+              </a:rPr>
+              <a:t>Traditional Ed</a:t>
+            </a:r>
+            <a:endParaRPr lang="en-US" sz="2600" b="1" dirty="0">
+              <a:solidFill>
+                <a:schemeClr val="tx1">
+                  <a:lumMod val="85000"/>
+                  <a:lumOff val="15000"/>
+                </a:schemeClr>
+              </a:solidFill>
+            </a:endParaRPr>
+          </a:p>
+        </p:txBody>
+      </p:sp>
+      <p:sp>
+        <p:nvSpPr>
+          <p:cNvPr id="42" name="Rounded Rectangle 41"/>
+          <p:cNvSpPr/>
+          <p:nvPr/>
+        </p:nvSpPr>
+        <p:spPr>
+          <a:xfrm>
+            <a:off x="6344178" y="2000249"/>
+            <a:ext cx="2514600" cy="4212168"/>
+          </a:xfrm>
+          <a:prstGeom prst="roundRect">
+            <a:avLst>
+              <a:gd name="adj" fmla="val 9921"/>
+            </a:avLst>
+          </a:prstGeom>
+          <a:solidFill>
+            <a:schemeClr val="accent4">
+              <a:lumMod val="20000"/>
+              <a:lumOff val="80000"/>
+              <a:alpha val="96000"/>
+            </a:schemeClr>
+          </a:solidFill>
+          <a:ln>
+            <a:solidFill>
+              <a:schemeClr val="accent4">
+                <a:lumMod val="75000"/>
+              </a:schemeClr>
+            </a:solidFill>
+          </a:ln>
+        </p:spPr>
+        <p:style>
+          <a:lnRef idx="1">
+            <a:schemeClr val="accent1"/>
+          </a:lnRef>
+          <a:fillRef idx="3">
+            <a:schemeClr val="accent1"/>
+          </a:fillRef>
+          <a:effectRef idx="2">
+            <a:schemeClr val="accent1"/>
+          </a:effectRef>
+          <a:fontRef idx="minor">
+            <a:schemeClr val="lt1"/>
+          </a:fontRef>
+        </p:style>
+        <p:txBody>
+          <a:bodyPr rtlCol="0" anchor="ctr"/>
+          <a:lstStyle/>
+          <a:p>
+            <a:pPr algn="ctr"/>
+            <a:r>
+              <a:rPr lang="en-US" dirty="0" smtClean="0">
+                <a:solidFill>
+                  <a:schemeClr val="tx1">
+                    <a:lumMod val="85000"/>
+                    <a:lumOff val="15000"/>
+                  </a:schemeClr>
+                </a:solidFill>
+              </a:rPr>
+              <a:t>Quantitative</a:t>
+            </a:r>
+            <a:br>
+              <a:rPr lang="en-US" dirty="0" smtClean="0">
+                <a:solidFill>
+                  <a:schemeClr val="tx1">
+                    <a:lumMod val="85000"/>
+                    <a:lumOff val="15000"/>
+                  </a:schemeClr>
+                </a:solidFill>
+              </a:rPr>
+            </a:br>
+            <a:r>
+              <a:rPr lang="en-US" dirty="0" smtClean="0">
+                <a:solidFill>
+                  <a:schemeClr val="tx1">
+                    <a:lumMod val="85000"/>
+                    <a:lumOff val="15000"/>
+                  </a:schemeClr>
+                </a:solidFill>
+              </a:rPr>
+              <a:t>Courses</a:t>
+            </a:r>
+            <a:endParaRPr lang="en-US" dirty="0">
+              <a:solidFill>
+                <a:schemeClr val="tx1">
+                  <a:lumMod val="85000"/>
+                  <a:lumOff val="15000"/>
+                </a:schemeClr>
+              </a:solidFill>
+            </a:endParaRPr>
+          </a:p>
+        </p:txBody>
+      </p:sp>
+      <p:sp>
+        <p:nvSpPr>
+          <p:cNvPr id="49" name="Rounded Rectangle 48"/>
+          <p:cNvSpPr/>
+          <p:nvPr/>
+        </p:nvSpPr>
+        <p:spPr>
+          <a:xfrm>
+            <a:off x="6441544" y="3019512"/>
+            <a:ext cx="2338917" cy="2917738"/>
+          </a:xfrm>
+          <a:prstGeom prst="roundRect">
+            <a:avLst>
+              <a:gd name="adj" fmla="val 4064"/>
+            </a:avLst>
+          </a:prstGeom>
+          <a:solidFill>
+            <a:schemeClr val="accent4">
+              <a:lumMod val="20000"/>
+              <a:lumOff val="80000"/>
+              <a:alpha val="96000"/>
+            </a:schemeClr>
+          </a:solidFill>
+          <a:ln>
+            <a:solidFill>
+              <a:schemeClr val="accent4">
+                <a:lumMod val="75000"/>
+              </a:schemeClr>
+            </a:solidFill>
+          </a:ln>
+        </p:spPr>
+        <p:style>
+          <a:lnRef idx="1">
+            <a:schemeClr val="accent1"/>
+          </a:lnRef>
+          <a:fillRef idx="3">
+            <a:schemeClr val="accent1"/>
+          </a:fillRef>
+          <a:effectRef idx="2">
+            <a:schemeClr val="accent1"/>
+          </a:effectRef>
+          <a:fontRef idx="minor">
+            <a:schemeClr val="lt1"/>
+          </a:fontRef>
+        </p:style>
+        <p:txBody>
+          <a:bodyPr rtlCol="0" anchor="t"/>
+          <a:lstStyle/>
+          <a:p>
+            <a:pPr algn="ctr"/>
+            <a:r>
+              <a:rPr lang="en-US" dirty="0" smtClean="0">
+                <a:solidFill>
+                  <a:schemeClr val="tx1">
+                    <a:lumMod val="85000"/>
+                    <a:lumOff val="15000"/>
+                  </a:schemeClr>
+                </a:solidFill>
+              </a:rPr>
+              <a:t>Course</a:t>
+            </a:r>
+            <a:endParaRPr lang="en-US" dirty="0">
+              <a:solidFill>
+                <a:schemeClr val="tx1">
+                  <a:lumMod val="85000"/>
+                  <a:lumOff val="15000"/>
+                </a:schemeClr>
+              </a:solidFill>
+            </a:endParaRPr>
+          </a:p>
+        </p:txBody>
+      </p:sp>
+      <p:sp>
+        <p:nvSpPr>
+          <p:cNvPr id="50" name="Rounded Rectangle 49"/>
+          <p:cNvSpPr/>
+          <p:nvPr/>
+        </p:nvSpPr>
+        <p:spPr>
+          <a:xfrm>
+            <a:off x="6585478" y="3760199"/>
+            <a:ext cx="2089150" cy="633002"/>
+          </a:xfrm>
+          <a:prstGeom prst="roundRect">
+            <a:avLst>
+              <a:gd name="adj" fmla="val 9921"/>
+            </a:avLst>
+          </a:prstGeom>
+          <a:solidFill>
+            <a:schemeClr val="accent2">
+              <a:lumMod val="40000"/>
+              <a:lumOff val="60000"/>
+              <a:alpha val="96000"/>
+            </a:schemeClr>
+          </a:solidFill>
+          <a:ln>
+            <a:solidFill>
+              <a:schemeClr val="accent2">
+                <a:lumMod val="50000"/>
+              </a:schemeClr>
+            </a:solidFill>
+          </a:ln>
+        </p:spPr>
+        <p:style>
+          <a:lnRef idx="1">
+            <a:schemeClr val="accent1"/>
+          </a:lnRef>
+          <a:fillRef idx="3">
+            <a:schemeClr val="accent1"/>
+          </a:fillRef>
+          <a:effectRef idx="2">
+            <a:schemeClr val="accent1"/>
+          </a:effectRef>
+          <a:fontRef idx="minor">
+            <a:schemeClr val="lt1"/>
+          </a:fontRef>
+        </p:style>
+        <p:txBody>
+          <a:bodyPr rtlCol="0" anchor="ctr"/>
+          <a:lstStyle/>
+          <a:p>
+            <a:pPr algn="ctr"/>
+            <a:r>
+              <a:rPr lang="en-US" dirty="0" smtClean="0">
+                <a:solidFill>
+                  <a:schemeClr val="tx1">
+                    <a:lumMod val="85000"/>
+                    <a:lumOff val="15000"/>
+                  </a:schemeClr>
+                </a:solidFill>
+              </a:rPr>
+              <a:t>Lab</a:t>
+            </a:r>
+            <a:endParaRPr lang="en-US" dirty="0">
+              <a:solidFill>
+                <a:schemeClr val="tx1">
+                  <a:lumMod val="85000"/>
+                  <a:lumOff val="15000"/>
+                </a:schemeClr>
+              </a:solidFill>
+            </a:endParaRPr>
+          </a:p>
+        </p:txBody>
+      </p:sp>
+      <p:sp>
+        <p:nvSpPr>
+          <p:cNvPr id="51" name="Rounded Rectangle 50"/>
+          <p:cNvSpPr/>
+          <p:nvPr/>
+        </p:nvSpPr>
+        <p:spPr>
+          <a:xfrm>
+            <a:off x="6585478" y="4488177"/>
+            <a:ext cx="2089150" cy="633002"/>
+          </a:xfrm>
+          <a:prstGeom prst="roundRect">
+            <a:avLst>
+              <a:gd name="adj" fmla="val 9921"/>
+            </a:avLst>
+          </a:prstGeom>
+          <a:solidFill>
+            <a:srgbClr val="E6B9B8">
+              <a:alpha val="96000"/>
+            </a:srgbClr>
+          </a:solidFill>
+          <a:ln>
+            <a:solidFill>
+              <a:srgbClr val="632523"/>
+            </a:solidFill>
+          </a:ln>
+        </p:spPr>
+        <p:style>
+          <a:lnRef idx="1">
+            <a:schemeClr val="accent1"/>
+          </a:lnRef>
+          <a:fillRef idx="3">
+            <a:schemeClr val="accent1"/>
+          </a:fillRef>
+          <a:effectRef idx="2">
+            <a:schemeClr val="accent1"/>
+          </a:effectRef>
+          <a:fontRef idx="minor">
+            <a:schemeClr val="lt1"/>
+          </a:fontRef>
+        </p:style>
+        <p:txBody>
+          <a:bodyPr rtlCol="0" anchor="ctr"/>
+          <a:lstStyle/>
+          <a:p>
+            <a:pPr algn="ctr"/>
+            <a:r>
+              <a:rPr lang="en-US" dirty="0" smtClean="0">
+                <a:solidFill>
+                  <a:schemeClr val="tx1">
+                    <a:lumMod val="85000"/>
+                    <a:lumOff val="15000"/>
+                  </a:schemeClr>
+                </a:solidFill>
+              </a:rPr>
+              <a:t>Lecture</a:t>
+            </a:r>
+            <a:endParaRPr lang="en-US" dirty="0">
+              <a:solidFill>
+                <a:schemeClr val="tx1">
+                  <a:lumMod val="85000"/>
+                  <a:lumOff val="15000"/>
+                </a:schemeClr>
+              </a:solidFill>
+            </a:endParaRPr>
+          </a:p>
+        </p:txBody>
+      </p:sp>
+      <p:sp>
+        <p:nvSpPr>
+          <p:cNvPr id="11" name="TextBox 10"/>
+          <p:cNvSpPr txBox="1"/>
+          <p:nvPr/>
+        </p:nvSpPr>
+        <p:spPr>
+          <a:xfrm>
+            <a:off x="7034211" y="2287084"/>
+            <a:ext cx="990212" cy="369332"/>
+          </a:xfrm>
+          <a:prstGeom prst="rect">
+            <a:avLst/>
+          </a:prstGeom>
+          <a:noFill/>
+        </p:spPr>
+        <p:txBody>
+          <a:bodyPr wrap="none" rtlCol="0">
+            <a:spAutoFit/>
+          </a:bodyPr>
+          <a:lstStyle/>
+          <a:p>
+            <a:r>
+              <a:rPr lang="en-US" dirty="0" smtClean="0"/>
+              <a:t>Program</a:t>
+            </a:r>
+            <a:endParaRPr lang="en-US" dirty="0"/>
+          </a:p>
+        </p:txBody>
+      </p:sp>
+      <p:sp>
+        <p:nvSpPr>
+          <p:cNvPr id="33" name="Rounded Rectangle 32"/>
+          <p:cNvSpPr/>
+          <p:nvPr/>
+        </p:nvSpPr>
+        <p:spPr>
+          <a:xfrm>
+            <a:off x="368190" y="2324499"/>
+            <a:ext cx="2514600" cy="1244233"/>
+          </a:xfrm>
+          <a:prstGeom prst="roundRect">
+            <a:avLst>
+              <a:gd name="adj" fmla="val 9921"/>
+            </a:avLst>
+          </a:prstGeom>
+          <a:solidFill>
+            <a:schemeClr val="accent4">
+              <a:lumMod val="20000"/>
+              <a:lumOff val="80000"/>
+              <a:alpha val="96000"/>
+            </a:schemeClr>
+          </a:solidFill>
+          <a:ln>
+            <a:solidFill>
+              <a:schemeClr val="accent4">
+                <a:lumMod val="75000"/>
+              </a:schemeClr>
+            </a:solidFill>
+          </a:ln>
+        </p:spPr>
+        <p:style>
+          <a:lnRef idx="1">
+            <a:schemeClr val="accent1"/>
+          </a:lnRef>
+          <a:fillRef idx="3">
+            <a:schemeClr val="accent1"/>
+          </a:fillRef>
+          <a:effectRef idx="2">
+            <a:schemeClr val="accent1"/>
+          </a:effectRef>
+          <a:fontRef idx="minor">
+            <a:schemeClr val="lt1"/>
+          </a:fontRef>
+        </p:style>
+        <p:txBody>
+          <a:bodyPr rtlCol="0" anchor="t"/>
+          <a:lstStyle/>
+          <a:p>
+            <a:pPr algn="ctr"/>
+            <a:r>
+              <a:rPr lang="en-US" dirty="0" smtClean="0">
+                <a:solidFill>
+                  <a:schemeClr val="tx1">
+                    <a:lumMod val="85000"/>
+                    <a:lumOff val="15000"/>
+                  </a:schemeClr>
+                </a:solidFill>
+              </a:rPr>
+              <a:t>(Short) Course</a:t>
+            </a:r>
+            <a:endParaRPr lang="en-US" dirty="0">
+              <a:solidFill>
+                <a:schemeClr val="tx1">
+                  <a:lumMod val="85000"/>
+                  <a:lumOff val="15000"/>
+                </a:schemeClr>
+              </a:solidFill>
+            </a:endParaRPr>
+          </a:p>
+        </p:txBody>
+      </p:sp>
+      <p:sp>
+        <p:nvSpPr>
+          <p:cNvPr id="34" name="Rounded Rectangle 33"/>
+          <p:cNvSpPr/>
+          <p:nvPr/>
+        </p:nvSpPr>
+        <p:spPr>
+          <a:xfrm>
+            <a:off x="368190" y="3855175"/>
+            <a:ext cx="2514600" cy="1487425"/>
+          </a:xfrm>
+          <a:prstGeom prst="roundRect">
+            <a:avLst>
+              <a:gd name="adj" fmla="val 9921"/>
+            </a:avLst>
+          </a:prstGeom>
+          <a:solidFill>
+            <a:schemeClr val="accent4">
+              <a:lumMod val="20000"/>
+              <a:lumOff val="80000"/>
+              <a:alpha val="96000"/>
+            </a:schemeClr>
+          </a:solidFill>
+          <a:ln>
+            <a:solidFill>
+              <a:schemeClr val="accent4">
+                <a:lumMod val="75000"/>
+              </a:schemeClr>
+            </a:solidFill>
+          </a:ln>
+        </p:spPr>
+        <p:style>
+          <a:lnRef idx="1">
+            <a:schemeClr val="accent1"/>
+          </a:lnRef>
+          <a:fillRef idx="3">
+            <a:schemeClr val="accent1"/>
+          </a:fillRef>
+          <a:effectRef idx="2">
+            <a:schemeClr val="accent1"/>
+          </a:effectRef>
+          <a:fontRef idx="minor">
+            <a:schemeClr val="lt1"/>
+          </a:fontRef>
+        </p:style>
+        <p:txBody>
+          <a:bodyPr rtlCol="0" anchor="t"/>
+          <a:lstStyle/>
+          <a:p>
+            <a:pPr algn="ctr"/>
+            <a:r>
+              <a:rPr lang="en-US" dirty="0" smtClean="0">
+                <a:solidFill>
+                  <a:schemeClr val="tx1">
+                    <a:lumMod val="85000"/>
+                    <a:lumOff val="15000"/>
+                  </a:schemeClr>
+                </a:solidFill>
+              </a:rPr>
+              <a:t>Workshop</a:t>
+            </a:r>
+            <a:endParaRPr lang="en-US" dirty="0">
+              <a:solidFill>
+                <a:schemeClr val="tx1">
+                  <a:lumMod val="85000"/>
+                  <a:lumOff val="15000"/>
+                </a:schemeClr>
+              </a:solidFill>
+            </a:endParaRPr>
+          </a:p>
+        </p:txBody>
+      </p:sp>
+      <p:sp>
+        <p:nvSpPr>
+          <p:cNvPr id="35" name="Rounded Rectangle 34"/>
+          <p:cNvSpPr/>
+          <p:nvPr/>
+        </p:nvSpPr>
+        <p:spPr>
+          <a:xfrm>
+            <a:off x="368190" y="5529791"/>
+            <a:ext cx="2514600" cy="814918"/>
+          </a:xfrm>
+          <a:prstGeom prst="roundRect">
+            <a:avLst>
+              <a:gd name="adj" fmla="val 9921"/>
+            </a:avLst>
+          </a:prstGeom>
+          <a:solidFill>
+            <a:schemeClr val="accent4">
+              <a:lumMod val="20000"/>
+              <a:lumOff val="80000"/>
+              <a:alpha val="96000"/>
+            </a:schemeClr>
+          </a:solidFill>
+          <a:ln>
+            <a:solidFill>
+              <a:schemeClr val="accent4">
+                <a:lumMod val="75000"/>
+              </a:schemeClr>
+            </a:solidFill>
+          </a:ln>
+        </p:spPr>
+        <p:style>
+          <a:lnRef idx="1">
+            <a:schemeClr val="accent1"/>
+          </a:lnRef>
+          <a:fillRef idx="3">
+            <a:schemeClr val="accent1"/>
+          </a:fillRef>
+          <a:effectRef idx="2">
+            <a:schemeClr val="accent1"/>
+          </a:effectRef>
+          <a:fontRef idx="minor">
+            <a:schemeClr val="lt1"/>
+          </a:fontRef>
+        </p:style>
+        <p:txBody>
+          <a:bodyPr rtlCol="0" anchor="ctr"/>
+          <a:lstStyle/>
+          <a:p>
+            <a:pPr algn="ctr"/>
+            <a:r>
+              <a:rPr lang="en-US" dirty="0" smtClean="0">
+                <a:solidFill>
+                  <a:schemeClr val="tx1">
+                    <a:lumMod val="85000"/>
+                    <a:lumOff val="15000"/>
+                  </a:schemeClr>
+                </a:solidFill>
+              </a:rPr>
+              <a:t>Seminar</a:t>
+            </a:r>
+            <a:endParaRPr lang="en-US" dirty="0">
+              <a:solidFill>
+                <a:schemeClr val="tx1">
+                  <a:lumMod val="85000"/>
+                  <a:lumOff val="15000"/>
+                </a:schemeClr>
+              </a:solidFill>
+            </a:endParaRPr>
+          </a:p>
+        </p:txBody>
+      </p:sp>
+      <p:sp>
+        <p:nvSpPr>
+          <p:cNvPr id="38" name="Rounded Rectangle 37"/>
+          <p:cNvSpPr/>
+          <p:nvPr/>
+        </p:nvSpPr>
+        <p:spPr>
+          <a:xfrm>
+            <a:off x="6585478" y="5207567"/>
+            <a:ext cx="2089150" cy="633002"/>
+          </a:xfrm>
+          <a:prstGeom prst="roundRect">
+            <a:avLst>
+              <a:gd name="adj" fmla="val 9921"/>
+            </a:avLst>
+          </a:prstGeom>
+          <a:solidFill>
+            <a:srgbClr val="E6B9B8">
+              <a:alpha val="96000"/>
+            </a:srgbClr>
+          </a:solidFill>
+          <a:ln>
+            <a:solidFill>
+              <a:srgbClr val="632523"/>
+            </a:solidFill>
+          </a:ln>
+        </p:spPr>
+        <p:style>
+          <a:lnRef idx="1">
+            <a:schemeClr val="accent1"/>
+          </a:lnRef>
+          <a:fillRef idx="3">
+            <a:schemeClr val="accent1"/>
+          </a:fillRef>
+          <a:effectRef idx="2">
+            <a:schemeClr val="accent1"/>
+          </a:effectRef>
+          <a:fontRef idx="minor">
+            <a:schemeClr val="lt1"/>
+          </a:fontRef>
+        </p:style>
+        <p:txBody>
+          <a:bodyPr rtlCol="0" anchor="ctr"/>
+          <a:lstStyle/>
+          <a:p>
+            <a:pPr algn="ctr"/>
+            <a:r>
+              <a:rPr lang="en-US" dirty="0" smtClean="0">
+                <a:solidFill>
+                  <a:schemeClr val="tx1">
+                    <a:lumMod val="85000"/>
+                    <a:lumOff val="15000"/>
+                  </a:schemeClr>
+                </a:solidFill>
+              </a:rPr>
+              <a:t>Discussion</a:t>
+            </a:r>
+            <a:endParaRPr lang="en-US" dirty="0">
+              <a:solidFill>
+                <a:schemeClr val="tx1">
+                  <a:lumMod val="85000"/>
+                  <a:lumOff val="15000"/>
+                </a:schemeClr>
+              </a:solidFill>
+            </a:endParaRPr>
+          </a:p>
+        </p:txBody>
+      </p:sp>
+      <p:sp>
+        <p:nvSpPr>
+          <p:cNvPr id="40" name="Oval 39"/>
+          <p:cNvSpPr/>
+          <p:nvPr/>
+        </p:nvSpPr>
+        <p:spPr>
+          <a:xfrm>
+            <a:off x="4052583" y="5695652"/>
+            <a:ext cx="1305538" cy="1029818"/>
+          </a:xfrm>
+          <a:prstGeom prst="ellipse">
+            <a:avLst/>
+          </a:prstGeom>
+        </p:spPr>
+        <p:style>
+          <a:lnRef idx="1">
+            <a:schemeClr val="accent1"/>
+          </a:lnRef>
+          <a:fillRef idx="3">
+            <a:schemeClr val="accent1"/>
+          </a:fillRef>
+          <a:effectRef idx="2">
+            <a:schemeClr val="accent1"/>
+          </a:effectRef>
+          <a:fontRef idx="minor">
+            <a:schemeClr val="lt1"/>
+          </a:fontRef>
+        </p:style>
+        <p:txBody>
+          <a:bodyPr rtlCol="0" anchor="ctr"/>
+          <a:lstStyle/>
+          <a:p>
+            <a:pPr algn="ctr"/>
+            <a:r>
+              <a:rPr lang="en-US" dirty="0" smtClean="0"/>
+              <a:t>Code</a:t>
+            </a:r>
+            <a:endParaRPr lang="en-US" dirty="0"/>
+          </a:p>
+        </p:txBody>
+      </p:sp>
+      <p:sp>
+        <p:nvSpPr>
+          <p:cNvPr id="43" name="Rounded Rectangle 42"/>
+          <p:cNvSpPr/>
+          <p:nvPr/>
+        </p:nvSpPr>
+        <p:spPr>
+          <a:xfrm>
+            <a:off x="542715" y="4488177"/>
+            <a:ext cx="2089150" cy="633002"/>
+          </a:xfrm>
+          <a:prstGeom prst="roundRect">
+            <a:avLst>
+              <a:gd name="adj" fmla="val 9921"/>
+            </a:avLst>
+          </a:prstGeom>
+          <a:solidFill>
+            <a:srgbClr val="E6B9B8">
+              <a:alpha val="96000"/>
+            </a:srgbClr>
+          </a:solidFill>
+          <a:ln>
+            <a:solidFill>
+              <a:srgbClr val="632523"/>
+            </a:solidFill>
+          </a:ln>
+        </p:spPr>
+        <p:style>
+          <a:lnRef idx="1">
+            <a:schemeClr val="accent1"/>
+          </a:lnRef>
+          <a:fillRef idx="3">
+            <a:schemeClr val="accent1"/>
+          </a:fillRef>
+          <a:effectRef idx="2">
+            <a:schemeClr val="accent1"/>
+          </a:effectRef>
+          <a:fontRef idx="minor">
+            <a:schemeClr val="lt1"/>
+          </a:fontRef>
+        </p:style>
+        <p:txBody>
+          <a:bodyPr rtlCol="0" anchor="ctr"/>
+          <a:lstStyle/>
+          <a:p>
+            <a:pPr algn="ctr"/>
+            <a:r>
+              <a:rPr lang="en-US" dirty="0" smtClean="0">
+                <a:solidFill>
+                  <a:schemeClr val="tx1">
+                    <a:lumMod val="85000"/>
+                    <a:lumOff val="15000"/>
+                  </a:schemeClr>
+                </a:solidFill>
+              </a:rPr>
+              <a:t>Hands-on Activity</a:t>
+            </a:r>
+            <a:endParaRPr lang="en-US" dirty="0">
+              <a:solidFill>
+                <a:schemeClr val="tx1">
+                  <a:lumMod val="85000"/>
+                  <a:lumOff val="15000"/>
+                </a:schemeClr>
+              </a:solidFill>
+            </a:endParaRPr>
+          </a:p>
+        </p:txBody>
+      </p:sp>
+      <p:sp>
+        <p:nvSpPr>
+          <p:cNvPr id="44" name="Rounded Rectangle 43"/>
+          <p:cNvSpPr/>
+          <p:nvPr/>
+        </p:nvSpPr>
+        <p:spPr>
+          <a:xfrm>
+            <a:off x="542715" y="2757153"/>
+            <a:ext cx="2089150" cy="633002"/>
+          </a:xfrm>
+          <a:prstGeom prst="roundRect">
+            <a:avLst>
+              <a:gd name="adj" fmla="val 9921"/>
+            </a:avLst>
+          </a:prstGeom>
+          <a:solidFill>
+            <a:srgbClr val="E6B9B8">
+              <a:alpha val="96000"/>
+            </a:srgbClr>
+          </a:solidFill>
+          <a:ln>
+            <a:solidFill>
+              <a:srgbClr val="632523"/>
+            </a:solidFill>
+          </a:ln>
+        </p:spPr>
+        <p:style>
+          <a:lnRef idx="1">
+            <a:schemeClr val="accent1"/>
+          </a:lnRef>
+          <a:fillRef idx="3">
+            <a:schemeClr val="accent1"/>
+          </a:fillRef>
+          <a:effectRef idx="2">
+            <a:schemeClr val="accent1"/>
+          </a:effectRef>
+          <a:fontRef idx="minor">
+            <a:schemeClr val="lt1"/>
+          </a:fontRef>
+        </p:style>
+        <p:txBody>
+          <a:bodyPr rtlCol="0" anchor="ctr"/>
+          <a:lstStyle/>
+          <a:p>
+            <a:pPr algn="ctr"/>
+            <a:r>
+              <a:rPr lang="en-US" dirty="0" smtClean="0">
+                <a:solidFill>
+                  <a:schemeClr val="tx1">
+                    <a:lumMod val="85000"/>
+                    <a:lumOff val="15000"/>
+                  </a:schemeClr>
+                </a:solidFill>
+              </a:rPr>
+              <a:t>Group Project</a:t>
+            </a:r>
+            <a:endParaRPr lang="en-US" dirty="0">
+              <a:solidFill>
+                <a:schemeClr val="tx1">
+                  <a:lumMod val="85000"/>
+                  <a:lumOff val="15000"/>
+                </a:schemeClr>
+              </a:solidFill>
+            </a:endParaRPr>
+          </a:p>
+        </p:txBody>
+      </p:sp>
+      <p:grpSp>
+        <p:nvGrpSpPr>
+          <p:cNvPr id="16" name="Group 15"/>
+          <p:cNvGrpSpPr/>
+          <p:nvPr/>
+        </p:nvGrpSpPr>
+        <p:grpSpPr>
+          <a:xfrm>
+            <a:off x="4112182" y="1780213"/>
+            <a:ext cx="951520" cy="1141583"/>
+            <a:chOff x="3457367" y="3243347"/>
+            <a:chExt cx="951520" cy="1141583"/>
+          </a:xfrm>
+        </p:grpSpPr>
+        <p:sp>
+          <p:nvSpPr>
+            <p:cNvPr id="15" name="Folded Corner 14"/>
+            <p:cNvSpPr/>
+            <p:nvPr/>
+          </p:nvSpPr>
+          <p:spPr>
+            <a:xfrm>
+              <a:off x="3457367" y="3243347"/>
+              <a:ext cx="688700" cy="881687"/>
+            </a:xfrm>
+            <a:prstGeom prst="foldedCorner">
+              <a:avLst/>
+            </a:prstGeom>
+          </p:spPr>
+          <p:style>
+            <a:lnRef idx="1">
+              <a:schemeClr val="accent1"/>
+            </a:lnRef>
+            <a:fillRef idx="3">
+              <a:schemeClr val="accent1"/>
+            </a:fillRef>
+            <a:effectRef idx="2">
+              <a:schemeClr val="accent1"/>
+            </a:effectRef>
+            <a:fontRef idx="minor">
+              <a:schemeClr val="lt1"/>
+            </a:fontRef>
+          </p:style>
+          <p:txBody>
+            <a:bodyPr rtlCol="0" anchor="ctr"/>
+            <a:lstStyle/>
+            <a:p>
+              <a:pPr algn="ctr"/>
+              <a:r>
+                <a:rPr lang="en-US" sz="1400" dirty="0" smtClean="0"/>
+                <a:t>Lesson</a:t>
+              </a:r>
+              <a:endParaRPr lang="en-US" sz="1400" dirty="0"/>
+            </a:p>
+          </p:txBody>
+        </p:sp>
+        <p:sp>
+          <p:nvSpPr>
+            <p:cNvPr id="46" name="Folded Corner 45"/>
+            <p:cNvSpPr/>
+            <p:nvPr/>
+          </p:nvSpPr>
+          <p:spPr>
+            <a:xfrm>
+              <a:off x="3536302" y="3319355"/>
+              <a:ext cx="688700" cy="881687"/>
+            </a:xfrm>
+            <a:prstGeom prst="foldedCorner">
+              <a:avLst/>
+            </a:prstGeom>
+          </p:spPr>
+          <p:style>
+            <a:lnRef idx="1">
+              <a:schemeClr val="accent1"/>
+            </a:lnRef>
+            <a:fillRef idx="3">
+              <a:schemeClr val="accent1"/>
+            </a:fillRef>
+            <a:effectRef idx="2">
+              <a:schemeClr val="accent1"/>
+            </a:effectRef>
+            <a:fontRef idx="minor">
+              <a:schemeClr val="lt1"/>
+            </a:fontRef>
+          </p:style>
+          <p:txBody>
+            <a:bodyPr rtlCol="0" anchor="ctr"/>
+            <a:lstStyle/>
+            <a:p>
+              <a:pPr algn="ctr"/>
+              <a:r>
+                <a:rPr lang="en-US" sz="1400" dirty="0" smtClean="0"/>
+                <a:t>Lesson</a:t>
+              </a:r>
+              <a:endParaRPr lang="en-US" sz="1400" dirty="0"/>
+            </a:p>
+          </p:txBody>
+        </p:sp>
+        <p:sp>
+          <p:nvSpPr>
+            <p:cNvPr id="55" name="Folded Corner 54"/>
+            <p:cNvSpPr/>
+            <p:nvPr/>
+          </p:nvSpPr>
+          <p:spPr>
+            <a:xfrm>
+              <a:off x="3625732" y="3408778"/>
+              <a:ext cx="688700" cy="881687"/>
+            </a:xfrm>
+            <a:prstGeom prst="foldedCorner">
+              <a:avLst/>
+            </a:prstGeom>
+          </p:spPr>
+          <p:style>
+            <a:lnRef idx="1">
+              <a:schemeClr val="accent1"/>
+            </a:lnRef>
+            <a:fillRef idx="3">
+              <a:schemeClr val="accent1"/>
+            </a:fillRef>
+            <a:effectRef idx="2">
+              <a:schemeClr val="accent1"/>
+            </a:effectRef>
+            <a:fontRef idx="minor">
+              <a:schemeClr val="lt1"/>
+            </a:fontRef>
+          </p:style>
+          <p:txBody>
+            <a:bodyPr rtlCol="0" anchor="ctr"/>
+            <a:lstStyle/>
+            <a:p>
+              <a:pPr algn="ctr"/>
+              <a:r>
+                <a:rPr lang="en-US" sz="1400" dirty="0" smtClean="0"/>
+                <a:t>Lesson</a:t>
+              </a:r>
+              <a:endParaRPr lang="en-US" sz="1400" dirty="0"/>
+            </a:p>
+          </p:txBody>
+        </p:sp>
+        <p:sp>
+          <p:nvSpPr>
+            <p:cNvPr id="56" name="Folded Corner 55"/>
+            <p:cNvSpPr/>
+            <p:nvPr/>
+          </p:nvSpPr>
+          <p:spPr>
+            <a:xfrm>
+              <a:off x="3720187" y="3503243"/>
+              <a:ext cx="688700" cy="881687"/>
+            </a:xfrm>
+            <a:prstGeom prst="foldedCorner">
+              <a:avLst/>
+            </a:prstGeom>
+          </p:spPr>
+          <p:style>
+            <a:lnRef idx="1">
+              <a:schemeClr val="accent1"/>
+            </a:lnRef>
+            <a:fillRef idx="3">
+              <a:schemeClr val="accent1"/>
+            </a:fillRef>
+            <a:effectRef idx="2">
+              <a:schemeClr val="accent1"/>
+            </a:effectRef>
+            <a:fontRef idx="minor">
+              <a:schemeClr val="lt1"/>
+            </a:fontRef>
+          </p:style>
+          <p:txBody>
+            <a:bodyPr rtlCol="0" anchor="ctr"/>
+            <a:lstStyle/>
+            <a:p>
+              <a:pPr algn="ctr"/>
+              <a:r>
+                <a:rPr lang="en-US" sz="1400" dirty="0" smtClean="0"/>
+                <a:t>Unit</a:t>
+              </a:r>
+              <a:endParaRPr lang="en-US" sz="1400" dirty="0"/>
+            </a:p>
+          </p:txBody>
+        </p:sp>
+      </p:grpSp>
+      <p:sp>
+        <p:nvSpPr>
+          <p:cNvPr id="24" name="Folded Corner 23"/>
+          <p:cNvSpPr/>
+          <p:nvPr/>
+        </p:nvSpPr>
+        <p:spPr>
+          <a:xfrm>
+            <a:off x="4280547" y="3127888"/>
+            <a:ext cx="688700" cy="881687"/>
+          </a:xfrm>
+          <a:prstGeom prst="foldedCorner">
+            <a:avLst/>
+          </a:prstGeom>
+        </p:spPr>
+        <p:style>
+          <a:lnRef idx="1">
+            <a:schemeClr val="accent1"/>
+          </a:lnRef>
+          <a:fillRef idx="3">
+            <a:schemeClr val="accent1"/>
+          </a:fillRef>
+          <a:effectRef idx="2">
+            <a:schemeClr val="accent1"/>
+          </a:effectRef>
+          <a:fontRef idx="minor">
+            <a:schemeClr val="lt1"/>
+          </a:fontRef>
+        </p:style>
+        <p:txBody>
+          <a:bodyPr rtlCol="0" anchor="ctr"/>
+          <a:lstStyle/>
+          <a:p>
+            <a:pPr algn="ctr"/>
+            <a:r>
+              <a:rPr lang="en-US" sz="1400" dirty="0" smtClean="0"/>
+              <a:t>Lesson</a:t>
+            </a:r>
+            <a:endParaRPr lang="en-US" sz="1400" dirty="0"/>
+          </a:p>
+        </p:txBody>
+      </p:sp>
+      <p:sp>
+        <p:nvSpPr>
+          <p:cNvPr id="62" name="Left-Right Arrow 61"/>
+          <p:cNvSpPr/>
+          <p:nvPr/>
+        </p:nvSpPr>
+        <p:spPr>
+          <a:xfrm>
+            <a:off x="3180067" y="2737908"/>
+            <a:ext cx="734668" cy="323177"/>
+          </a:xfrm>
+          <a:prstGeom prst="leftRightArrow">
+            <a:avLst/>
+          </a:prstGeom>
+        </p:spPr>
+        <p:style>
+          <a:lnRef idx="1">
+            <a:schemeClr val="accent1"/>
+          </a:lnRef>
+          <a:fillRef idx="3">
+            <a:schemeClr val="accent1"/>
+          </a:fillRef>
+          <a:effectRef idx="2">
+            <a:schemeClr val="accent1"/>
+          </a:effectRef>
+          <a:fontRef idx="minor">
+            <a:schemeClr val="lt1"/>
+          </a:fontRef>
+        </p:style>
+        <p:txBody>
+          <a:bodyPr rtlCol="0" anchor="ctr"/>
+          <a:lstStyle/>
+          <a:p>
+            <a:pPr algn="ctr"/>
+            <a:endParaRPr lang="en-US"/>
+          </a:p>
+        </p:txBody>
+      </p:sp>
+      <p:sp>
+        <p:nvSpPr>
+          <p:cNvPr id="63" name="Right Arrow 62"/>
+          <p:cNvSpPr/>
+          <p:nvPr/>
+        </p:nvSpPr>
+        <p:spPr>
+          <a:xfrm>
+            <a:off x="5237137" y="2757153"/>
+            <a:ext cx="703183" cy="303932"/>
+          </a:xfrm>
+          <a:prstGeom prst="rightArrow">
+            <a:avLst/>
+          </a:prstGeom>
+        </p:spPr>
+        <p:style>
+          <a:lnRef idx="1">
+            <a:schemeClr val="accent1"/>
+          </a:lnRef>
+          <a:fillRef idx="3">
+            <a:schemeClr val="accent1"/>
+          </a:fillRef>
+          <a:effectRef idx="2">
+            <a:schemeClr val="accent1"/>
+          </a:effectRef>
+          <a:fontRef idx="minor">
+            <a:schemeClr val="lt1"/>
+          </a:fontRef>
+        </p:style>
+        <p:txBody>
+          <a:bodyPr rtlCol="0" anchor="ctr"/>
+          <a:lstStyle/>
+          <a:p>
+            <a:pPr algn="ctr"/>
+            <a:endParaRPr lang="en-US"/>
+          </a:p>
+        </p:txBody>
+      </p:sp>
+      <p:sp>
+        <p:nvSpPr>
+          <p:cNvPr id="13" name="Oval 12"/>
+          <p:cNvSpPr/>
+          <p:nvPr/>
+        </p:nvSpPr>
+        <p:spPr>
+          <a:xfrm>
+            <a:off x="4046636" y="4902741"/>
+            <a:ext cx="1311485" cy="1034509"/>
+          </a:xfrm>
+          <a:prstGeom prst="ellipse">
+            <a:avLst/>
+          </a:prstGeom>
+        </p:spPr>
+        <p:style>
+          <a:lnRef idx="1">
+            <a:schemeClr val="accent1"/>
+          </a:lnRef>
+          <a:fillRef idx="3">
+            <a:schemeClr val="accent1"/>
+          </a:fillRef>
+          <a:effectRef idx="2">
+            <a:schemeClr val="accent1"/>
+          </a:effectRef>
+          <a:fontRef idx="minor">
+            <a:schemeClr val="lt1"/>
+          </a:fontRef>
+        </p:style>
+        <p:txBody>
+          <a:bodyPr rtlCol="0" anchor="ctr"/>
+          <a:lstStyle/>
+          <a:p>
+            <a:pPr algn="ctr"/>
+            <a:r>
+              <a:rPr lang="en-US" dirty="0" smtClean="0"/>
+              <a:t>Data</a:t>
+            </a:r>
+            <a:endParaRPr lang="en-US" dirty="0"/>
+          </a:p>
+        </p:txBody>
+      </p:sp>
+      <p:sp>
+        <p:nvSpPr>
+          <p:cNvPr id="66" name="Right Arrow 65"/>
+          <p:cNvSpPr/>
+          <p:nvPr/>
+        </p:nvSpPr>
+        <p:spPr>
+          <a:xfrm>
+            <a:off x="5389537" y="5670834"/>
+            <a:ext cx="703183" cy="303932"/>
+          </a:xfrm>
+          <a:prstGeom prst="rightArrow">
+            <a:avLst/>
+          </a:prstGeom>
+        </p:spPr>
+        <p:style>
+          <a:lnRef idx="1">
+            <a:schemeClr val="accent1"/>
+          </a:lnRef>
+          <a:fillRef idx="3">
+            <a:schemeClr val="accent1"/>
+          </a:fillRef>
+          <a:effectRef idx="2">
+            <a:schemeClr val="accent1"/>
+          </a:effectRef>
+          <a:fontRef idx="minor">
+            <a:schemeClr val="lt1"/>
+          </a:fontRef>
+        </p:style>
+        <p:txBody>
+          <a:bodyPr rtlCol="0" anchor="ctr"/>
+          <a:lstStyle/>
+          <a:p>
+            <a:pPr algn="ctr"/>
+            <a:endParaRPr lang="en-US"/>
+          </a:p>
+        </p:txBody>
+      </p:sp>
+      <p:sp>
+        <p:nvSpPr>
+          <p:cNvPr id="67" name="Right Arrow 66"/>
+          <p:cNvSpPr/>
+          <p:nvPr/>
+        </p:nvSpPr>
+        <p:spPr>
+          <a:xfrm rot="10800000">
+            <a:off x="3211552" y="5633318"/>
+            <a:ext cx="703183" cy="303932"/>
+          </a:xfrm>
+          <a:prstGeom prst="rightArrow">
+            <a:avLst/>
+          </a:prstGeom>
+        </p:spPr>
+        <p:style>
+          <a:lnRef idx="1">
+            <a:schemeClr val="accent1"/>
+          </a:lnRef>
+          <a:fillRef idx="3">
+            <a:schemeClr val="accent1"/>
+          </a:fillRef>
+          <a:effectRef idx="2">
+            <a:schemeClr val="accent1"/>
+          </a:effectRef>
+          <a:fontRef idx="minor">
+            <a:schemeClr val="lt1"/>
+          </a:fontRef>
+        </p:style>
+        <p:txBody>
+          <a:bodyPr rtlCol="0" anchor="ctr"/>
+          <a:lstStyle/>
+          <a:p>
+            <a:pPr algn="ctr"/>
+            <a:endParaRPr lang="en-US"/>
+          </a:p>
+        </p:txBody>
+      </p:sp>
+      <p:sp>
+        <p:nvSpPr>
+          <p:cNvPr id="68" name="Right Arrow 67"/>
+          <p:cNvSpPr/>
+          <p:nvPr/>
+        </p:nvSpPr>
+        <p:spPr>
+          <a:xfrm rot="16200000">
+            <a:off x="4280548" y="4336210"/>
+            <a:ext cx="703183" cy="303932"/>
+          </a:xfrm>
+          <a:prstGeom prst="rightArrow">
+            <a:avLst/>
+          </a:prstGeom>
+        </p:spPr>
+        <p:style>
+          <a:lnRef idx="1">
+            <a:schemeClr val="accent1"/>
+          </a:lnRef>
+          <a:fillRef idx="3">
+            <a:schemeClr val="accent1"/>
+          </a:fillRef>
+          <a:effectRef idx="2">
+            <a:schemeClr val="accent1"/>
+          </a:effectRef>
+          <a:fontRef idx="minor">
+            <a:schemeClr val="lt1"/>
+          </a:fontRef>
+        </p:style>
+        <p:txBody>
+          <a:bodyPr rtlCol="0" anchor="ctr"/>
+          <a:lstStyle/>
+          <a:p>
+            <a:pPr algn="ctr"/>
+            <a:endParaRPr lang="en-US"/>
+          </a:p>
+        </p:txBody>
+      </p:sp>
+    </p:spTree>
+    <p:extLst>
+      <p:ext uri="{BB962C8B-B14F-4D97-AF65-F5344CB8AC3E}">
+        <p14:creationId xmlns:p14="http://schemas.microsoft.com/office/powerpoint/2010/main" val="537624211"/>
       </p:ext>
     </p:extLst>
   </p:cSld>

</xml_diff>